<commit_message>
add Archi HTML Report with Power BI model
</commit_message>
<xml_diff>
--- a/architool/Using-Archi.pptx
+++ b/architool/Using-Archi.pptx
@@ -5,15 +5,16 @@
     <p:sldMasterId id="2147483648" r:id="rId4"/>
   </p:sldMasterIdLst>
   <p:notesMasterIdLst>
-    <p:notesMasterId r:id="rId8"/>
+    <p:notesMasterId r:id="rId9"/>
   </p:notesMasterIdLst>
   <p:handoutMasterIdLst>
-    <p:handoutMasterId r:id="rId9"/>
+    <p:handoutMasterId r:id="rId10"/>
   </p:handoutMasterIdLst>
   <p:sldIdLst>
     <p:sldId id="256" r:id="rId5"/>
-    <p:sldId id="257" r:id="rId6"/>
-    <p:sldId id="258" r:id="rId7"/>
+    <p:sldId id="259" r:id="rId6"/>
+    <p:sldId id="257" r:id="rId7"/>
+    <p:sldId id="258" r:id="rId8"/>
   </p:sldIdLst>
   <p:sldSz cx="12192000" cy="6858000"/>
   <p:notesSz cx="6858000" cy="9144000"/>
@@ -217,7 +218,7 @@
           <a:p>
             <a:fld id="{9410D272-305C-421E-A9EF-95D63D599B42}" type="datetimeFigureOut">
               <a:rPr lang="en-US" smtClean="0"/>
-              <a:t>4/29/2024</a:t>
+              <a:t>5/3/2024</a:t>
             </a:fld>
             <a:endParaRPr lang="en-US" dirty="0"/>
           </a:p>
@@ -394,7 +395,7 @@
           <a:p>
             <a:fld id="{05E16E63-7886-43BC-8DD4-4F14C3DD7360}" type="datetimeFigureOut">
               <a:rPr lang="en-US" smtClean="0"/>
-              <a:t>4/29/2024</a:t>
+              <a:t>5/3/2024</a:t>
             </a:fld>
             <a:endParaRPr lang="en-US" dirty="0"/>
           </a:p>
@@ -6112,10 +6113,10 @@
       </p:grpSpPr>
       <p:sp>
         <p:nvSpPr>
-          <p:cNvPr id="7" name="Title 6">
-            <a:extLst>
-              <a:ext uri="{FF2B5EF4-FFF2-40B4-BE49-F238E27FC236}">
-                <a16:creationId xmlns:a16="http://schemas.microsoft.com/office/drawing/2014/main" id="{98D150CF-F888-48EA-89E8-311ED5E9161B}"/>
+          <p:cNvPr id="8" name="Subtitle 7">
+            <a:extLst>
+              <a:ext uri="{FF2B5EF4-FFF2-40B4-BE49-F238E27FC236}">
+                <a16:creationId xmlns:a16="http://schemas.microsoft.com/office/drawing/2014/main" id="{6BBE0348-1527-4055-BA8A-E2754222743D}"/>
               </a:ext>
             </a:extLst>
           </p:cNvPr>
@@ -6123,52 +6124,19 @@
             <a:spLocks noGrp="1"/>
           </p:cNvSpPr>
           <p:nvPr>
-            <p:ph type="ctrTitle"/>
-          </p:nvPr>
-        </p:nvSpPr>
-        <p:spPr>
-          <a:xfrm>
-            <a:off x="649044" y="1308846"/>
-            <a:ext cx="6815446" cy="4078942"/>
+            <p:ph type="subTitle" idx="1"/>
+          </p:nvPr>
+        </p:nvSpPr>
+        <p:spPr>
+          <a:xfrm>
+            <a:off x="649045" y="5468470"/>
+            <a:ext cx="6437555" cy="475129"/>
           </a:xfrm>
         </p:spPr>
         <p:txBody>
           <a:bodyPr>
-            <a:noAutofit/>
+            <a:normAutofit fontScale="92500" lnSpcReduction="20000"/>
           </a:bodyPr>
-          <a:lstStyle/>
-          <a:p>
-            <a:r>
-              <a:rPr lang="en-US" sz="7200" dirty="0"/>
-              <a:t>Understand Structure of Archi HTML Report</a:t>
-            </a:r>
-          </a:p>
-        </p:txBody>
-      </p:sp>
-      <p:sp>
-        <p:nvSpPr>
-          <p:cNvPr id="8" name="Subtitle 7">
-            <a:extLst>
-              <a:ext uri="{FF2B5EF4-FFF2-40B4-BE49-F238E27FC236}">
-                <a16:creationId xmlns:a16="http://schemas.microsoft.com/office/drawing/2014/main" id="{6BBE0348-1527-4055-BA8A-E2754222743D}"/>
-              </a:ext>
-            </a:extLst>
-          </p:cNvPr>
-          <p:cNvSpPr>
-            <a:spLocks noGrp="1"/>
-          </p:cNvSpPr>
-          <p:nvPr>
-            <p:ph type="subTitle" idx="1"/>
-          </p:nvPr>
-        </p:nvSpPr>
-        <p:spPr>
-          <a:xfrm>
-            <a:off x="649045" y="4640424"/>
-            <a:ext cx="6437555" cy="1303176"/>
-          </a:xfrm>
-        </p:spPr>
-        <p:txBody>
-          <a:bodyPr/>
           <a:lstStyle/>
           <a:p>
             <a:r>
@@ -6278,82 +6246,31 @@
           </a:prstGeom>
         </p:spPr>
       </p:pic>
-      <p:pic>
-        <p:nvPicPr>
-          <p:cNvPr id="4" name="Picture 3">
-            <a:extLst>
-              <a:ext uri="{FF2B5EF4-FFF2-40B4-BE49-F238E27FC236}">
-                <a16:creationId xmlns:a16="http://schemas.microsoft.com/office/drawing/2014/main" id="{7534C8A3-84CE-B0B0-067B-F18BC9A7188D}"/>
-              </a:ext>
-            </a:extLst>
-          </p:cNvPr>
-          <p:cNvPicPr>
-            <a:picLocks noChangeAspect="1"/>
-          </p:cNvPicPr>
+      <p:sp>
+        <p:nvSpPr>
+          <p:cNvPr id="11" name="Subtitle 7">
+            <a:extLst>
+              <a:ext uri="{FF2B5EF4-FFF2-40B4-BE49-F238E27FC236}">
+                <a16:creationId xmlns:a16="http://schemas.microsoft.com/office/drawing/2014/main" id="{0A296E48-34D5-9752-1051-73F2CA3FF687}"/>
+              </a:ext>
+            </a:extLst>
+          </p:cNvPr>
+          <p:cNvSpPr txBox="1">
+            <a:spLocks/>
+          </p:cNvSpPr>
           <p:nvPr/>
-        </p:nvPicPr>
-        <p:blipFill>
-          <a:blip r:embed="rId5">
-            <a:clrChange>
-              <a:clrFrom>
-                <a:srgbClr val="F9F9F8"/>
-              </a:clrFrom>
-              <a:clrTo>
-                <a:srgbClr val="F9F9F8">
-                  <a:alpha val="0"/>
-                </a:srgbClr>
-              </a:clrTo>
-            </a:clrChange>
-          </a:blip>
-          <a:stretch>
-            <a:fillRect/>
-          </a:stretch>
-        </p:blipFill>
-        <p:spPr>
-          <a:xfrm>
-            <a:off x="6472518" y="2215273"/>
-            <a:ext cx="5428411" cy="3082240"/>
+        </p:nvSpPr>
+        <p:spPr>
+          <a:xfrm>
+            <a:off x="200808" y="1413698"/>
+            <a:ext cx="10951285" cy="1157437"/>
           </a:xfrm>
           <a:prstGeom prst="rect">
             <a:avLst/>
           </a:prstGeom>
-          <a:ln>
-            <a:noFill/>
-          </a:ln>
-          <a:effectLst>
-            <a:outerShdw blurRad="292100" dist="139700" dir="2700000" algn="tl" rotWithShape="0">
-              <a:srgbClr val="333333">
-                <a:alpha val="65000"/>
-              </a:srgbClr>
-            </a:outerShdw>
-          </a:effectLst>
-        </p:spPr>
-      </p:pic>
-      <p:sp>
-        <p:nvSpPr>
-          <p:cNvPr id="11" name="Subtitle 7">
-            <a:extLst>
-              <a:ext uri="{FF2B5EF4-FFF2-40B4-BE49-F238E27FC236}">
-                <a16:creationId xmlns:a16="http://schemas.microsoft.com/office/drawing/2014/main" id="{0A296E48-34D5-9752-1051-73F2CA3FF687}"/>
-              </a:ext>
-            </a:extLst>
-          </p:cNvPr>
-          <p:cNvSpPr txBox="1">
-            <a:spLocks/>
-          </p:cNvSpPr>
-          <p:nvPr/>
-        </p:nvSpPr>
-        <p:spPr>
-          <a:xfrm>
-            <a:off x="649045" y="188258"/>
-            <a:ext cx="6437555" cy="699247"/>
-          </a:xfrm>
-          <a:prstGeom prst="rect">
-            <a:avLst/>
-          </a:prstGeom>
-        </p:spPr>
-        <p:txBody>
-          <a:bodyPr vert="horz" lIns="91440" tIns="45720" rIns="91440" bIns="45720" rtlCol="0" anchor="b">
+        </p:spPr>
+        <p:txBody>
+          <a:bodyPr vert="horz" lIns="91440" tIns="45720" rIns="91440" bIns="45720" rtlCol="0" anchor="ctr">
             <a:normAutofit/>
           </a:bodyPr>
           <a:lstStyle>
@@ -6522,12 +6439,135 @@
           </a:lstStyle>
           <a:p>
             <a:r>
-              <a:rPr lang="en-US" dirty="0"/>
-              <a:t>Archi HTML Report - 01</a:t>
+              <a:rPr lang="en-US" sz="6000" dirty="0"/>
+              <a:t>Archi HTML Exported Report </a:t>
             </a:r>
           </a:p>
         </p:txBody>
       </p:sp>
+      <p:sp>
+        <p:nvSpPr>
+          <p:cNvPr id="2" name="TextBox 1">
+            <a:extLst>
+              <a:ext uri="{FF2B5EF4-FFF2-40B4-BE49-F238E27FC236}">
+                <a16:creationId xmlns:a16="http://schemas.microsoft.com/office/drawing/2014/main" id="{9DB1D8F9-0C31-C248-EC96-352920DB57C6}"/>
+              </a:ext>
+            </a:extLst>
+          </p:cNvPr>
+          <p:cNvSpPr txBox="1"/>
+          <p:nvPr/>
+        </p:nvSpPr>
+        <p:spPr>
+          <a:xfrm>
+            <a:off x="313765" y="2832847"/>
+            <a:ext cx="7795253" cy="2246769"/>
+          </a:xfrm>
+          <a:prstGeom prst="rect">
+            <a:avLst/>
+          </a:prstGeom>
+          <a:noFill/>
+        </p:spPr>
+        <p:txBody>
+          <a:bodyPr wrap="square" rtlCol="0">
+            <a:spAutoFit/>
+          </a:bodyPr>
+          <a:lstStyle/>
+          <a:p>
+            <a:pPr marL="342900" indent="-342900">
+              <a:buFont typeface="+mj-lt"/>
+              <a:buAutoNum type="arabicPeriod"/>
+            </a:pPr>
+            <a:r>
+              <a:rPr lang="en-US" sz="2800" dirty="0">
+                <a:solidFill>
+                  <a:schemeClr val="bg1"/>
+                </a:solidFill>
+              </a:rPr>
+              <a:t>Understand Structure of Archi HTML Report</a:t>
+            </a:r>
+          </a:p>
+          <a:p>
+            <a:pPr marL="342900" indent="-342900">
+              <a:buFont typeface="+mj-lt"/>
+              <a:buAutoNum type="arabicPeriod"/>
+            </a:pPr>
+            <a:endParaRPr lang="en-US" sz="2800" dirty="0">
+              <a:solidFill>
+                <a:schemeClr val="bg1"/>
+              </a:solidFill>
+            </a:endParaRPr>
+          </a:p>
+          <a:p>
+            <a:pPr marL="342900" indent="-342900">
+              <a:buFont typeface="+mj-lt"/>
+              <a:buAutoNum type="arabicPeriod"/>
+            </a:pPr>
+            <a:r>
+              <a:rPr lang="en-US" sz="2800" dirty="0">
+                <a:solidFill>
+                  <a:schemeClr val="bg1"/>
+                </a:solidFill>
+              </a:rPr>
+              <a:t>Query in Archi HTML Report with alasql</a:t>
+            </a:r>
+          </a:p>
+          <a:p>
+            <a:pPr marL="342900" indent="-342900">
+              <a:buFont typeface="+mj-lt"/>
+              <a:buAutoNum type="arabicPeriod"/>
+            </a:pPr>
+            <a:endParaRPr lang="en-US" sz="2800" dirty="0">
+              <a:solidFill>
+                <a:schemeClr val="bg1"/>
+              </a:solidFill>
+            </a:endParaRPr>
+          </a:p>
+          <a:p>
+            <a:pPr marL="342900" indent="-342900">
+              <a:buFont typeface="+mj-lt"/>
+              <a:buAutoNum type="arabicPeriod"/>
+            </a:pPr>
+            <a:r>
+              <a:rPr lang="en-US" sz="2800" dirty="0">
+                <a:solidFill>
+                  <a:schemeClr val="bg1"/>
+                </a:solidFill>
+              </a:rPr>
+              <a:t>Analyze Archi HTML Report in Power BI</a:t>
+            </a:r>
+          </a:p>
+        </p:txBody>
+      </p:sp>
+      <p:pic>
+        <p:nvPicPr>
+          <p:cNvPr id="13" name="Picture 12">
+            <a:extLst>
+              <a:ext uri="{FF2B5EF4-FFF2-40B4-BE49-F238E27FC236}">
+                <a16:creationId xmlns:a16="http://schemas.microsoft.com/office/drawing/2014/main" id="{48619332-7888-9ED8-C967-C3FEBCB633C6}"/>
+              </a:ext>
+            </a:extLst>
+          </p:cNvPr>
+          <p:cNvPicPr>
+            <a:picLocks noChangeAspect="1"/>
+          </p:cNvPicPr>
+          <p:nvPr/>
+        </p:nvPicPr>
+        <p:blipFill>
+          <a:blip r:embed="rId5"/>
+          <a:stretch>
+            <a:fillRect/>
+          </a:stretch>
+        </p:blipFill>
+        <p:spPr>
+          <a:xfrm>
+            <a:off x="8142416" y="2926996"/>
+            <a:ext cx="4016188" cy="2431653"/>
+          </a:xfrm>
+          <a:prstGeom prst="rect">
+            <a:avLst/>
+          </a:prstGeom>
+        </p:spPr>
+      </p:pic>
     </p:spTree>
     <p:extLst>
       <p:ext uri="{BB962C8B-B14F-4D97-AF65-F5344CB8AC3E}">
@@ -6588,7 +6628,7 @@
           <a:p>
             <a:r>
               <a:rPr lang="en-US" sz="7200" dirty="0"/>
-              <a:t>Query in Archi HTML Report with alasql</a:t>
+              <a:t>Understand Structure of Archi HTML Report</a:t>
             </a:r>
           </a:p>
         </p:txBody>
@@ -6682,7 +6722,7 @@
         </p:blipFill>
         <p:spPr>
           <a:xfrm>
-            <a:off x="8109019" y="735494"/>
+            <a:off x="8109019" y="-1"/>
             <a:ext cx="4082982" cy="1681945"/>
           </a:xfrm>
           <a:prstGeom prst="rect">
@@ -6718,7 +6758,7 @@
         </p:blipFill>
         <p:spPr>
           <a:xfrm>
-            <a:off x="5127416" y="6160674"/>
+            <a:off x="5067268" y="6069522"/>
             <a:ext cx="2810500" cy="585267"/>
           </a:xfrm>
           <a:prstGeom prst="rect">
@@ -6726,211 +6766,12 @@
           </a:prstGeom>
         </p:spPr>
       </p:pic>
-      <p:sp>
-        <p:nvSpPr>
-          <p:cNvPr id="11" name="Subtitle 7">
-            <a:extLst>
-              <a:ext uri="{FF2B5EF4-FFF2-40B4-BE49-F238E27FC236}">
-                <a16:creationId xmlns:a16="http://schemas.microsoft.com/office/drawing/2014/main" id="{0A296E48-34D5-9752-1051-73F2CA3FF687}"/>
-              </a:ext>
-            </a:extLst>
-          </p:cNvPr>
-          <p:cNvSpPr txBox="1">
-            <a:spLocks/>
-          </p:cNvSpPr>
-          <p:nvPr/>
-        </p:nvSpPr>
-        <p:spPr>
-          <a:xfrm>
-            <a:off x="649045" y="188258"/>
-            <a:ext cx="6437555" cy="699247"/>
-          </a:xfrm>
-          <a:prstGeom prst="rect">
-            <a:avLst/>
-          </a:prstGeom>
-        </p:spPr>
-        <p:txBody>
-          <a:bodyPr vert="horz" lIns="91440" tIns="45720" rIns="91440" bIns="45720" rtlCol="0" anchor="b">
-            <a:normAutofit/>
-          </a:bodyPr>
-          <a:lstStyle>
-            <a:lvl1pPr marL="0" indent="0" algn="l" defTabSz="914400" rtl="0" eaLnBrk="1" latinLnBrk="0" hangingPunct="1">
-              <a:lnSpc>
-                <a:spcPct val="110000"/>
-              </a:lnSpc>
-              <a:spcBef>
-                <a:spcPts val="1000"/>
-              </a:spcBef>
-              <a:buFont typeface="Arial" panose="020B0604020202020204" pitchFamily="34" charset="0"/>
-              <a:buNone/>
-              <a:defRPr sz="2800" b="1" kern="1200" spc="-20" baseline="0">
-                <a:solidFill>
-                  <a:schemeClr val="bg1"/>
-                </a:solidFill>
-                <a:latin typeface="+mn-lt"/>
-                <a:ea typeface="+mn-ea"/>
-                <a:cs typeface="+mn-cs"/>
-              </a:defRPr>
-            </a:lvl1pPr>
-            <a:lvl2pPr marL="685800" indent="-228600" algn="l" defTabSz="914400" rtl="0" eaLnBrk="1" latinLnBrk="0" hangingPunct="1">
-              <a:lnSpc>
-                <a:spcPct val="110000"/>
-              </a:lnSpc>
-              <a:spcBef>
-                <a:spcPts val="500"/>
-              </a:spcBef>
-              <a:buFont typeface="Arial" panose="020B0604020202020204" pitchFamily="34" charset="0"/>
-              <a:buChar char="•"/>
-              <a:defRPr sz="2000" kern="1200" spc="-20" baseline="0">
-                <a:solidFill>
-                  <a:schemeClr val="tx1"/>
-                </a:solidFill>
-                <a:latin typeface="+mn-lt"/>
-                <a:ea typeface="+mn-ea"/>
-                <a:cs typeface="+mn-cs"/>
-              </a:defRPr>
-            </a:lvl2pPr>
-            <a:lvl3pPr marL="1143000" indent="-228600" algn="l" defTabSz="914400" rtl="0" eaLnBrk="1" latinLnBrk="0" hangingPunct="1">
-              <a:lnSpc>
-                <a:spcPct val="110000"/>
-              </a:lnSpc>
-              <a:spcBef>
-                <a:spcPts val="500"/>
-              </a:spcBef>
-              <a:buFont typeface="Arial" panose="020B0604020202020204" pitchFamily="34" charset="0"/>
-              <a:buChar char="•"/>
-              <a:defRPr sz="1800" kern="1200" spc="-20" baseline="0">
-                <a:solidFill>
-                  <a:schemeClr val="tx1"/>
-                </a:solidFill>
-                <a:latin typeface="+mn-lt"/>
-                <a:ea typeface="+mn-ea"/>
-                <a:cs typeface="+mn-cs"/>
-              </a:defRPr>
-            </a:lvl3pPr>
-            <a:lvl4pPr marL="1600200" indent="-228600" algn="l" defTabSz="914400" rtl="0" eaLnBrk="1" latinLnBrk="0" hangingPunct="1">
-              <a:lnSpc>
-                <a:spcPct val="110000"/>
-              </a:lnSpc>
-              <a:spcBef>
-                <a:spcPts val="500"/>
-              </a:spcBef>
-              <a:buFont typeface="Arial" panose="020B0604020202020204" pitchFamily="34" charset="0"/>
-              <a:buChar char="•"/>
-              <a:defRPr sz="1600" kern="1200" spc="-20" baseline="0">
-                <a:solidFill>
-                  <a:schemeClr val="tx1"/>
-                </a:solidFill>
-                <a:latin typeface="+mn-lt"/>
-                <a:ea typeface="+mn-ea"/>
-                <a:cs typeface="+mn-cs"/>
-              </a:defRPr>
-            </a:lvl4pPr>
-            <a:lvl5pPr marL="2057400" indent="-228600" algn="l" defTabSz="914400" rtl="0" eaLnBrk="1" latinLnBrk="0" hangingPunct="1">
-              <a:lnSpc>
-                <a:spcPct val="110000"/>
-              </a:lnSpc>
-              <a:spcBef>
-                <a:spcPts val="500"/>
-              </a:spcBef>
-              <a:buFont typeface="Arial" panose="020B0604020202020204" pitchFamily="34" charset="0"/>
-              <a:buChar char="•"/>
-              <a:defRPr sz="1600" kern="1200" spc="-20" baseline="0">
-                <a:solidFill>
-                  <a:schemeClr val="tx1"/>
-                </a:solidFill>
-                <a:latin typeface="+mn-lt"/>
-                <a:ea typeface="+mn-ea"/>
-                <a:cs typeface="+mn-cs"/>
-              </a:defRPr>
-            </a:lvl5pPr>
-            <a:lvl6pPr marL="2514600" indent="-228600" algn="l" defTabSz="914400" rtl="0" eaLnBrk="1" latinLnBrk="0" hangingPunct="1">
-              <a:lnSpc>
-                <a:spcPct val="90000"/>
-              </a:lnSpc>
-              <a:spcBef>
-                <a:spcPts val="500"/>
-              </a:spcBef>
-              <a:buFont typeface="Arial" panose="020B0604020202020204" pitchFamily="34" charset="0"/>
-              <a:buChar char="•"/>
-              <a:defRPr sz="1800" kern="1200">
-                <a:solidFill>
-                  <a:schemeClr val="tx1"/>
-                </a:solidFill>
-                <a:latin typeface="+mn-lt"/>
-                <a:ea typeface="+mn-ea"/>
-                <a:cs typeface="+mn-cs"/>
-              </a:defRPr>
-            </a:lvl6pPr>
-            <a:lvl7pPr marL="2971800" indent="-228600" algn="l" defTabSz="914400" rtl="0" eaLnBrk="1" latinLnBrk="0" hangingPunct="1">
-              <a:lnSpc>
-                <a:spcPct val="90000"/>
-              </a:lnSpc>
-              <a:spcBef>
-                <a:spcPts val="500"/>
-              </a:spcBef>
-              <a:buFont typeface="Arial" panose="020B0604020202020204" pitchFamily="34" charset="0"/>
-              <a:buChar char="•"/>
-              <a:defRPr sz="1800" kern="1200">
-                <a:solidFill>
-                  <a:schemeClr val="tx1"/>
-                </a:solidFill>
-                <a:latin typeface="+mn-lt"/>
-                <a:ea typeface="+mn-ea"/>
-                <a:cs typeface="+mn-cs"/>
-              </a:defRPr>
-            </a:lvl7pPr>
-            <a:lvl8pPr marL="3429000" indent="-228600" algn="l" defTabSz="914400" rtl="0" eaLnBrk="1" latinLnBrk="0" hangingPunct="1">
-              <a:lnSpc>
-                <a:spcPct val="90000"/>
-              </a:lnSpc>
-              <a:spcBef>
-                <a:spcPts val="500"/>
-              </a:spcBef>
-              <a:buFont typeface="Arial" panose="020B0604020202020204" pitchFamily="34" charset="0"/>
-              <a:buChar char="•"/>
-              <a:defRPr sz="1800" kern="1200">
-                <a:solidFill>
-                  <a:schemeClr val="tx1"/>
-                </a:solidFill>
-                <a:latin typeface="+mn-lt"/>
-                <a:ea typeface="+mn-ea"/>
-                <a:cs typeface="+mn-cs"/>
-              </a:defRPr>
-            </a:lvl8pPr>
-            <a:lvl9pPr marL="3886200" indent="-228600" algn="l" defTabSz="914400" rtl="0" eaLnBrk="1" latinLnBrk="0" hangingPunct="1">
-              <a:lnSpc>
-                <a:spcPct val="90000"/>
-              </a:lnSpc>
-              <a:spcBef>
-                <a:spcPts val="500"/>
-              </a:spcBef>
-              <a:buFont typeface="Arial" panose="020B0604020202020204" pitchFamily="34" charset="0"/>
-              <a:buChar char="•"/>
-              <a:defRPr sz="1800" kern="1200">
-                <a:solidFill>
-                  <a:schemeClr val="tx1"/>
-                </a:solidFill>
-                <a:latin typeface="+mn-lt"/>
-                <a:ea typeface="+mn-ea"/>
-                <a:cs typeface="+mn-cs"/>
-              </a:defRPr>
-            </a:lvl9pPr>
-          </a:lstStyle>
-          <a:p>
-            <a:r>
-              <a:rPr lang="en-US" dirty="0"/>
-              <a:t>Archi HTML Report - 02</a:t>
-            </a:r>
-          </a:p>
-        </p:txBody>
-      </p:sp>
       <p:pic>
         <p:nvPicPr>
-          <p:cNvPr id="6" name="Picture 5">
-            <a:extLst>
-              <a:ext uri="{FF2B5EF4-FFF2-40B4-BE49-F238E27FC236}">
-                <a16:creationId xmlns:a16="http://schemas.microsoft.com/office/drawing/2014/main" id="{7A485DB7-FE17-B65F-3B6D-17F1A31DED1E}"/>
+          <p:cNvPr id="4" name="Picture 3">
+            <a:extLst>
+              <a:ext uri="{FF2B5EF4-FFF2-40B4-BE49-F238E27FC236}">
+                <a16:creationId xmlns:a16="http://schemas.microsoft.com/office/drawing/2014/main" id="{7534C8A3-84CE-B0B0-067B-F18BC9A7188D}"/>
               </a:ext>
             </a:extLst>
           </p:cNvPr>
@@ -6958,6 +6799,653 @@
         </p:blipFill>
         <p:spPr>
           <a:xfrm>
+            <a:off x="6472518" y="2215273"/>
+            <a:ext cx="5428411" cy="3082240"/>
+          </a:xfrm>
+          <a:prstGeom prst="rect">
+            <a:avLst/>
+          </a:prstGeom>
+          <a:ln>
+            <a:noFill/>
+          </a:ln>
+          <a:effectLst>
+            <a:outerShdw blurRad="292100" dist="139700" dir="2700000" algn="tl" rotWithShape="0">
+              <a:srgbClr val="333333">
+                <a:alpha val="65000"/>
+              </a:srgbClr>
+            </a:outerShdw>
+          </a:effectLst>
+        </p:spPr>
+      </p:pic>
+      <p:sp>
+        <p:nvSpPr>
+          <p:cNvPr id="11" name="Subtitle 7">
+            <a:extLst>
+              <a:ext uri="{FF2B5EF4-FFF2-40B4-BE49-F238E27FC236}">
+                <a16:creationId xmlns:a16="http://schemas.microsoft.com/office/drawing/2014/main" id="{0A296E48-34D5-9752-1051-73F2CA3FF687}"/>
+              </a:ext>
+            </a:extLst>
+          </p:cNvPr>
+          <p:cNvSpPr txBox="1">
+            <a:spLocks/>
+          </p:cNvSpPr>
+          <p:nvPr/>
+        </p:nvSpPr>
+        <p:spPr>
+          <a:xfrm>
+            <a:off x="649045" y="188258"/>
+            <a:ext cx="6437555" cy="699247"/>
+          </a:xfrm>
+          <a:prstGeom prst="rect">
+            <a:avLst/>
+          </a:prstGeom>
+        </p:spPr>
+        <p:txBody>
+          <a:bodyPr vert="horz" lIns="91440" tIns="45720" rIns="91440" bIns="45720" rtlCol="0" anchor="b">
+            <a:normAutofit/>
+          </a:bodyPr>
+          <a:lstStyle>
+            <a:lvl1pPr marL="0" indent="0" algn="l" defTabSz="914400" rtl="0" eaLnBrk="1" latinLnBrk="0" hangingPunct="1">
+              <a:lnSpc>
+                <a:spcPct val="110000"/>
+              </a:lnSpc>
+              <a:spcBef>
+                <a:spcPts val="1000"/>
+              </a:spcBef>
+              <a:buFont typeface="Arial" panose="020B0604020202020204" pitchFamily="34" charset="0"/>
+              <a:buNone/>
+              <a:defRPr sz="2800" b="1" kern="1200" spc="-20" baseline="0">
+                <a:solidFill>
+                  <a:schemeClr val="bg1"/>
+                </a:solidFill>
+                <a:latin typeface="+mn-lt"/>
+                <a:ea typeface="+mn-ea"/>
+                <a:cs typeface="+mn-cs"/>
+              </a:defRPr>
+            </a:lvl1pPr>
+            <a:lvl2pPr marL="685800" indent="-228600" algn="l" defTabSz="914400" rtl="0" eaLnBrk="1" latinLnBrk="0" hangingPunct="1">
+              <a:lnSpc>
+                <a:spcPct val="110000"/>
+              </a:lnSpc>
+              <a:spcBef>
+                <a:spcPts val="500"/>
+              </a:spcBef>
+              <a:buFont typeface="Arial" panose="020B0604020202020204" pitchFamily="34" charset="0"/>
+              <a:buChar char="•"/>
+              <a:defRPr sz="2000" kern="1200" spc="-20" baseline="0">
+                <a:solidFill>
+                  <a:schemeClr val="tx1"/>
+                </a:solidFill>
+                <a:latin typeface="+mn-lt"/>
+                <a:ea typeface="+mn-ea"/>
+                <a:cs typeface="+mn-cs"/>
+              </a:defRPr>
+            </a:lvl2pPr>
+            <a:lvl3pPr marL="1143000" indent="-228600" algn="l" defTabSz="914400" rtl="0" eaLnBrk="1" latinLnBrk="0" hangingPunct="1">
+              <a:lnSpc>
+                <a:spcPct val="110000"/>
+              </a:lnSpc>
+              <a:spcBef>
+                <a:spcPts val="500"/>
+              </a:spcBef>
+              <a:buFont typeface="Arial" panose="020B0604020202020204" pitchFamily="34" charset="0"/>
+              <a:buChar char="•"/>
+              <a:defRPr sz="1800" kern="1200" spc="-20" baseline="0">
+                <a:solidFill>
+                  <a:schemeClr val="tx1"/>
+                </a:solidFill>
+                <a:latin typeface="+mn-lt"/>
+                <a:ea typeface="+mn-ea"/>
+                <a:cs typeface="+mn-cs"/>
+              </a:defRPr>
+            </a:lvl3pPr>
+            <a:lvl4pPr marL="1600200" indent="-228600" algn="l" defTabSz="914400" rtl="0" eaLnBrk="1" latinLnBrk="0" hangingPunct="1">
+              <a:lnSpc>
+                <a:spcPct val="110000"/>
+              </a:lnSpc>
+              <a:spcBef>
+                <a:spcPts val="500"/>
+              </a:spcBef>
+              <a:buFont typeface="Arial" panose="020B0604020202020204" pitchFamily="34" charset="0"/>
+              <a:buChar char="•"/>
+              <a:defRPr sz="1600" kern="1200" spc="-20" baseline="0">
+                <a:solidFill>
+                  <a:schemeClr val="tx1"/>
+                </a:solidFill>
+                <a:latin typeface="+mn-lt"/>
+                <a:ea typeface="+mn-ea"/>
+                <a:cs typeface="+mn-cs"/>
+              </a:defRPr>
+            </a:lvl4pPr>
+            <a:lvl5pPr marL="2057400" indent="-228600" algn="l" defTabSz="914400" rtl="0" eaLnBrk="1" latinLnBrk="0" hangingPunct="1">
+              <a:lnSpc>
+                <a:spcPct val="110000"/>
+              </a:lnSpc>
+              <a:spcBef>
+                <a:spcPts val="500"/>
+              </a:spcBef>
+              <a:buFont typeface="Arial" panose="020B0604020202020204" pitchFamily="34" charset="0"/>
+              <a:buChar char="•"/>
+              <a:defRPr sz="1600" kern="1200" spc="-20" baseline="0">
+                <a:solidFill>
+                  <a:schemeClr val="tx1"/>
+                </a:solidFill>
+                <a:latin typeface="+mn-lt"/>
+                <a:ea typeface="+mn-ea"/>
+                <a:cs typeface="+mn-cs"/>
+              </a:defRPr>
+            </a:lvl5pPr>
+            <a:lvl6pPr marL="2514600" indent="-228600" algn="l" defTabSz="914400" rtl="0" eaLnBrk="1" latinLnBrk="0" hangingPunct="1">
+              <a:lnSpc>
+                <a:spcPct val="90000"/>
+              </a:lnSpc>
+              <a:spcBef>
+                <a:spcPts val="500"/>
+              </a:spcBef>
+              <a:buFont typeface="Arial" panose="020B0604020202020204" pitchFamily="34" charset="0"/>
+              <a:buChar char="•"/>
+              <a:defRPr sz="1800" kern="1200">
+                <a:solidFill>
+                  <a:schemeClr val="tx1"/>
+                </a:solidFill>
+                <a:latin typeface="+mn-lt"/>
+                <a:ea typeface="+mn-ea"/>
+                <a:cs typeface="+mn-cs"/>
+              </a:defRPr>
+            </a:lvl6pPr>
+            <a:lvl7pPr marL="2971800" indent="-228600" algn="l" defTabSz="914400" rtl="0" eaLnBrk="1" latinLnBrk="0" hangingPunct="1">
+              <a:lnSpc>
+                <a:spcPct val="90000"/>
+              </a:lnSpc>
+              <a:spcBef>
+                <a:spcPts val="500"/>
+              </a:spcBef>
+              <a:buFont typeface="Arial" panose="020B0604020202020204" pitchFamily="34" charset="0"/>
+              <a:buChar char="•"/>
+              <a:defRPr sz="1800" kern="1200">
+                <a:solidFill>
+                  <a:schemeClr val="tx1"/>
+                </a:solidFill>
+                <a:latin typeface="+mn-lt"/>
+                <a:ea typeface="+mn-ea"/>
+                <a:cs typeface="+mn-cs"/>
+              </a:defRPr>
+            </a:lvl7pPr>
+            <a:lvl8pPr marL="3429000" indent="-228600" algn="l" defTabSz="914400" rtl="0" eaLnBrk="1" latinLnBrk="0" hangingPunct="1">
+              <a:lnSpc>
+                <a:spcPct val="90000"/>
+              </a:lnSpc>
+              <a:spcBef>
+                <a:spcPts val="500"/>
+              </a:spcBef>
+              <a:buFont typeface="Arial" panose="020B0604020202020204" pitchFamily="34" charset="0"/>
+              <a:buChar char="•"/>
+              <a:defRPr sz="1800" kern="1200">
+                <a:solidFill>
+                  <a:schemeClr val="tx1"/>
+                </a:solidFill>
+                <a:latin typeface="+mn-lt"/>
+                <a:ea typeface="+mn-ea"/>
+                <a:cs typeface="+mn-cs"/>
+              </a:defRPr>
+            </a:lvl8pPr>
+            <a:lvl9pPr marL="3886200" indent="-228600" algn="l" defTabSz="914400" rtl="0" eaLnBrk="1" latinLnBrk="0" hangingPunct="1">
+              <a:lnSpc>
+                <a:spcPct val="90000"/>
+              </a:lnSpc>
+              <a:spcBef>
+                <a:spcPts val="500"/>
+              </a:spcBef>
+              <a:buFont typeface="Arial" panose="020B0604020202020204" pitchFamily="34" charset="0"/>
+              <a:buChar char="•"/>
+              <a:defRPr sz="1800" kern="1200">
+                <a:solidFill>
+                  <a:schemeClr val="tx1"/>
+                </a:solidFill>
+                <a:latin typeface="+mn-lt"/>
+                <a:ea typeface="+mn-ea"/>
+                <a:cs typeface="+mn-cs"/>
+              </a:defRPr>
+            </a:lvl9pPr>
+          </a:lstStyle>
+          <a:p>
+            <a:r>
+              <a:rPr lang="en-US" dirty="0"/>
+              <a:t>Archi HTML Report - 01</a:t>
+            </a:r>
+          </a:p>
+        </p:txBody>
+      </p:sp>
+    </p:spTree>
+    <p:extLst>
+      <p:ext uri="{BB962C8B-B14F-4D97-AF65-F5344CB8AC3E}">
+        <p14:creationId xmlns:p14="http://schemas.microsoft.com/office/powerpoint/2010/main" val="3612957953"/>
+      </p:ext>
+    </p:extLst>
+  </p:cSld>
+  <p:clrMapOvr>
+    <a:masterClrMapping/>
+  </p:clrMapOvr>
+</p:sld>
+</file>
+
+<file path=ppt/slides/slide3.xml><?xml version="1.0" encoding="utf-8"?>
+<p:sld xmlns:a="http://schemas.openxmlformats.org/drawingml/2006/main" xmlns:r="http://schemas.openxmlformats.org/officeDocument/2006/relationships" xmlns:p="http://schemas.openxmlformats.org/presentationml/2006/main">
+  <p:cSld>
+    <p:spTree>
+      <p:nvGrpSpPr>
+        <p:cNvPr id="1" name=""/>
+        <p:cNvGrpSpPr/>
+        <p:nvPr/>
+      </p:nvGrpSpPr>
+      <p:grpSpPr>
+        <a:xfrm>
+          <a:off x="0" y="0"/>
+          <a:ext cx="0" cy="0"/>
+          <a:chOff x="0" y="0"/>
+          <a:chExt cx="0" cy="0"/>
+        </a:xfrm>
+      </p:grpSpPr>
+      <p:sp>
+        <p:nvSpPr>
+          <p:cNvPr id="7" name="Title 6">
+            <a:extLst>
+              <a:ext uri="{FF2B5EF4-FFF2-40B4-BE49-F238E27FC236}">
+                <a16:creationId xmlns:a16="http://schemas.microsoft.com/office/drawing/2014/main" id="{98D150CF-F888-48EA-89E8-311ED5E9161B}"/>
+              </a:ext>
+            </a:extLst>
+          </p:cNvPr>
+          <p:cNvSpPr>
+            <a:spLocks noGrp="1"/>
+          </p:cNvSpPr>
+          <p:nvPr>
+            <p:ph type="ctrTitle"/>
+          </p:nvPr>
+        </p:nvSpPr>
+        <p:spPr>
+          <a:xfrm>
+            <a:off x="649044" y="1308846"/>
+            <a:ext cx="6815446" cy="4078942"/>
+          </a:xfrm>
+        </p:spPr>
+        <p:txBody>
+          <a:bodyPr>
+            <a:noAutofit/>
+          </a:bodyPr>
+          <a:lstStyle/>
+          <a:p>
+            <a:r>
+              <a:rPr lang="en-US" sz="7200" dirty="0"/>
+              <a:t>Query in Archi HTML Report with alasql</a:t>
+            </a:r>
+          </a:p>
+        </p:txBody>
+      </p:sp>
+      <p:sp>
+        <p:nvSpPr>
+          <p:cNvPr id="8" name="Subtitle 7">
+            <a:extLst>
+              <a:ext uri="{FF2B5EF4-FFF2-40B4-BE49-F238E27FC236}">
+                <a16:creationId xmlns:a16="http://schemas.microsoft.com/office/drawing/2014/main" id="{6BBE0348-1527-4055-BA8A-E2754222743D}"/>
+              </a:ext>
+            </a:extLst>
+          </p:cNvPr>
+          <p:cNvSpPr>
+            <a:spLocks noGrp="1"/>
+          </p:cNvSpPr>
+          <p:nvPr>
+            <p:ph type="subTitle" idx="1"/>
+          </p:nvPr>
+        </p:nvSpPr>
+        <p:spPr>
+          <a:xfrm>
+            <a:off x="649045" y="4640424"/>
+            <a:ext cx="6437555" cy="1303176"/>
+          </a:xfrm>
+        </p:spPr>
+        <p:txBody>
+          <a:bodyPr/>
+          <a:lstStyle/>
+          <a:p>
+            <a:r>
+              <a:rPr lang="en-US" dirty="0"/>
+              <a:t>Xiaoqi Zhao</a:t>
+            </a:r>
+          </a:p>
+        </p:txBody>
+      </p:sp>
+      <p:pic>
+        <p:nvPicPr>
+          <p:cNvPr id="5" name="Picture Placeholder 4" descr="A picture containing mountain, sky, outdoor, nature, sunrise ">
+            <a:extLst>
+              <a:ext uri="{FF2B5EF4-FFF2-40B4-BE49-F238E27FC236}">
+                <a16:creationId xmlns:a16="http://schemas.microsoft.com/office/drawing/2014/main" id="{A33E67C0-6C95-48DB-97CC-8CE8D36C05FB}"/>
+              </a:ext>
+            </a:extLst>
+          </p:cNvPr>
+          <p:cNvPicPr>
+            <a:picLocks noGrp="1" noChangeAspect="1"/>
+          </p:cNvPicPr>
+          <p:nvPr>
+            <p:ph type="pic" sz="quarter" idx="13"/>
+          </p:nvPr>
+        </p:nvPicPr>
+        <p:blipFill rotWithShape="1">
+          <a:blip r:embed="rId2" cstate="screen">
+            <a:extLst>
+              <a:ext uri="{28A0092B-C50C-407E-A947-70E740481C1C}">
+                <a14:useLocalDpi xmlns:a14="http://schemas.microsoft.com/office/drawing/2010/main" val="0"/>
+              </a:ext>
+            </a:extLst>
+          </a:blip>
+          <a:srcRect/>
+          <a:stretch/>
+        </p:blipFill>
+        <p:spPr>
+          <a:xfrm>
+            <a:off x="8113533" y="0"/>
+            <a:ext cx="4082983" cy="6858000"/>
+          </a:xfrm>
+        </p:spPr>
+      </p:pic>
+      <p:pic>
+        <p:nvPicPr>
+          <p:cNvPr id="3" name="Picture 2">
+            <a:extLst>
+              <a:ext uri="{FF2B5EF4-FFF2-40B4-BE49-F238E27FC236}">
+                <a16:creationId xmlns:a16="http://schemas.microsoft.com/office/drawing/2014/main" id="{756D21F7-A362-AE48-D9A5-F9171E9EB524}"/>
+              </a:ext>
+            </a:extLst>
+          </p:cNvPr>
+          <p:cNvPicPr>
+            <a:picLocks noChangeAspect="1"/>
+          </p:cNvPicPr>
+          <p:nvPr/>
+        </p:nvPicPr>
+        <p:blipFill>
+          <a:blip r:embed="rId3"/>
+          <a:stretch>
+            <a:fillRect/>
+          </a:stretch>
+        </p:blipFill>
+        <p:spPr>
+          <a:xfrm>
+            <a:off x="8109019" y="735494"/>
+            <a:ext cx="4082982" cy="1681945"/>
+          </a:xfrm>
+          <a:prstGeom prst="rect">
+            <a:avLst/>
+          </a:prstGeom>
+          <a:ln>
+            <a:noFill/>
+          </a:ln>
+          <a:effectLst>
+            <a:softEdge rad="112500"/>
+          </a:effectLst>
+        </p:spPr>
+      </p:pic>
+      <p:pic>
+        <p:nvPicPr>
+          <p:cNvPr id="9" name="Picture 8">
+            <a:extLst>
+              <a:ext uri="{FF2B5EF4-FFF2-40B4-BE49-F238E27FC236}">
+                <a16:creationId xmlns:a16="http://schemas.microsoft.com/office/drawing/2014/main" id="{B60FC8E2-5059-EEBF-EEEC-C935DD9B8DE2}"/>
+              </a:ext>
+            </a:extLst>
+          </p:cNvPr>
+          <p:cNvPicPr>
+            <a:picLocks noChangeAspect="1"/>
+          </p:cNvPicPr>
+          <p:nvPr/>
+        </p:nvPicPr>
+        <p:blipFill>
+          <a:blip r:embed="rId4"/>
+          <a:stretch>
+            <a:fillRect/>
+          </a:stretch>
+        </p:blipFill>
+        <p:spPr>
+          <a:xfrm>
+            <a:off x="5127416" y="6160674"/>
+            <a:ext cx="2810500" cy="585267"/>
+          </a:xfrm>
+          <a:prstGeom prst="rect">
+            <a:avLst/>
+          </a:prstGeom>
+        </p:spPr>
+      </p:pic>
+      <p:sp>
+        <p:nvSpPr>
+          <p:cNvPr id="11" name="Subtitle 7">
+            <a:extLst>
+              <a:ext uri="{FF2B5EF4-FFF2-40B4-BE49-F238E27FC236}">
+                <a16:creationId xmlns:a16="http://schemas.microsoft.com/office/drawing/2014/main" id="{0A296E48-34D5-9752-1051-73F2CA3FF687}"/>
+              </a:ext>
+            </a:extLst>
+          </p:cNvPr>
+          <p:cNvSpPr txBox="1">
+            <a:spLocks/>
+          </p:cNvSpPr>
+          <p:nvPr/>
+        </p:nvSpPr>
+        <p:spPr>
+          <a:xfrm>
+            <a:off x="649045" y="188258"/>
+            <a:ext cx="6437555" cy="699247"/>
+          </a:xfrm>
+          <a:prstGeom prst="rect">
+            <a:avLst/>
+          </a:prstGeom>
+        </p:spPr>
+        <p:txBody>
+          <a:bodyPr vert="horz" lIns="91440" tIns="45720" rIns="91440" bIns="45720" rtlCol="0" anchor="b">
+            <a:normAutofit/>
+          </a:bodyPr>
+          <a:lstStyle>
+            <a:lvl1pPr marL="0" indent="0" algn="l" defTabSz="914400" rtl="0" eaLnBrk="1" latinLnBrk="0" hangingPunct="1">
+              <a:lnSpc>
+                <a:spcPct val="110000"/>
+              </a:lnSpc>
+              <a:spcBef>
+                <a:spcPts val="1000"/>
+              </a:spcBef>
+              <a:buFont typeface="Arial" panose="020B0604020202020204" pitchFamily="34" charset="0"/>
+              <a:buNone/>
+              <a:defRPr sz="2800" b="1" kern="1200" spc="-20" baseline="0">
+                <a:solidFill>
+                  <a:schemeClr val="bg1"/>
+                </a:solidFill>
+                <a:latin typeface="+mn-lt"/>
+                <a:ea typeface="+mn-ea"/>
+                <a:cs typeface="+mn-cs"/>
+              </a:defRPr>
+            </a:lvl1pPr>
+            <a:lvl2pPr marL="685800" indent="-228600" algn="l" defTabSz="914400" rtl="0" eaLnBrk="1" latinLnBrk="0" hangingPunct="1">
+              <a:lnSpc>
+                <a:spcPct val="110000"/>
+              </a:lnSpc>
+              <a:spcBef>
+                <a:spcPts val="500"/>
+              </a:spcBef>
+              <a:buFont typeface="Arial" panose="020B0604020202020204" pitchFamily="34" charset="0"/>
+              <a:buChar char="•"/>
+              <a:defRPr sz="2000" kern="1200" spc="-20" baseline="0">
+                <a:solidFill>
+                  <a:schemeClr val="tx1"/>
+                </a:solidFill>
+                <a:latin typeface="+mn-lt"/>
+                <a:ea typeface="+mn-ea"/>
+                <a:cs typeface="+mn-cs"/>
+              </a:defRPr>
+            </a:lvl2pPr>
+            <a:lvl3pPr marL="1143000" indent="-228600" algn="l" defTabSz="914400" rtl="0" eaLnBrk="1" latinLnBrk="0" hangingPunct="1">
+              <a:lnSpc>
+                <a:spcPct val="110000"/>
+              </a:lnSpc>
+              <a:spcBef>
+                <a:spcPts val="500"/>
+              </a:spcBef>
+              <a:buFont typeface="Arial" panose="020B0604020202020204" pitchFamily="34" charset="0"/>
+              <a:buChar char="•"/>
+              <a:defRPr sz="1800" kern="1200" spc="-20" baseline="0">
+                <a:solidFill>
+                  <a:schemeClr val="tx1"/>
+                </a:solidFill>
+                <a:latin typeface="+mn-lt"/>
+                <a:ea typeface="+mn-ea"/>
+                <a:cs typeface="+mn-cs"/>
+              </a:defRPr>
+            </a:lvl3pPr>
+            <a:lvl4pPr marL="1600200" indent="-228600" algn="l" defTabSz="914400" rtl="0" eaLnBrk="1" latinLnBrk="0" hangingPunct="1">
+              <a:lnSpc>
+                <a:spcPct val="110000"/>
+              </a:lnSpc>
+              <a:spcBef>
+                <a:spcPts val="500"/>
+              </a:spcBef>
+              <a:buFont typeface="Arial" panose="020B0604020202020204" pitchFamily="34" charset="0"/>
+              <a:buChar char="•"/>
+              <a:defRPr sz="1600" kern="1200" spc="-20" baseline="0">
+                <a:solidFill>
+                  <a:schemeClr val="tx1"/>
+                </a:solidFill>
+                <a:latin typeface="+mn-lt"/>
+                <a:ea typeface="+mn-ea"/>
+                <a:cs typeface="+mn-cs"/>
+              </a:defRPr>
+            </a:lvl4pPr>
+            <a:lvl5pPr marL="2057400" indent="-228600" algn="l" defTabSz="914400" rtl="0" eaLnBrk="1" latinLnBrk="0" hangingPunct="1">
+              <a:lnSpc>
+                <a:spcPct val="110000"/>
+              </a:lnSpc>
+              <a:spcBef>
+                <a:spcPts val="500"/>
+              </a:spcBef>
+              <a:buFont typeface="Arial" panose="020B0604020202020204" pitchFamily="34" charset="0"/>
+              <a:buChar char="•"/>
+              <a:defRPr sz="1600" kern="1200" spc="-20" baseline="0">
+                <a:solidFill>
+                  <a:schemeClr val="tx1"/>
+                </a:solidFill>
+                <a:latin typeface="+mn-lt"/>
+                <a:ea typeface="+mn-ea"/>
+                <a:cs typeface="+mn-cs"/>
+              </a:defRPr>
+            </a:lvl5pPr>
+            <a:lvl6pPr marL="2514600" indent="-228600" algn="l" defTabSz="914400" rtl="0" eaLnBrk="1" latinLnBrk="0" hangingPunct="1">
+              <a:lnSpc>
+                <a:spcPct val="90000"/>
+              </a:lnSpc>
+              <a:spcBef>
+                <a:spcPts val="500"/>
+              </a:spcBef>
+              <a:buFont typeface="Arial" panose="020B0604020202020204" pitchFamily="34" charset="0"/>
+              <a:buChar char="•"/>
+              <a:defRPr sz="1800" kern="1200">
+                <a:solidFill>
+                  <a:schemeClr val="tx1"/>
+                </a:solidFill>
+                <a:latin typeface="+mn-lt"/>
+                <a:ea typeface="+mn-ea"/>
+                <a:cs typeface="+mn-cs"/>
+              </a:defRPr>
+            </a:lvl6pPr>
+            <a:lvl7pPr marL="2971800" indent="-228600" algn="l" defTabSz="914400" rtl="0" eaLnBrk="1" latinLnBrk="0" hangingPunct="1">
+              <a:lnSpc>
+                <a:spcPct val="90000"/>
+              </a:lnSpc>
+              <a:spcBef>
+                <a:spcPts val="500"/>
+              </a:spcBef>
+              <a:buFont typeface="Arial" panose="020B0604020202020204" pitchFamily="34" charset="0"/>
+              <a:buChar char="•"/>
+              <a:defRPr sz="1800" kern="1200">
+                <a:solidFill>
+                  <a:schemeClr val="tx1"/>
+                </a:solidFill>
+                <a:latin typeface="+mn-lt"/>
+                <a:ea typeface="+mn-ea"/>
+                <a:cs typeface="+mn-cs"/>
+              </a:defRPr>
+            </a:lvl7pPr>
+            <a:lvl8pPr marL="3429000" indent="-228600" algn="l" defTabSz="914400" rtl="0" eaLnBrk="1" latinLnBrk="0" hangingPunct="1">
+              <a:lnSpc>
+                <a:spcPct val="90000"/>
+              </a:lnSpc>
+              <a:spcBef>
+                <a:spcPts val="500"/>
+              </a:spcBef>
+              <a:buFont typeface="Arial" panose="020B0604020202020204" pitchFamily="34" charset="0"/>
+              <a:buChar char="•"/>
+              <a:defRPr sz="1800" kern="1200">
+                <a:solidFill>
+                  <a:schemeClr val="tx1"/>
+                </a:solidFill>
+                <a:latin typeface="+mn-lt"/>
+                <a:ea typeface="+mn-ea"/>
+                <a:cs typeface="+mn-cs"/>
+              </a:defRPr>
+            </a:lvl8pPr>
+            <a:lvl9pPr marL="3886200" indent="-228600" algn="l" defTabSz="914400" rtl="0" eaLnBrk="1" latinLnBrk="0" hangingPunct="1">
+              <a:lnSpc>
+                <a:spcPct val="90000"/>
+              </a:lnSpc>
+              <a:spcBef>
+                <a:spcPts val="500"/>
+              </a:spcBef>
+              <a:buFont typeface="Arial" panose="020B0604020202020204" pitchFamily="34" charset="0"/>
+              <a:buChar char="•"/>
+              <a:defRPr sz="1800" kern="1200">
+                <a:solidFill>
+                  <a:schemeClr val="tx1"/>
+                </a:solidFill>
+                <a:latin typeface="+mn-lt"/>
+                <a:ea typeface="+mn-ea"/>
+                <a:cs typeface="+mn-cs"/>
+              </a:defRPr>
+            </a:lvl9pPr>
+          </a:lstStyle>
+          <a:p>
+            <a:r>
+              <a:rPr lang="en-US" dirty="0"/>
+              <a:t>Archi HTML Report - 02</a:t>
+            </a:r>
+          </a:p>
+        </p:txBody>
+      </p:sp>
+      <p:pic>
+        <p:nvPicPr>
+          <p:cNvPr id="6" name="Picture 5">
+            <a:extLst>
+              <a:ext uri="{FF2B5EF4-FFF2-40B4-BE49-F238E27FC236}">
+                <a16:creationId xmlns:a16="http://schemas.microsoft.com/office/drawing/2014/main" id="{7A485DB7-FE17-B65F-3B6D-17F1A31DED1E}"/>
+              </a:ext>
+            </a:extLst>
+          </p:cNvPr>
+          <p:cNvPicPr>
+            <a:picLocks noChangeAspect="1"/>
+          </p:cNvPicPr>
+          <p:nvPr/>
+        </p:nvPicPr>
+        <p:blipFill>
+          <a:blip r:embed="rId5">
+            <a:clrChange>
+              <a:clrFrom>
+                <a:srgbClr val="F9F9F8"/>
+              </a:clrFrom>
+              <a:clrTo>
+                <a:srgbClr val="F9F9F8">
+                  <a:alpha val="0"/>
+                </a:srgbClr>
+              </a:clrTo>
+            </a:clrChange>
+          </a:blip>
+          <a:stretch>
+            <a:fillRect/>
+          </a:stretch>
+        </p:blipFill>
+        <p:spPr>
+          <a:xfrm>
             <a:off x="5754445" y="2908589"/>
             <a:ext cx="6437555" cy="2383423"/>
           </a:xfrm>
@@ -7091,7 +7579,7 @@
 </p:sld>
 </file>
 
-<file path=ppt/slides/slide3.xml><?xml version="1.0" encoding="utf-8"?>
+<file path=ppt/slides/slide4.xml><?xml version="1.0" encoding="utf-8"?>
 <p:sld xmlns:a="http://schemas.openxmlformats.org/drawingml/2006/main" xmlns:r="http://schemas.openxmlformats.org/officeDocument/2006/relationships" xmlns:p="http://schemas.openxmlformats.org/presentationml/2006/main">
   <p:cSld>
     <p:spTree>
@@ -8376,34 +8864,6 @@
 </file>
 
 <file path=customXml/item1.xml><?xml version="1.0" encoding="utf-8"?>
-<p:properties xmlns:p="http://schemas.microsoft.com/office/2006/metadata/properties" xmlns:xsi="http://www.w3.org/2001/XMLSchema-instance" xmlns:pc="http://schemas.microsoft.com/office/infopath/2007/PartnerControls">
-  <documentManagement>
-    <Status xmlns="71af3243-3dd4-4a8d-8c0d-dd76da1f02a5">Not started</Status>
-    <_ip_UnifiedCompliancePolicyUIAction xmlns="http://schemas.microsoft.com/sharepoint/v3" xsi:nil="true"/>
-    <Image xmlns="71af3243-3dd4-4a8d-8c0d-dd76da1f02a5">
-      <Url xsi:nil="true"/>
-      <Description xsi:nil="true"/>
-    </Image>
-    <_ip_UnifiedCompliancePolicyProperties xmlns="http://schemas.microsoft.com/sharepoint/v3" xsi:nil="true"/>
-    <ImageTagsTaxHTField xmlns="71af3243-3dd4-4a8d-8c0d-dd76da1f02a5">
-      <Terms xmlns="http://schemas.microsoft.com/office/infopath/2007/PartnerControls"/>
-    </ImageTagsTaxHTField>
-    <TaxCatchAll xmlns="230e9df3-be65-4c73-a93b-d1236ebd677e"/>
-    <MediaServiceKeyPoints xmlns="71af3243-3dd4-4a8d-8c0d-dd76da1f02a5" xsi:nil="true"/>
-  </documentManagement>
-</p:properties>
-</file>
-
-<file path=customXml/item2.xml><?xml version="1.0" encoding="utf-8"?>
-<?mso-contentType ?>
-<FormTemplates xmlns="http://schemas.microsoft.com/sharepoint/v3/contenttype/forms">
-  <Display>DocumentLibraryForm</Display>
-  <Edit>DocumentLibraryForm</Edit>
-  <New>DocumentLibraryForm</New>
-</FormTemplates>
-</file>
-
-<file path=customXml/item3.xml><?xml version="1.0" encoding="utf-8"?>
 <ct:contentTypeSchema xmlns:ct="http://schemas.microsoft.com/office/2006/metadata/contentType" xmlns:ma="http://schemas.microsoft.com/office/2006/metadata/properties/metaAttributes" ct:_="" ma:_="" ma:contentTypeName="Document" ma:contentTypeID="0x01010079F111ED35F8CC479449609E8A0923A6" ma:contentTypeVersion="20" ma:contentTypeDescription="Create a new document." ma:contentTypeScope="" ma:versionID="1267097ee5f5874adfcc408041ae252e">
   <xsd:schema xmlns:xsd="http://www.w3.org/2001/XMLSchema" xmlns:xs="http://www.w3.org/2001/XMLSchema" xmlns:p="http://schemas.microsoft.com/office/2006/metadata/properties" xmlns:ns1="http://schemas.microsoft.com/sharepoint/v3" xmlns:ns2="71af3243-3dd4-4a8d-8c0d-dd76da1f02a5" xmlns:ns3="16c05727-aa75-4e4a-9b5f-8a80a1165891" xmlns:ns4="230e9df3-be65-4c73-a93b-d1236ebd677e" targetNamespace="http://schemas.microsoft.com/office/2006/metadata/properties" ma:root="true" ma:fieldsID="395891a93df65b14727750f2c06c306c" ns1:_="" ns2:_="" ns3:_="" ns4:_="">
     <xsd:import namespace="http://schemas.microsoft.com/sharepoint/v3"/>
@@ -8679,27 +9139,35 @@
 </ct:contentTypeSchema>
 </file>
 
-<file path=customXml/itemProps1.xml><?xml version="1.0" encoding="utf-8"?>
-<ds:datastoreItem xmlns:ds="http://schemas.openxmlformats.org/officeDocument/2006/customXml" ds:itemID="{08757C30-AE9A-4680-90EB-19D282EC2B7C}">
-  <ds:schemaRefs>
-    <ds:schemaRef ds:uri="http://schemas.microsoft.com/office/2006/metadata/properties"/>
-    <ds:schemaRef ds:uri="http://schemas.microsoft.com/office/infopath/2007/PartnerControls"/>
-    <ds:schemaRef ds:uri="71af3243-3dd4-4a8d-8c0d-dd76da1f02a5"/>
-    <ds:schemaRef ds:uri="http://schemas.microsoft.com/sharepoint/v3"/>
-    <ds:schemaRef ds:uri="230e9df3-be65-4c73-a93b-d1236ebd677e"/>
-  </ds:schemaRefs>
-</ds:datastoreItem>
+<file path=customXml/item2.xml><?xml version="1.0" encoding="utf-8"?>
+<?mso-contentType ?>
+<FormTemplates xmlns="http://schemas.microsoft.com/sharepoint/v3/contenttype/forms">
+  <Display>DocumentLibraryForm</Display>
+  <Edit>DocumentLibraryForm</Edit>
+  <New>DocumentLibraryForm</New>
+</FormTemplates>
 </file>
 
-<file path=customXml/itemProps2.xml><?xml version="1.0" encoding="utf-8"?>
-<ds:datastoreItem xmlns:ds="http://schemas.openxmlformats.org/officeDocument/2006/customXml" ds:itemID="{A5CCB28C-7D26-4A36-9CFC-D739C28F3D18}">
-  <ds:schemaRefs>
-    <ds:schemaRef ds:uri="http://schemas.microsoft.com/sharepoint/v3/contenttype/forms"/>
-  </ds:schemaRefs>
-</ds:datastoreItem>
+<file path=customXml/item3.xml><?xml version="1.0" encoding="utf-8"?>
+<p:properties xmlns:p="http://schemas.microsoft.com/office/2006/metadata/properties" xmlns:xsi="http://www.w3.org/2001/XMLSchema-instance" xmlns:pc="http://schemas.microsoft.com/office/infopath/2007/PartnerControls">
+  <documentManagement>
+    <Status xmlns="71af3243-3dd4-4a8d-8c0d-dd76da1f02a5">Not started</Status>
+    <_ip_UnifiedCompliancePolicyUIAction xmlns="http://schemas.microsoft.com/sharepoint/v3" xsi:nil="true"/>
+    <Image xmlns="71af3243-3dd4-4a8d-8c0d-dd76da1f02a5">
+      <Url xsi:nil="true"/>
+      <Description xsi:nil="true"/>
+    </Image>
+    <_ip_UnifiedCompliancePolicyProperties xmlns="http://schemas.microsoft.com/sharepoint/v3" xsi:nil="true"/>
+    <ImageTagsTaxHTField xmlns="71af3243-3dd4-4a8d-8c0d-dd76da1f02a5">
+      <Terms xmlns="http://schemas.microsoft.com/office/infopath/2007/PartnerControls"/>
+    </ImageTagsTaxHTField>
+    <TaxCatchAll xmlns="230e9df3-be65-4c73-a93b-d1236ebd677e"/>
+    <MediaServiceKeyPoints xmlns="71af3243-3dd4-4a8d-8c0d-dd76da1f02a5" xsi:nil="true"/>
+  </documentManagement>
+</p:properties>
 </file>
 
-<file path=customXml/itemProps3.xml><?xml version="1.0" encoding="utf-8"?>
+<file path=customXml/itemProps1.xml><?xml version="1.0" encoding="utf-8"?>
 <ds:datastoreItem xmlns:ds="http://schemas.openxmlformats.org/officeDocument/2006/customXml" ds:itemID="{0AF0BF08-C674-44E3-8BFC-85BC65E095F1}">
   <ds:schemaRefs>
     <ds:schemaRef ds:uri="http://schemas.microsoft.com/office/2006/metadata/contentType"/>
@@ -8720,6 +9188,26 @@
 </ds:datastoreItem>
 </file>
 
+<file path=customXml/itemProps2.xml><?xml version="1.0" encoding="utf-8"?>
+<ds:datastoreItem xmlns:ds="http://schemas.openxmlformats.org/officeDocument/2006/customXml" ds:itemID="{A5CCB28C-7D26-4A36-9CFC-D739C28F3D18}">
+  <ds:schemaRefs>
+    <ds:schemaRef ds:uri="http://schemas.microsoft.com/sharepoint/v3/contenttype/forms"/>
+  </ds:schemaRefs>
+</ds:datastoreItem>
+</file>
+
+<file path=customXml/itemProps3.xml><?xml version="1.0" encoding="utf-8"?>
+<ds:datastoreItem xmlns:ds="http://schemas.openxmlformats.org/officeDocument/2006/customXml" ds:itemID="{08757C30-AE9A-4680-90EB-19D282EC2B7C}">
+  <ds:schemaRefs>
+    <ds:schemaRef ds:uri="http://schemas.microsoft.com/office/2006/metadata/properties"/>
+    <ds:schemaRef ds:uri="http://schemas.microsoft.com/office/infopath/2007/PartnerControls"/>
+    <ds:schemaRef ds:uri="71af3243-3dd4-4a8d-8c0d-dd76da1f02a5"/>
+    <ds:schemaRef ds:uri="http://schemas.microsoft.com/sharepoint/v3"/>
+    <ds:schemaRef ds:uri="230e9df3-be65-4c73-a93b-d1236ebd677e"/>
+  </ds:schemaRefs>
+</ds:datastoreItem>
+</file>
+
 <file path=docMetadata/LabelInfo.xml><?xml version="1.0" encoding="utf-8"?>
 <clbl:labelList xmlns:clbl="http://schemas.microsoft.com/office/2020/mipLabelMetadata">
   <clbl:label id="{f42aa342-8706-4288-bd11-ebb85995028c}" enabled="1" method="Standard" siteId="{72f988bf-86f1-41af-91ab-2d7cd011db47}" contentBits="0" removed="0"/>

</xml_diff>

<commit_message>
add Archi HTML Report ERD
</commit_message>
<xml_diff>
--- a/architool/Using-Archi.pptx
+++ b/architool/Using-Archi.pptx
@@ -5,16 +5,19 @@
     <p:sldMasterId id="2147483648" r:id="rId4"/>
   </p:sldMasterIdLst>
   <p:notesMasterIdLst>
-    <p:notesMasterId r:id="rId9"/>
+    <p:notesMasterId r:id="rId12"/>
   </p:notesMasterIdLst>
   <p:handoutMasterIdLst>
-    <p:handoutMasterId r:id="rId10"/>
+    <p:handoutMasterId r:id="rId13"/>
   </p:handoutMasterIdLst>
   <p:sldIdLst>
     <p:sldId id="256" r:id="rId5"/>
     <p:sldId id="259" r:id="rId6"/>
     <p:sldId id="257" r:id="rId7"/>
     <p:sldId id="258" r:id="rId8"/>
+    <p:sldId id="262" r:id="rId9"/>
+    <p:sldId id="260" r:id="rId10"/>
+    <p:sldId id="261" r:id="rId11"/>
   </p:sldIdLst>
   <p:sldSz cx="12192000" cy="6858000"/>
   <p:notesSz cx="6858000" cy="9144000"/>
@@ -218,7 +221,7 @@
           <a:p>
             <a:fld id="{9410D272-305C-421E-A9EF-95D63D599B42}" type="datetimeFigureOut">
               <a:rPr lang="en-US" smtClean="0"/>
-              <a:t>5/3/2024</a:t>
+              <a:t>3/1/2025</a:t>
             </a:fld>
             <a:endParaRPr lang="en-US" dirty="0"/>
           </a:p>
@@ -395,7 +398,7 @@
           <a:p>
             <a:fld id="{05E16E63-7886-43BC-8DD4-4F14C3DD7360}" type="datetimeFigureOut">
               <a:rPr lang="en-US" smtClean="0"/>
-              <a:t>5/3/2024</a:t>
+              <a:t>3/1/2025</a:t>
             </a:fld>
             <a:endParaRPr lang="en-US" dirty="0"/>
           </a:p>
@@ -8063,6 +8066,991 @@
     <p:extLst>
       <p:ext uri="{BB962C8B-B14F-4D97-AF65-F5344CB8AC3E}">
         <p14:creationId xmlns:p14="http://schemas.microsoft.com/office/powerpoint/2010/main" val="4104491830"/>
+      </p:ext>
+    </p:extLst>
+  </p:cSld>
+  <p:clrMapOvr>
+    <a:masterClrMapping/>
+  </p:clrMapOvr>
+</p:sld>
+</file>
+
+<file path=ppt/slides/slide5.xml><?xml version="1.0" encoding="utf-8"?>
+<p:sld xmlns:a="http://schemas.openxmlformats.org/drawingml/2006/main" xmlns:r="http://schemas.openxmlformats.org/officeDocument/2006/relationships" xmlns:p="http://schemas.openxmlformats.org/presentationml/2006/main">
+  <p:cSld>
+    <p:spTree>
+      <p:nvGrpSpPr>
+        <p:cNvPr id="1" name="">
+          <a:extLst>
+            <a:ext uri="{FF2B5EF4-FFF2-40B4-BE49-F238E27FC236}">
+              <a16:creationId xmlns:a16="http://schemas.microsoft.com/office/drawing/2014/main" id="{48E73BA6-D881-569E-9FEE-D3BC859A0D8D}"/>
+            </a:ext>
+          </a:extLst>
+        </p:cNvPr>
+        <p:cNvGrpSpPr/>
+        <p:nvPr/>
+      </p:nvGrpSpPr>
+      <p:grpSpPr>
+        <a:xfrm>
+          <a:off x="0" y="0"/>
+          <a:ext cx="0" cy="0"/>
+          <a:chOff x="0" y="0"/>
+          <a:chExt cx="0" cy="0"/>
+        </a:xfrm>
+      </p:grpSpPr>
+      <p:sp>
+        <p:nvSpPr>
+          <p:cNvPr id="7" name="Title 6">
+            <a:extLst>
+              <a:ext uri="{FF2B5EF4-FFF2-40B4-BE49-F238E27FC236}">
+                <a16:creationId xmlns:a16="http://schemas.microsoft.com/office/drawing/2014/main" id="{93243656-D8F7-9F2E-EA18-09A37B7E04E0}"/>
+              </a:ext>
+            </a:extLst>
+          </p:cNvPr>
+          <p:cNvSpPr>
+            <a:spLocks noGrp="1"/>
+          </p:cNvSpPr>
+          <p:nvPr>
+            <p:ph type="ctrTitle"/>
+          </p:nvPr>
+        </p:nvSpPr>
+        <p:spPr>
+          <a:xfrm>
+            <a:off x="649044" y="1308846"/>
+            <a:ext cx="6815446" cy="4078942"/>
+          </a:xfrm>
+        </p:spPr>
+        <p:txBody>
+          <a:bodyPr>
+            <a:noAutofit/>
+          </a:bodyPr>
+          <a:lstStyle/>
+          <a:p>
+            <a:r>
+              <a:rPr lang="en-US" sz="7200" dirty="0"/>
+              <a:t>Archi HTML Report in ERD View</a:t>
+            </a:r>
+          </a:p>
+        </p:txBody>
+      </p:sp>
+      <p:sp>
+        <p:nvSpPr>
+          <p:cNvPr id="8" name="Subtitle 7">
+            <a:extLst>
+              <a:ext uri="{FF2B5EF4-FFF2-40B4-BE49-F238E27FC236}">
+                <a16:creationId xmlns:a16="http://schemas.microsoft.com/office/drawing/2014/main" id="{39928477-16B3-E5A7-0282-3C27219378CB}"/>
+              </a:ext>
+            </a:extLst>
+          </p:cNvPr>
+          <p:cNvSpPr>
+            <a:spLocks noGrp="1"/>
+          </p:cNvSpPr>
+          <p:nvPr>
+            <p:ph type="subTitle" idx="1"/>
+          </p:nvPr>
+        </p:nvSpPr>
+        <p:spPr>
+          <a:xfrm>
+            <a:off x="649045" y="4640424"/>
+            <a:ext cx="6437555" cy="1303176"/>
+          </a:xfrm>
+        </p:spPr>
+        <p:txBody>
+          <a:bodyPr/>
+          <a:lstStyle/>
+          <a:p>
+            <a:r>
+              <a:rPr lang="en-US" dirty="0"/>
+              <a:t>Xiaoqi Zhao</a:t>
+            </a:r>
+          </a:p>
+        </p:txBody>
+      </p:sp>
+      <p:pic>
+        <p:nvPicPr>
+          <p:cNvPr id="5" name="Picture Placeholder 4" descr="A picture containing mountain, sky, outdoor, nature, sunrise ">
+            <a:extLst>
+              <a:ext uri="{FF2B5EF4-FFF2-40B4-BE49-F238E27FC236}">
+                <a16:creationId xmlns:a16="http://schemas.microsoft.com/office/drawing/2014/main" id="{DEA97461-B72C-1CF7-3BE0-945D1AE19EBF}"/>
+              </a:ext>
+            </a:extLst>
+          </p:cNvPr>
+          <p:cNvPicPr>
+            <a:picLocks noGrp="1" noChangeAspect="1"/>
+          </p:cNvPicPr>
+          <p:nvPr>
+            <p:ph type="pic" sz="quarter" idx="13"/>
+          </p:nvPr>
+        </p:nvPicPr>
+        <p:blipFill rotWithShape="1">
+          <a:blip r:embed="rId2" cstate="screen">
+            <a:extLst>
+              <a:ext uri="{28A0092B-C50C-407E-A947-70E740481C1C}">
+                <a14:useLocalDpi xmlns:a14="http://schemas.microsoft.com/office/drawing/2010/main" val="0"/>
+              </a:ext>
+            </a:extLst>
+          </a:blip>
+          <a:srcRect/>
+          <a:stretch/>
+        </p:blipFill>
+        <p:spPr>
+          <a:xfrm>
+            <a:off x="8113533" y="0"/>
+            <a:ext cx="4082983" cy="6858000"/>
+          </a:xfrm>
+        </p:spPr>
+      </p:pic>
+      <p:pic>
+        <p:nvPicPr>
+          <p:cNvPr id="3" name="Picture 2">
+            <a:extLst>
+              <a:ext uri="{FF2B5EF4-FFF2-40B4-BE49-F238E27FC236}">
+                <a16:creationId xmlns:a16="http://schemas.microsoft.com/office/drawing/2014/main" id="{72038AAB-23E8-D4D3-D7F3-7535C250C614}"/>
+              </a:ext>
+            </a:extLst>
+          </p:cNvPr>
+          <p:cNvPicPr>
+            <a:picLocks noChangeAspect="1"/>
+          </p:cNvPicPr>
+          <p:nvPr/>
+        </p:nvPicPr>
+        <p:blipFill>
+          <a:blip r:embed="rId3"/>
+          <a:stretch>
+            <a:fillRect/>
+          </a:stretch>
+        </p:blipFill>
+        <p:spPr>
+          <a:xfrm>
+            <a:off x="8109019" y="-1"/>
+            <a:ext cx="4082982" cy="1681945"/>
+          </a:xfrm>
+          <a:prstGeom prst="rect">
+            <a:avLst/>
+          </a:prstGeom>
+          <a:ln>
+            <a:noFill/>
+          </a:ln>
+          <a:effectLst>
+            <a:softEdge rad="112500"/>
+          </a:effectLst>
+        </p:spPr>
+      </p:pic>
+      <p:pic>
+        <p:nvPicPr>
+          <p:cNvPr id="9" name="Picture 8">
+            <a:extLst>
+              <a:ext uri="{FF2B5EF4-FFF2-40B4-BE49-F238E27FC236}">
+                <a16:creationId xmlns:a16="http://schemas.microsoft.com/office/drawing/2014/main" id="{BCEF3C91-ACE2-64DE-0956-77FAFAC0DBFF}"/>
+              </a:ext>
+            </a:extLst>
+          </p:cNvPr>
+          <p:cNvPicPr>
+            <a:picLocks noChangeAspect="1"/>
+          </p:cNvPicPr>
+          <p:nvPr/>
+        </p:nvPicPr>
+        <p:blipFill>
+          <a:blip r:embed="rId4"/>
+          <a:stretch>
+            <a:fillRect/>
+          </a:stretch>
+        </p:blipFill>
+        <p:spPr>
+          <a:xfrm>
+            <a:off x="5147295" y="6167625"/>
+            <a:ext cx="2810500" cy="585267"/>
+          </a:xfrm>
+          <a:prstGeom prst="rect">
+            <a:avLst/>
+          </a:prstGeom>
+        </p:spPr>
+      </p:pic>
+      <p:sp>
+        <p:nvSpPr>
+          <p:cNvPr id="11" name="Subtitle 7">
+            <a:extLst>
+              <a:ext uri="{FF2B5EF4-FFF2-40B4-BE49-F238E27FC236}">
+                <a16:creationId xmlns:a16="http://schemas.microsoft.com/office/drawing/2014/main" id="{F6F85076-C378-815B-8AED-A9A3FDABF45C}"/>
+              </a:ext>
+            </a:extLst>
+          </p:cNvPr>
+          <p:cNvSpPr txBox="1">
+            <a:spLocks/>
+          </p:cNvSpPr>
+          <p:nvPr/>
+        </p:nvSpPr>
+        <p:spPr>
+          <a:xfrm>
+            <a:off x="649045" y="188258"/>
+            <a:ext cx="6437555" cy="699247"/>
+          </a:xfrm>
+          <a:prstGeom prst="rect">
+            <a:avLst/>
+          </a:prstGeom>
+        </p:spPr>
+        <p:txBody>
+          <a:bodyPr vert="horz" lIns="91440" tIns="45720" rIns="91440" bIns="45720" rtlCol="0" anchor="b">
+            <a:normAutofit fontScale="92500"/>
+          </a:bodyPr>
+          <a:lstStyle>
+            <a:lvl1pPr marL="0" indent="0" algn="l" defTabSz="914400" rtl="0" eaLnBrk="1" latinLnBrk="0" hangingPunct="1">
+              <a:lnSpc>
+                <a:spcPct val="110000"/>
+              </a:lnSpc>
+              <a:spcBef>
+                <a:spcPts val="1000"/>
+              </a:spcBef>
+              <a:buFont typeface="Arial" panose="020B0604020202020204" pitchFamily="34" charset="0"/>
+              <a:buNone/>
+              <a:defRPr sz="2800" b="1" kern="1200" spc="-20" baseline="0">
+                <a:solidFill>
+                  <a:schemeClr val="bg1"/>
+                </a:solidFill>
+                <a:latin typeface="+mn-lt"/>
+                <a:ea typeface="+mn-ea"/>
+                <a:cs typeface="+mn-cs"/>
+              </a:defRPr>
+            </a:lvl1pPr>
+            <a:lvl2pPr marL="685800" indent="-228600" algn="l" defTabSz="914400" rtl="0" eaLnBrk="1" latinLnBrk="0" hangingPunct="1">
+              <a:lnSpc>
+                <a:spcPct val="110000"/>
+              </a:lnSpc>
+              <a:spcBef>
+                <a:spcPts val="500"/>
+              </a:spcBef>
+              <a:buFont typeface="Arial" panose="020B0604020202020204" pitchFamily="34" charset="0"/>
+              <a:buChar char="•"/>
+              <a:defRPr sz="2000" kern="1200" spc="-20" baseline="0">
+                <a:solidFill>
+                  <a:schemeClr val="tx1"/>
+                </a:solidFill>
+                <a:latin typeface="+mn-lt"/>
+                <a:ea typeface="+mn-ea"/>
+                <a:cs typeface="+mn-cs"/>
+              </a:defRPr>
+            </a:lvl2pPr>
+            <a:lvl3pPr marL="1143000" indent="-228600" algn="l" defTabSz="914400" rtl="0" eaLnBrk="1" latinLnBrk="0" hangingPunct="1">
+              <a:lnSpc>
+                <a:spcPct val="110000"/>
+              </a:lnSpc>
+              <a:spcBef>
+                <a:spcPts val="500"/>
+              </a:spcBef>
+              <a:buFont typeface="Arial" panose="020B0604020202020204" pitchFamily="34" charset="0"/>
+              <a:buChar char="•"/>
+              <a:defRPr sz="1800" kern="1200" spc="-20" baseline="0">
+                <a:solidFill>
+                  <a:schemeClr val="tx1"/>
+                </a:solidFill>
+                <a:latin typeface="+mn-lt"/>
+                <a:ea typeface="+mn-ea"/>
+                <a:cs typeface="+mn-cs"/>
+              </a:defRPr>
+            </a:lvl3pPr>
+            <a:lvl4pPr marL="1600200" indent="-228600" algn="l" defTabSz="914400" rtl="0" eaLnBrk="1" latinLnBrk="0" hangingPunct="1">
+              <a:lnSpc>
+                <a:spcPct val="110000"/>
+              </a:lnSpc>
+              <a:spcBef>
+                <a:spcPts val="500"/>
+              </a:spcBef>
+              <a:buFont typeface="Arial" panose="020B0604020202020204" pitchFamily="34" charset="0"/>
+              <a:buChar char="•"/>
+              <a:defRPr sz="1600" kern="1200" spc="-20" baseline="0">
+                <a:solidFill>
+                  <a:schemeClr val="tx1"/>
+                </a:solidFill>
+                <a:latin typeface="+mn-lt"/>
+                <a:ea typeface="+mn-ea"/>
+                <a:cs typeface="+mn-cs"/>
+              </a:defRPr>
+            </a:lvl4pPr>
+            <a:lvl5pPr marL="2057400" indent="-228600" algn="l" defTabSz="914400" rtl="0" eaLnBrk="1" latinLnBrk="0" hangingPunct="1">
+              <a:lnSpc>
+                <a:spcPct val="110000"/>
+              </a:lnSpc>
+              <a:spcBef>
+                <a:spcPts val="500"/>
+              </a:spcBef>
+              <a:buFont typeface="Arial" panose="020B0604020202020204" pitchFamily="34" charset="0"/>
+              <a:buChar char="•"/>
+              <a:defRPr sz="1600" kern="1200" spc="-20" baseline="0">
+                <a:solidFill>
+                  <a:schemeClr val="tx1"/>
+                </a:solidFill>
+                <a:latin typeface="+mn-lt"/>
+                <a:ea typeface="+mn-ea"/>
+                <a:cs typeface="+mn-cs"/>
+              </a:defRPr>
+            </a:lvl5pPr>
+            <a:lvl6pPr marL="2514600" indent="-228600" algn="l" defTabSz="914400" rtl="0" eaLnBrk="1" latinLnBrk="0" hangingPunct="1">
+              <a:lnSpc>
+                <a:spcPct val="90000"/>
+              </a:lnSpc>
+              <a:spcBef>
+                <a:spcPts val="500"/>
+              </a:spcBef>
+              <a:buFont typeface="Arial" panose="020B0604020202020204" pitchFamily="34" charset="0"/>
+              <a:buChar char="•"/>
+              <a:defRPr sz="1800" kern="1200">
+                <a:solidFill>
+                  <a:schemeClr val="tx1"/>
+                </a:solidFill>
+                <a:latin typeface="+mn-lt"/>
+                <a:ea typeface="+mn-ea"/>
+                <a:cs typeface="+mn-cs"/>
+              </a:defRPr>
+            </a:lvl6pPr>
+            <a:lvl7pPr marL="2971800" indent="-228600" algn="l" defTabSz="914400" rtl="0" eaLnBrk="1" latinLnBrk="0" hangingPunct="1">
+              <a:lnSpc>
+                <a:spcPct val="90000"/>
+              </a:lnSpc>
+              <a:spcBef>
+                <a:spcPts val="500"/>
+              </a:spcBef>
+              <a:buFont typeface="Arial" panose="020B0604020202020204" pitchFamily="34" charset="0"/>
+              <a:buChar char="•"/>
+              <a:defRPr sz="1800" kern="1200">
+                <a:solidFill>
+                  <a:schemeClr val="tx1"/>
+                </a:solidFill>
+                <a:latin typeface="+mn-lt"/>
+                <a:ea typeface="+mn-ea"/>
+                <a:cs typeface="+mn-cs"/>
+              </a:defRPr>
+            </a:lvl7pPr>
+            <a:lvl8pPr marL="3429000" indent="-228600" algn="l" defTabSz="914400" rtl="0" eaLnBrk="1" latinLnBrk="0" hangingPunct="1">
+              <a:lnSpc>
+                <a:spcPct val="90000"/>
+              </a:lnSpc>
+              <a:spcBef>
+                <a:spcPts val="500"/>
+              </a:spcBef>
+              <a:buFont typeface="Arial" panose="020B0604020202020204" pitchFamily="34" charset="0"/>
+              <a:buChar char="•"/>
+              <a:defRPr sz="1800" kern="1200">
+                <a:solidFill>
+                  <a:schemeClr val="tx1"/>
+                </a:solidFill>
+                <a:latin typeface="+mn-lt"/>
+                <a:ea typeface="+mn-ea"/>
+                <a:cs typeface="+mn-cs"/>
+              </a:defRPr>
+            </a:lvl8pPr>
+            <a:lvl9pPr marL="3886200" indent="-228600" algn="l" defTabSz="914400" rtl="0" eaLnBrk="1" latinLnBrk="0" hangingPunct="1">
+              <a:lnSpc>
+                <a:spcPct val="90000"/>
+              </a:lnSpc>
+              <a:spcBef>
+                <a:spcPts val="500"/>
+              </a:spcBef>
+              <a:buFont typeface="Arial" panose="020B0604020202020204" pitchFamily="34" charset="0"/>
+              <a:buChar char="•"/>
+              <a:defRPr sz="1800" kern="1200">
+                <a:solidFill>
+                  <a:schemeClr val="tx1"/>
+                </a:solidFill>
+                <a:latin typeface="+mn-lt"/>
+                <a:ea typeface="+mn-ea"/>
+                <a:cs typeface="+mn-cs"/>
+              </a:defRPr>
+            </a:lvl9pPr>
+          </a:lstStyle>
+          <a:p>
+            <a:r>
+              <a:rPr lang="en-US" sz="4000" dirty="0"/>
+              <a:t>Archi HTML Report - 04</a:t>
+            </a:r>
+          </a:p>
+        </p:txBody>
+      </p:sp>
+      <p:pic>
+        <p:nvPicPr>
+          <p:cNvPr id="6" name="Picture 5">
+            <a:extLst>
+              <a:ext uri="{FF2B5EF4-FFF2-40B4-BE49-F238E27FC236}">
+                <a16:creationId xmlns:a16="http://schemas.microsoft.com/office/drawing/2014/main" id="{138B7DED-4A05-BE60-A0FD-7A83B844FDF0}"/>
+              </a:ext>
+            </a:extLst>
+          </p:cNvPr>
+          <p:cNvPicPr>
+            <a:picLocks noChangeAspect="1"/>
+          </p:cNvPicPr>
+          <p:nvPr/>
+        </p:nvPicPr>
+        <p:blipFill>
+          <a:blip r:embed="rId5"/>
+          <a:stretch>
+            <a:fillRect/>
+          </a:stretch>
+        </p:blipFill>
+        <p:spPr>
+          <a:xfrm>
+            <a:off x="6881649" y="2146621"/>
+            <a:ext cx="5179808" cy="3631086"/>
+          </a:xfrm>
+          <a:prstGeom prst="rect">
+            <a:avLst/>
+          </a:prstGeom>
+          <a:ln>
+            <a:noFill/>
+          </a:ln>
+          <a:effectLst>
+            <a:softEdge rad="112500"/>
+          </a:effectLst>
+        </p:spPr>
+      </p:pic>
+    </p:spTree>
+    <p:extLst>
+      <p:ext uri="{BB962C8B-B14F-4D97-AF65-F5344CB8AC3E}">
+        <p14:creationId xmlns:p14="http://schemas.microsoft.com/office/powerpoint/2010/main" val="4271078664"/>
+      </p:ext>
+    </p:extLst>
+  </p:cSld>
+  <p:clrMapOvr>
+    <a:masterClrMapping/>
+  </p:clrMapOvr>
+</p:sld>
+</file>
+
+<file path=ppt/slides/slide6.xml><?xml version="1.0" encoding="utf-8"?>
+<p:sld xmlns:a="http://schemas.openxmlformats.org/drawingml/2006/main" xmlns:r="http://schemas.openxmlformats.org/officeDocument/2006/relationships" xmlns:p="http://schemas.openxmlformats.org/presentationml/2006/main">
+  <p:cSld>
+    <p:spTree>
+      <p:nvGrpSpPr>
+        <p:cNvPr id="1" name="">
+          <a:extLst>
+            <a:ext uri="{FF2B5EF4-FFF2-40B4-BE49-F238E27FC236}">
+              <a16:creationId xmlns:a16="http://schemas.microsoft.com/office/drawing/2014/main" id="{F9F99694-F06A-3C01-5824-44ACBDD5EB25}"/>
+            </a:ext>
+          </a:extLst>
+        </p:cNvPr>
+        <p:cNvGrpSpPr/>
+        <p:nvPr/>
+      </p:nvGrpSpPr>
+      <p:grpSpPr>
+        <a:xfrm>
+          <a:off x="0" y="0"/>
+          <a:ext cx="0" cy="0"/>
+          <a:chOff x="0" y="0"/>
+          <a:chExt cx="0" cy="0"/>
+        </a:xfrm>
+      </p:grpSpPr>
+      <p:sp>
+        <p:nvSpPr>
+          <p:cNvPr id="7" name="Title 6">
+            <a:extLst>
+              <a:ext uri="{FF2B5EF4-FFF2-40B4-BE49-F238E27FC236}">
+                <a16:creationId xmlns:a16="http://schemas.microsoft.com/office/drawing/2014/main" id="{7B3C50B6-7092-A2B3-3C4E-E06C1E71F162}"/>
+              </a:ext>
+            </a:extLst>
+          </p:cNvPr>
+          <p:cNvSpPr>
+            <a:spLocks noGrp="1"/>
+          </p:cNvSpPr>
+          <p:nvPr>
+            <p:ph type="title"/>
+          </p:nvPr>
+        </p:nvSpPr>
+        <p:spPr/>
+        <p:txBody>
+          <a:bodyPr>
+            <a:noAutofit/>
+          </a:bodyPr>
+          <a:lstStyle/>
+          <a:p>
+            <a:r>
+              <a:rPr lang="en-US" sz="4000" dirty="0"/>
+              <a:t>Archi HTML Report - Question Got:</a:t>
+            </a:r>
+          </a:p>
+        </p:txBody>
+      </p:sp>
+      <p:sp>
+        <p:nvSpPr>
+          <p:cNvPr id="8" name="Subtitle 7">
+            <a:extLst>
+              <a:ext uri="{FF2B5EF4-FFF2-40B4-BE49-F238E27FC236}">
+                <a16:creationId xmlns:a16="http://schemas.microsoft.com/office/drawing/2014/main" id="{CEDBA922-0E28-E499-CC4D-9F09D22537C7}"/>
+              </a:ext>
+            </a:extLst>
+          </p:cNvPr>
+          <p:cNvSpPr>
+            <a:spLocks noGrp="1"/>
+          </p:cNvSpPr>
+          <p:nvPr>
+            <p:ph sz="quarter" idx="14"/>
+          </p:nvPr>
+        </p:nvSpPr>
+        <p:spPr>
+          <a:xfrm>
+            <a:off x="931863" y="1395248"/>
+            <a:ext cx="10667616" cy="4615027"/>
+          </a:xfrm>
+        </p:spPr>
+        <p:txBody>
+          <a:bodyPr>
+            <a:normAutofit/>
+          </a:bodyPr>
+          <a:lstStyle/>
+          <a:p>
+            <a:r>
+              <a:rPr lang="en-US" dirty="0">
+                <a:latin typeface="Bahnschrift SemiCondensed" panose="020B0502040204020203" pitchFamily="34" charset="0"/>
+              </a:rPr>
+              <a:t>I am using the following statement to list the flow relationships.</a:t>
+            </a:r>
+          </a:p>
+          <a:p>
+            <a:endParaRPr lang="en-US" dirty="0">
+              <a:latin typeface="Bahnschrift SemiCondensed" panose="020B0502040204020203" pitchFamily="34" charset="0"/>
+            </a:endParaRPr>
+          </a:p>
+          <a:p>
+            <a:endParaRPr lang="en-US" dirty="0">
+              <a:latin typeface="Bahnschrift SemiCondensed" panose="020B0502040204020203" pitchFamily="34" charset="0"/>
+            </a:endParaRPr>
+          </a:p>
+          <a:p>
+            <a:endParaRPr lang="en-US" dirty="0">
+              <a:latin typeface="Bahnschrift SemiCondensed" panose="020B0502040204020203" pitchFamily="34" charset="0"/>
+            </a:endParaRPr>
+          </a:p>
+          <a:p>
+            <a:endParaRPr lang="en-US" dirty="0">
+              <a:latin typeface="Bahnschrift SemiCondensed" panose="020B0502040204020203" pitchFamily="34" charset="0"/>
+            </a:endParaRPr>
+          </a:p>
+          <a:p>
+            <a:r>
+              <a:rPr lang="en-US" dirty="0">
+                <a:latin typeface="Bahnschrift SemiCondensed" panose="020B0502040204020203" pitchFamily="34" charset="0"/>
+              </a:rPr>
+              <a:t>Is it possible to extend upon this to obtain the color of the flow relationship lines, as the HTML do not identify the properties of the lines and this is used in Archi view to determine what type of CRUD operation (</a:t>
+            </a:r>
+            <a:r>
+              <a:rPr lang="en-US" dirty="0" err="1">
+                <a:latin typeface="Bahnschrift SemiCondensed" panose="020B0502040204020203" pitchFamily="34" charset="0"/>
+              </a:rPr>
+              <a:t>e.g</a:t>
+            </a:r>
+            <a:r>
+              <a:rPr lang="en-US" dirty="0">
+                <a:latin typeface="Bahnschrift SemiCondensed" panose="020B0502040204020203" pitchFamily="34" charset="0"/>
+              </a:rPr>
+              <a:t> Black=Create, Blue=Read, etc.) but not sure if the </a:t>
+            </a:r>
+            <a:r>
+              <a:rPr lang="en-US" dirty="0" err="1">
+                <a:latin typeface="Bahnschrift SemiCondensed" panose="020B0502040204020203" pitchFamily="34" charset="0"/>
+              </a:rPr>
+              <a:t>LineColor</a:t>
+            </a:r>
+            <a:r>
+              <a:rPr lang="en-US" dirty="0">
+                <a:latin typeface="Bahnschrift SemiCondensed" panose="020B0502040204020203" pitchFamily="34" charset="0"/>
+              </a:rPr>
+              <a:t> is stored with the HTML tables</a:t>
+            </a:r>
+            <a:r>
+              <a:rPr lang="en-US" dirty="0"/>
+              <a:t>.</a:t>
+            </a:r>
+          </a:p>
+        </p:txBody>
+      </p:sp>
+      <p:pic>
+        <p:nvPicPr>
+          <p:cNvPr id="3" name="Picture 2">
+            <a:extLst>
+              <a:ext uri="{FF2B5EF4-FFF2-40B4-BE49-F238E27FC236}">
+                <a16:creationId xmlns:a16="http://schemas.microsoft.com/office/drawing/2014/main" id="{9FE07EEA-8DBF-F8DA-780F-F2D220323DF7}"/>
+              </a:ext>
+            </a:extLst>
+          </p:cNvPr>
+          <p:cNvPicPr>
+            <a:picLocks noChangeAspect="1"/>
+          </p:cNvPicPr>
+          <p:nvPr/>
+        </p:nvPicPr>
+        <p:blipFill>
+          <a:blip r:embed="rId2"/>
+          <a:stretch>
+            <a:fillRect/>
+          </a:stretch>
+        </p:blipFill>
+        <p:spPr>
+          <a:xfrm>
+            <a:off x="0" y="6176083"/>
+            <a:ext cx="1659118" cy="683458"/>
+          </a:xfrm>
+          <a:prstGeom prst="rect">
+            <a:avLst/>
+          </a:prstGeom>
+          <a:ln>
+            <a:noFill/>
+          </a:ln>
+          <a:effectLst>
+            <a:softEdge rad="112500"/>
+          </a:effectLst>
+        </p:spPr>
+      </p:pic>
+      <p:pic>
+        <p:nvPicPr>
+          <p:cNvPr id="9" name="Picture 8">
+            <a:extLst>
+              <a:ext uri="{FF2B5EF4-FFF2-40B4-BE49-F238E27FC236}">
+                <a16:creationId xmlns:a16="http://schemas.microsoft.com/office/drawing/2014/main" id="{1B59AE8D-ABCD-1D56-AF47-2FA6ABAC4102}"/>
+              </a:ext>
+            </a:extLst>
+          </p:cNvPr>
+          <p:cNvPicPr>
+            <a:picLocks noChangeAspect="1"/>
+          </p:cNvPicPr>
+          <p:nvPr/>
+        </p:nvPicPr>
+        <p:blipFill>
+          <a:blip r:embed="rId3"/>
+          <a:stretch>
+            <a:fillRect/>
+          </a:stretch>
+        </p:blipFill>
+        <p:spPr>
+          <a:xfrm>
+            <a:off x="5147295" y="6167625"/>
+            <a:ext cx="2810500" cy="585267"/>
+          </a:xfrm>
+          <a:prstGeom prst="rect">
+            <a:avLst/>
+          </a:prstGeom>
+        </p:spPr>
+      </p:pic>
+      <p:pic>
+        <p:nvPicPr>
+          <p:cNvPr id="13" name="Picture 12">
+            <a:extLst>
+              <a:ext uri="{FF2B5EF4-FFF2-40B4-BE49-F238E27FC236}">
+                <a16:creationId xmlns:a16="http://schemas.microsoft.com/office/drawing/2014/main" id="{3B9EB8D4-F939-3B66-E20D-C47E48136A11}"/>
+              </a:ext>
+            </a:extLst>
+          </p:cNvPr>
+          <p:cNvPicPr>
+            <a:picLocks noChangeAspect="1"/>
+          </p:cNvPicPr>
+          <p:nvPr/>
+        </p:nvPicPr>
+        <p:blipFill>
+          <a:blip r:embed="rId4"/>
+          <a:stretch>
+            <a:fillRect/>
+          </a:stretch>
+        </p:blipFill>
+        <p:spPr>
+          <a:xfrm>
+            <a:off x="1236152" y="1912462"/>
+            <a:ext cx="10164152" cy="2044683"/>
+          </a:xfrm>
+          <a:prstGeom prst="rect">
+            <a:avLst/>
+          </a:prstGeom>
+        </p:spPr>
+      </p:pic>
+    </p:spTree>
+    <p:extLst>
+      <p:ext uri="{BB962C8B-B14F-4D97-AF65-F5344CB8AC3E}">
+        <p14:creationId xmlns:p14="http://schemas.microsoft.com/office/powerpoint/2010/main" val="2299969748"/>
+      </p:ext>
+    </p:extLst>
+  </p:cSld>
+  <p:clrMapOvr>
+    <a:masterClrMapping/>
+  </p:clrMapOvr>
+</p:sld>
+</file>
+
+<file path=ppt/slides/slide7.xml><?xml version="1.0" encoding="utf-8"?>
+<p:sld xmlns:a="http://schemas.openxmlformats.org/drawingml/2006/main" xmlns:r="http://schemas.openxmlformats.org/officeDocument/2006/relationships" xmlns:p="http://schemas.openxmlformats.org/presentationml/2006/main">
+  <p:cSld>
+    <p:spTree>
+      <p:nvGrpSpPr>
+        <p:cNvPr id="1" name=""/>
+        <p:cNvGrpSpPr/>
+        <p:nvPr/>
+      </p:nvGrpSpPr>
+      <p:grpSpPr>
+        <a:xfrm>
+          <a:off x="0" y="0"/>
+          <a:ext cx="0" cy="0"/>
+          <a:chOff x="0" y="0"/>
+          <a:chExt cx="0" cy="0"/>
+        </a:xfrm>
+      </p:grpSpPr>
+      <p:sp>
+        <p:nvSpPr>
+          <p:cNvPr id="2" name="Title 1">
+            <a:extLst>
+              <a:ext uri="{FF2B5EF4-FFF2-40B4-BE49-F238E27FC236}">
+                <a16:creationId xmlns:a16="http://schemas.microsoft.com/office/drawing/2014/main" id="{DDAF1BE4-B090-7B32-E9F2-E567D2A61EF1}"/>
+              </a:ext>
+            </a:extLst>
+          </p:cNvPr>
+          <p:cNvSpPr>
+            <a:spLocks noGrp="1"/>
+          </p:cNvSpPr>
+          <p:nvPr>
+            <p:ph type="title"/>
+          </p:nvPr>
+        </p:nvSpPr>
+        <p:spPr/>
+        <p:txBody>
+          <a:bodyPr>
+            <a:normAutofit fontScale="90000"/>
+          </a:bodyPr>
+          <a:lstStyle/>
+          <a:p>
+            <a:r>
+              <a:rPr lang="en-US" dirty="0"/>
+              <a:t>Investigation and Reflection</a:t>
+            </a:r>
+          </a:p>
+        </p:txBody>
+      </p:sp>
+      <p:sp>
+        <p:nvSpPr>
+          <p:cNvPr id="3" name="Content Placeholder 2">
+            <a:extLst>
+              <a:ext uri="{FF2B5EF4-FFF2-40B4-BE49-F238E27FC236}">
+                <a16:creationId xmlns:a16="http://schemas.microsoft.com/office/drawing/2014/main" id="{8CAD00B2-B3B2-5C06-E141-42F9D092A655}"/>
+              </a:ext>
+            </a:extLst>
+          </p:cNvPr>
+          <p:cNvSpPr>
+            <a:spLocks noGrp="1"/>
+          </p:cNvSpPr>
+          <p:nvPr>
+            <p:ph sz="quarter" idx="14"/>
+          </p:nvPr>
+        </p:nvSpPr>
+        <p:spPr/>
+        <p:txBody>
+          <a:bodyPr/>
+          <a:lstStyle/>
+          <a:p>
+            <a:r>
+              <a:rPr lang="en-US" dirty="0"/>
+              <a:t>“</a:t>
+            </a:r>
+            <a:r>
+              <a:rPr lang="en-US" dirty="0" err="1"/>
+              <a:t>lineColor</a:t>
+            </a:r>
+            <a:r>
+              <a:rPr lang="en-US" dirty="0"/>
+              <a:t>” is one property attached to element / relationship in a view, </a:t>
+            </a:r>
+            <a:r>
+              <a:rPr lang="en-US" b="1" dirty="0"/>
+              <a:t>NOT</a:t>
+            </a:r>
+            <a:r>
+              <a:rPr lang="en-US" dirty="0"/>
+              <a:t> in Archi model repository</a:t>
+            </a:r>
+          </a:p>
+          <a:p>
+            <a:r>
+              <a:rPr lang="en-US" dirty="0"/>
+              <a:t>Archi HTML report doesn’t have those HTML-style properties exported since they display view as </a:t>
+            </a:r>
+            <a:r>
+              <a:rPr lang="en-US" b="1" dirty="0"/>
+              <a:t>Image</a:t>
+            </a:r>
+          </a:p>
+          <a:p>
+            <a:r>
+              <a:rPr lang="en-US" dirty="0"/>
+              <a:t>In CRUD example, the way to use alasql to query those type information may need to model CRUD as </a:t>
+            </a:r>
+            <a:r>
+              <a:rPr lang="en-US" b="1" dirty="0"/>
+              <a:t>Archi property</a:t>
+            </a:r>
+          </a:p>
+          <a:p>
+            <a:endParaRPr lang="en-US" dirty="0"/>
+          </a:p>
+          <a:p>
+            <a:r>
+              <a:rPr lang="en-US" dirty="0"/>
+              <a:t>See live demo…</a:t>
+            </a:r>
+          </a:p>
+        </p:txBody>
+      </p:sp>
+      <p:sp>
+        <p:nvSpPr>
+          <p:cNvPr id="4" name="Footer Placeholder 3">
+            <a:extLst>
+              <a:ext uri="{FF2B5EF4-FFF2-40B4-BE49-F238E27FC236}">
+                <a16:creationId xmlns:a16="http://schemas.microsoft.com/office/drawing/2014/main" id="{F6AA7F5A-9E01-C9AC-2936-20E0643215EF}"/>
+              </a:ext>
+            </a:extLst>
+          </p:cNvPr>
+          <p:cNvSpPr>
+            <a:spLocks noGrp="1"/>
+          </p:cNvSpPr>
+          <p:nvPr>
+            <p:ph type="ftr" sz="quarter" idx="11"/>
+          </p:nvPr>
+        </p:nvSpPr>
+        <p:spPr/>
+        <p:txBody>
+          <a:bodyPr/>
+          <a:lstStyle/>
+          <a:p>
+            <a:r>
+              <a:rPr lang="en-US"/>
+              <a:t>Practice of Using Archi plug-in - coArchi</a:t>
+            </a:r>
+            <a:endParaRPr lang="en-US" dirty="0"/>
+          </a:p>
+        </p:txBody>
+      </p:sp>
+      <p:sp>
+        <p:nvSpPr>
+          <p:cNvPr id="5" name="Date Placeholder 4">
+            <a:extLst>
+              <a:ext uri="{FF2B5EF4-FFF2-40B4-BE49-F238E27FC236}">
+                <a16:creationId xmlns:a16="http://schemas.microsoft.com/office/drawing/2014/main" id="{7499DAD4-C9A0-7C16-B5A4-B20AC96612E9}"/>
+              </a:ext>
+            </a:extLst>
+          </p:cNvPr>
+          <p:cNvSpPr>
+            <a:spLocks noGrp="1"/>
+          </p:cNvSpPr>
+          <p:nvPr>
+            <p:ph type="dt" sz="half" idx="10"/>
+          </p:nvPr>
+        </p:nvSpPr>
+        <p:spPr/>
+        <p:txBody>
+          <a:bodyPr/>
+          <a:lstStyle/>
+          <a:p>
+            <a:pPr>
+              <a:defRPr/>
+            </a:pPr>
+            <a:r>
+              <a:rPr lang="en-US">
+                <a:solidFill>
+                  <a:prstClr val="black"/>
+                </a:solidFill>
+              </a:rPr>
+              <a:t>Feb., 2024</a:t>
+            </a:r>
+            <a:endParaRPr lang="en-US" dirty="0">
+              <a:solidFill>
+                <a:prstClr val="black"/>
+              </a:solidFill>
+            </a:endParaRPr>
+          </a:p>
+        </p:txBody>
+      </p:sp>
+      <p:sp>
+        <p:nvSpPr>
+          <p:cNvPr id="6" name="Slide Number Placeholder 5">
+            <a:extLst>
+              <a:ext uri="{FF2B5EF4-FFF2-40B4-BE49-F238E27FC236}">
+                <a16:creationId xmlns:a16="http://schemas.microsoft.com/office/drawing/2014/main" id="{B5D866FD-50EC-91C8-FAAC-D96521B4B295}"/>
+              </a:ext>
+            </a:extLst>
+          </p:cNvPr>
+          <p:cNvSpPr>
+            <a:spLocks noGrp="1"/>
+          </p:cNvSpPr>
+          <p:nvPr>
+            <p:ph type="sldNum" sz="quarter" idx="12"/>
+          </p:nvPr>
+        </p:nvSpPr>
+        <p:spPr/>
+        <p:txBody>
+          <a:bodyPr/>
+          <a:lstStyle/>
+          <a:p>
+            <a:pPr marL="0" marR="0" lvl="0" indent="0" algn="r" defTabSz="914400" rtl="0" eaLnBrk="1" fontAlgn="auto" latinLnBrk="0" hangingPunct="1">
+              <a:lnSpc>
+                <a:spcPct val="100000"/>
+              </a:lnSpc>
+              <a:spcBef>
+                <a:spcPts val="0"/>
+              </a:spcBef>
+              <a:spcAft>
+                <a:spcPts val="0"/>
+              </a:spcAft>
+              <a:buClrTx/>
+              <a:buSzTx/>
+              <a:buFontTx/>
+              <a:buNone/>
+              <a:tabLst/>
+              <a:defRPr/>
+            </a:pPr>
+            <a:fld id="{06B786C7-B8F9-4072-AAAA-17258464D730}" type="slidenum">
+              <a:rPr kumimoji="0" lang="en-US" sz="1050" b="0" i="0" u="none" strike="noStrike" kern="1200" cap="none" spc="0" normalizeH="0" baseline="0" noProof="0" smtClean="0">
+                <a:ln>
+                  <a:noFill/>
+                </a:ln>
+                <a:solidFill>
+                  <a:prstClr val="black"/>
+                </a:solidFill>
+                <a:effectLst/>
+                <a:uLnTx/>
+                <a:uFillTx/>
+                <a:latin typeface="Avenir Next LT Pro"/>
+                <a:ea typeface="+mn-ea"/>
+                <a:cs typeface="+mn-cs"/>
+              </a:rPr>
+              <a:pPr marL="0" marR="0" lvl="0" indent="0" algn="r" defTabSz="914400" rtl="0" eaLnBrk="1" fontAlgn="auto" latinLnBrk="0" hangingPunct="1">
+                <a:lnSpc>
+                  <a:spcPct val="100000"/>
+                </a:lnSpc>
+                <a:spcBef>
+                  <a:spcPts val="0"/>
+                </a:spcBef>
+                <a:spcAft>
+                  <a:spcPts val="0"/>
+                </a:spcAft>
+                <a:buClrTx/>
+                <a:buSzTx/>
+                <a:buFontTx/>
+                <a:buNone/>
+                <a:tabLst/>
+                <a:defRPr/>
+              </a:pPr>
+              <a:t>7</a:t>
+            </a:fld>
+            <a:endParaRPr kumimoji="0" lang="en-US" sz="1050" b="0" i="0" u="none" strike="noStrike" kern="1200" cap="none" spc="0" normalizeH="0" baseline="0" noProof="0" dirty="0">
+              <a:ln>
+                <a:noFill/>
+              </a:ln>
+              <a:solidFill>
+                <a:prstClr val="black"/>
+              </a:solidFill>
+              <a:effectLst/>
+              <a:uLnTx/>
+              <a:uFillTx/>
+              <a:latin typeface="Avenir Next LT Pro"/>
+              <a:ea typeface="+mn-ea"/>
+              <a:cs typeface="+mn-cs"/>
+            </a:endParaRPr>
+          </a:p>
+        </p:txBody>
+      </p:sp>
+    </p:spTree>
+    <p:extLst>
+      <p:ext uri="{BB962C8B-B14F-4D97-AF65-F5344CB8AC3E}">
+        <p14:creationId xmlns:p14="http://schemas.microsoft.com/office/powerpoint/2010/main" val="1016937927"/>
       </p:ext>
     </p:extLst>
   </p:cSld>
@@ -8864,6 +9852,34 @@
 </file>
 
 <file path=customXml/item1.xml><?xml version="1.0" encoding="utf-8"?>
+<p:properties xmlns:p="http://schemas.microsoft.com/office/2006/metadata/properties" xmlns:xsi="http://www.w3.org/2001/XMLSchema-instance" xmlns:pc="http://schemas.microsoft.com/office/infopath/2007/PartnerControls">
+  <documentManagement>
+    <Status xmlns="71af3243-3dd4-4a8d-8c0d-dd76da1f02a5">Not started</Status>
+    <_ip_UnifiedCompliancePolicyUIAction xmlns="http://schemas.microsoft.com/sharepoint/v3" xsi:nil="true"/>
+    <Image xmlns="71af3243-3dd4-4a8d-8c0d-dd76da1f02a5">
+      <Url xsi:nil="true"/>
+      <Description xsi:nil="true"/>
+    </Image>
+    <_ip_UnifiedCompliancePolicyProperties xmlns="http://schemas.microsoft.com/sharepoint/v3" xsi:nil="true"/>
+    <ImageTagsTaxHTField xmlns="71af3243-3dd4-4a8d-8c0d-dd76da1f02a5">
+      <Terms xmlns="http://schemas.microsoft.com/office/infopath/2007/PartnerControls"/>
+    </ImageTagsTaxHTField>
+    <TaxCatchAll xmlns="230e9df3-be65-4c73-a93b-d1236ebd677e"/>
+    <MediaServiceKeyPoints xmlns="71af3243-3dd4-4a8d-8c0d-dd76da1f02a5" xsi:nil="true"/>
+  </documentManagement>
+</p:properties>
+</file>
+
+<file path=customXml/item2.xml><?xml version="1.0" encoding="utf-8"?>
+<?mso-contentType ?>
+<FormTemplates xmlns="http://schemas.microsoft.com/sharepoint/v3/contenttype/forms">
+  <Display>DocumentLibraryForm</Display>
+  <Edit>DocumentLibraryForm</Edit>
+  <New>DocumentLibraryForm</New>
+</FormTemplates>
+</file>
+
+<file path=customXml/item3.xml><?xml version="1.0" encoding="utf-8"?>
 <ct:contentTypeSchema xmlns:ct="http://schemas.microsoft.com/office/2006/metadata/contentType" xmlns:ma="http://schemas.microsoft.com/office/2006/metadata/properties/metaAttributes" ct:_="" ma:_="" ma:contentTypeName="Document" ma:contentTypeID="0x01010079F111ED35F8CC479449609E8A0923A6" ma:contentTypeVersion="20" ma:contentTypeDescription="Create a new document." ma:contentTypeScope="" ma:versionID="1267097ee5f5874adfcc408041ae252e">
   <xsd:schema xmlns:xsd="http://www.w3.org/2001/XMLSchema" xmlns:xs="http://www.w3.org/2001/XMLSchema" xmlns:p="http://schemas.microsoft.com/office/2006/metadata/properties" xmlns:ns1="http://schemas.microsoft.com/sharepoint/v3" xmlns:ns2="71af3243-3dd4-4a8d-8c0d-dd76da1f02a5" xmlns:ns3="16c05727-aa75-4e4a-9b5f-8a80a1165891" xmlns:ns4="230e9df3-be65-4c73-a93b-d1236ebd677e" targetNamespace="http://schemas.microsoft.com/office/2006/metadata/properties" ma:root="true" ma:fieldsID="395891a93df65b14727750f2c06c306c" ns1:_="" ns2:_="" ns3:_="" ns4:_="">
     <xsd:import namespace="http://schemas.microsoft.com/sharepoint/v3"/>
@@ -9139,35 +10155,27 @@
 </ct:contentTypeSchema>
 </file>
 
-<file path=customXml/item2.xml><?xml version="1.0" encoding="utf-8"?>
-<?mso-contentType ?>
-<FormTemplates xmlns="http://schemas.microsoft.com/sharepoint/v3/contenttype/forms">
-  <Display>DocumentLibraryForm</Display>
-  <Edit>DocumentLibraryForm</Edit>
-  <New>DocumentLibraryForm</New>
-</FormTemplates>
+<file path=customXml/itemProps1.xml><?xml version="1.0" encoding="utf-8"?>
+<ds:datastoreItem xmlns:ds="http://schemas.openxmlformats.org/officeDocument/2006/customXml" ds:itemID="{08757C30-AE9A-4680-90EB-19D282EC2B7C}">
+  <ds:schemaRefs>
+    <ds:schemaRef ds:uri="http://schemas.microsoft.com/office/2006/metadata/properties"/>
+    <ds:schemaRef ds:uri="http://schemas.microsoft.com/office/infopath/2007/PartnerControls"/>
+    <ds:schemaRef ds:uri="71af3243-3dd4-4a8d-8c0d-dd76da1f02a5"/>
+    <ds:schemaRef ds:uri="http://schemas.microsoft.com/sharepoint/v3"/>
+    <ds:schemaRef ds:uri="230e9df3-be65-4c73-a93b-d1236ebd677e"/>
+  </ds:schemaRefs>
+</ds:datastoreItem>
 </file>
 
-<file path=customXml/item3.xml><?xml version="1.0" encoding="utf-8"?>
-<p:properties xmlns:p="http://schemas.microsoft.com/office/2006/metadata/properties" xmlns:xsi="http://www.w3.org/2001/XMLSchema-instance" xmlns:pc="http://schemas.microsoft.com/office/infopath/2007/PartnerControls">
-  <documentManagement>
-    <Status xmlns="71af3243-3dd4-4a8d-8c0d-dd76da1f02a5">Not started</Status>
-    <_ip_UnifiedCompliancePolicyUIAction xmlns="http://schemas.microsoft.com/sharepoint/v3" xsi:nil="true"/>
-    <Image xmlns="71af3243-3dd4-4a8d-8c0d-dd76da1f02a5">
-      <Url xsi:nil="true"/>
-      <Description xsi:nil="true"/>
-    </Image>
-    <_ip_UnifiedCompliancePolicyProperties xmlns="http://schemas.microsoft.com/sharepoint/v3" xsi:nil="true"/>
-    <ImageTagsTaxHTField xmlns="71af3243-3dd4-4a8d-8c0d-dd76da1f02a5">
-      <Terms xmlns="http://schemas.microsoft.com/office/infopath/2007/PartnerControls"/>
-    </ImageTagsTaxHTField>
-    <TaxCatchAll xmlns="230e9df3-be65-4c73-a93b-d1236ebd677e"/>
-    <MediaServiceKeyPoints xmlns="71af3243-3dd4-4a8d-8c0d-dd76da1f02a5" xsi:nil="true"/>
-  </documentManagement>
-</p:properties>
+<file path=customXml/itemProps2.xml><?xml version="1.0" encoding="utf-8"?>
+<ds:datastoreItem xmlns:ds="http://schemas.openxmlformats.org/officeDocument/2006/customXml" ds:itemID="{A5CCB28C-7D26-4A36-9CFC-D739C28F3D18}">
+  <ds:schemaRefs>
+    <ds:schemaRef ds:uri="http://schemas.microsoft.com/sharepoint/v3/contenttype/forms"/>
+  </ds:schemaRefs>
+</ds:datastoreItem>
 </file>
 
-<file path=customXml/itemProps1.xml><?xml version="1.0" encoding="utf-8"?>
+<file path=customXml/itemProps3.xml><?xml version="1.0" encoding="utf-8"?>
 <ds:datastoreItem xmlns:ds="http://schemas.openxmlformats.org/officeDocument/2006/customXml" ds:itemID="{0AF0BF08-C674-44E3-8BFC-85BC65E095F1}">
   <ds:schemaRefs>
     <ds:schemaRef ds:uri="http://schemas.microsoft.com/office/2006/metadata/contentType"/>
@@ -9188,26 +10196,6 @@
 </ds:datastoreItem>
 </file>
 
-<file path=customXml/itemProps2.xml><?xml version="1.0" encoding="utf-8"?>
-<ds:datastoreItem xmlns:ds="http://schemas.openxmlformats.org/officeDocument/2006/customXml" ds:itemID="{A5CCB28C-7D26-4A36-9CFC-D739C28F3D18}">
-  <ds:schemaRefs>
-    <ds:schemaRef ds:uri="http://schemas.microsoft.com/sharepoint/v3/contenttype/forms"/>
-  </ds:schemaRefs>
-</ds:datastoreItem>
-</file>
-
-<file path=customXml/itemProps3.xml><?xml version="1.0" encoding="utf-8"?>
-<ds:datastoreItem xmlns:ds="http://schemas.openxmlformats.org/officeDocument/2006/customXml" ds:itemID="{08757C30-AE9A-4680-90EB-19D282EC2B7C}">
-  <ds:schemaRefs>
-    <ds:schemaRef ds:uri="http://schemas.microsoft.com/office/2006/metadata/properties"/>
-    <ds:schemaRef ds:uri="http://schemas.microsoft.com/office/infopath/2007/PartnerControls"/>
-    <ds:schemaRef ds:uri="71af3243-3dd4-4a8d-8c0d-dd76da1f02a5"/>
-    <ds:schemaRef ds:uri="http://schemas.microsoft.com/sharepoint/v3"/>
-    <ds:schemaRef ds:uri="230e9df3-be65-4c73-a93b-d1236ebd677e"/>
-  </ds:schemaRefs>
-</ds:datastoreItem>
-</file>
-
 <file path=docMetadata/LabelInfo.xml><?xml version="1.0" encoding="utf-8"?>
 <clbl:labelList xmlns:clbl="http://schemas.microsoft.com/office/2020/mipLabelMetadata">
   <clbl:label id="{f42aa342-8706-4288-bd11-ebb85995028c}" enabled="1" method="Standard" siteId="{72f988bf-86f1-41af-91ab-2d7cd011db47}" contentBits="0" removed="0"/>

</xml_diff>

<commit_message>
add Archi HTML Report 04
</commit_message>
<xml_diff>
--- a/architool/Using-Archi.pptx
+++ b/architool/Using-Archi.pptx
@@ -5,10 +5,10 @@
     <p:sldMasterId id="2147483648" r:id="rId4"/>
   </p:sldMasterIdLst>
   <p:notesMasterIdLst>
-    <p:notesMasterId r:id="rId12"/>
+    <p:notesMasterId r:id="rId13"/>
   </p:notesMasterIdLst>
   <p:handoutMasterIdLst>
-    <p:handoutMasterId r:id="rId13"/>
+    <p:handoutMasterId r:id="rId14"/>
   </p:handoutMasterIdLst>
   <p:sldIdLst>
     <p:sldId id="256" r:id="rId5"/>
@@ -16,8 +16,9 @@
     <p:sldId id="257" r:id="rId7"/>
     <p:sldId id="258" r:id="rId8"/>
     <p:sldId id="262" r:id="rId9"/>
-    <p:sldId id="260" r:id="rId10"/>
-    <p:sldId id="261" r:id="rId11"/>
+    <p:sldId id="263" r:id="rId10"/>
+    <p:sldId id="260" r:id="rId11"/>
+    <p:sldId id="261" r:id="rId12"/>
   </p:sldIdLst>
   <p:sldSz cx="12192000" cy="6858000"/>
   <p:notesSz cx="6858000" cy="9144000"/>
@@ -8522,6 +8523,473 @@
         <p:cNvPr id="1" name="">
           <a:extLst>
             <a:ext uri="{FF2B5EF4-FFF2-40B4-BE49-F238E27FC236}">
+              <a16:creationId xmlns:a16="http://schemas.microsoft.com/office/drawing/2014/main" id="{C3F15A0D-D8B7-5FA3-6C7C-6C5C9EF327A9}"/>
+            </a:ext>
+          </a:extLst>
+        </p:cNvPr>
+        <p:cNvGrpSpPr/>
+        <p:nvPr/>
+      </p:nvGrpSpPr>
+      <p:grpSpPr>
+        <a:xfrm>
+          <a:off x="0" y="0"/>
+          <a:ext cx="0" cy="0"/>
+          <a:chOff x="0" y="0"/>
+          <a:chExt cx="0" cy="0"/>
+        </a:xfrm>
+      </p:grpSpPr>
+      <p:sp>
+        <p:nvSpPr>
+          <p:cNvPr id="7" name="Title 6">
+            <a:extLst>
+              <a:ext uri="{FF2B5EF4-FFF2-40B4-BE49-F238E27FC236}">
+                <a16:creationId xmlns:a16="http://schemas.microsoft.com/office/drawing/2014/main" id="{26DBF019-C3D0-A785-9BC2-BC83AC7444FA}"/>
+              </a:ext>
+            </a:extLst>
+          </p:cNvPr>
+          <p:cNvSpPr>
+            <a:spLocks noGrp="1"/>
+          </p:cNvSpPr>
+          <p:nvPr>
+            <p:ph type="ctrTitle"/>
+          </p:nvPr>
+        </p:nvSpPr>
+        <p:spPr>
+          <a:xfrm>
+            <a:off x="649044" y="1308846"/>
+            <a:ext cx="6815446" cy="4078942"/>
+          </a:xfrm>
+        </p:spPr>
+        <p:txBody>
+          <a:bodyPr>
+            <a:noAutofit/>
+          </a:bodyPr>
+          <a:lstStyle/>
+          <a:p>
+            <a:r>
+              <a:rPr lang="en-US" sz="7200" dirty="0"/>
+              <a:t>Query on CRUD in </a:t>
+            </a:r>
+            <a:r>
+              <a:rPr lang="en-US" sz="7200" dirty="0" err="1"/>
+              <a:t>FlowRelation</a:t>
+            </a:r>
+            <a:endParaRPr lang="en-US" sz="7200" dirty="0"/>
+          </a:p>
+        </p:txBody>
+      </p:sp>
+      <p:sp>
+        <p:nvSpPr>
+          <p:cNvPr id="8" name="Subtitle 7">
+            <a:extLst>
+              <a:ext uri="{FF2B5EF4-FFF2-40B4-BE49-F238E27FC236}">
+                <a16:creationId xmlns:a16="http://schemas.microsoft.com/office/drawing/2014/main" id="{378E1A8F-FB7A-1558-0BB7-BC61F80191F4}"/>
+              </a:ext>
+            </a:extLst>
+          </p:cNvPr>
+          <p:cNvSpPr>
+            <a:spLocks noGrp="1"/>
+          </p:cNvSpPr>
+          <p:nvPr>
+            <p:ph type="subTitle" idx="1"/>
+          </p:nvPr>
+        </p:nvSpPr>
+        <p:spPr>
+          <a:xfrm>
+            <a:off x="649045" y="4640424"/>
+            <a:ext cx="6437555" cy="1303176"/>
+          </a:xfrm>
+        </p:spPr>
+        <p:txBody>
+          <a:bodyPr/>
+          <a:lstStyle/>
+          <a:p>
+            <a:r>
+              <a:rPr lang="en-US" dirty="0"/>
+              <a:t>Xiaoqi Zhao</a:t>
+            </a:r>
+          </a:p>
+        </p:txBody>
+      </p:sp>
+      <p:pic>
+        <p:nvPicPr>
+          <p:cNvPr id="5" name="Picture Placeholder 4" descr="A picture containing mountain, sky, outdoor, nature, sunrise ">
+            <a:extLst>
+              <a:ext uri="{FF2B5EF4-FFF2-40B4-BE49-F238E27FC236}">
+                <a16:creationId xmlns:a16="http://schemas.microsoft.com/office/drawing/2014/main" id="{716CF632-3F3D-9453-7458-A4E246767C4E}"/>
+              </a:ext>
+            </a:extLst>
+          </p:cNvPr>
+          <p:cNvPicPr>
+            <a:picLocks noGrp="1" noChangeAspect="1"/>
+          </p:cNvPicPr>
+          <p:nvPr>
+            <p:ph type="pic" sz="quarter" idx="13"/>
+          </p:nvPr>
+        </p:nvPicPr>
+        <p:blipFill rotWithShape="1">
+          <a:blip r:embed="rId2" cstate="screen">
+            <a:extLst>
+              <a:ext uri="{28A0092B-C50C-407E-A947-70E740481C1C}">
+                <a14:useLocalDpi xmlns:a14="http://schemas.microsoft.com/office/drawing/2010/main" val="0"/>
+              </a:ext>
+            </a:extLst>
+          </a:blip>
+          <a:srcRect/>
+          <a:stretch/>
+        </p:blipFill>
+        <p:spPr>
+          <a:xfrm>
+            <a:off x="8113533" y="0"/>
+            <a:ext cx="4082983" cy="6858000"/>
+          </a:xfrm>
+        </p:spPr>
+      </p:pic>
+      <p:pic>
+        <p:nvPicPr>
+          <p:cNvPr id="3" name="Picture 2">
+            <a:extLst>
+              <a:ext uri="{FF2B5EF4-FFF2-40B4-BE49-F238E27FC236}">
+                <a16:creationId xmlns:a16="http://schemas.microsoft.com/office/drawing/2014/main" id="{4B4BEB9D-9245-4798-A2F4-952A6D45B743}"/>
+              </a:ext>
+            </a:extLst>
+          </p:cNvPr>
+          <p:cNvPicPr>
+            <a:picLocks noChangeAspect="1"/>
+          </p:cNvPicPr>
+          <p:nvPr/>
+        </p:nvPicPr>
+        <p:blipFill>
+          <a:blip r:embed="rId3"/>
+          <a:stretch>
+            <a:fillRect/>
+          </a:stretch>
+        </p:blipFill>
+        <p:spPr>
+          <a:xfrm>
+            <a:off x="8109019" y="-1"/>
+            <a:ext cx="4082982" cy="1681945"/>
+          </a:xfrm>
+          <a:prstGeom prst="rect">
+            <a:avLst/>
+          </a:prstGeom>
+          <a:ln>
+            <a:noFill/>
+          </a:ln>
+          <a:effectLst>
+            <a:softEdge rad="112500"/>
+          </a:effectLst>
+        </p:spPr>
+      </p:pic>
+      <p:pic>
+        <p:nvPicPr>
+          <p:cNvPr id="9" name="Picture 8">
+            <a:extLst>
+              <a:ext uri="{FF2B5EF4-FFF2-40B4-BE49-F238E27FC236}">
+                <a16:creationId xmlns:a16="http://schemas.microsoft.com/office/drawing/2014/main" id="{D29990FB-3621-36A0-F00F-96A07A24084E}"/>
+              </a:ext>
+            </a:extLst>
+          </p:cNvPr>
+          <p:cNvPicPr>
+            <a:picLocks noChangeAspect="1"/>
+          </p:cNvPicPr>
+          <p:nvPr/>
+        </p:nvPicPr>
+        <p:blipFill>
+          <a:blip r:embed="rId4"/>
+          <a:stretch>
+            <a:fillRect/>
+          </a:stretch>
+        </p:blipFill>
+        <p:spPr>
+          <a:xfrm>
+            <a:off x="5147295" y="6167625"/>
+            <a:ext cx="2810500" cy="585267"/>
+          </a:xfrm>
+          <a:prstGeom prst="rect">
+            <a:avLst/>
+          </a:prstGeom>
+        </p:spPr>
+      </p:pic>
+      <p:sp>
+        <p:nvSpPr>
+          <p:cNvPr id="11" name="Subtitle 7">
+            <a:extLst>
+              <a:ext uri="{FF2B5EF4-FFF2-40B4-BE49-F238E27FC236}">
+                <a16:creationId xmlns:a16="http://schemas.microsoft.com/office/drawing/2014/main" id="{4F525409-BE82-E23C-F1F5-5AD171E66E45}"/>
+              </a:ext>
+            </a:extLst>
+          </p:cNvPr>
+          <p:cNvSpPr txBox="1">
+            <a:spLocks/>
+          </p:cNvSpPr>
+          <p:nvPr/>
+        </p:nvSpPr>
+        <p:spPr>
+          <a:xfrm>
+            <a:off x="649045" y="188258"/>
+            <a:ext cx="6437555" cy="699247"/>
+          </a:xfrm>
+          <a:prstGeom prst="rect">
+            <a:avLst/>
+          </a:prstGeom>
+        </p:spPr>
+        <p:txBody>
+          <a:bodyPr vert="horz" lIns="91440" tIns="45720" rIns="91440" bIns="45720" rtlCol="0" anchor="b">
+            <a:normAutofit fontScale="92500"/>
+          </a:bodyPr>
+          <a:lstStyle>
+            <a:lvl1pPr marL="0" indent="0" algn="l" defTabSz="914400" rtl="0" eaLnBrk="1" latinLnBrk="0" hangingPunct="1">
+              <a:lnSpc>
+                <a:spcPct val="110000"/>
+              </a:lnSpc>
+              <a:spcBef>
+                <a:spcPts val="1000"/>
+              </a:spcBef>
+              <a:buFont typeface="Arial" panose="020B0604020202020204" pitchFamily="34" charset="0"/>
+              <a:buNone/>
+              <a:defRPr sz="2800" b="1" kern="1200" spc="-20" baseline="0">
+                <a:solidFill>
+                  <a:schemeClr val="bg1"/>
+                </a:solidFill>
+                <a:latin typeface="+mn-lt"/>
+                <a:ea typeface="+mn-ea"/>
+                <a:cs typeface="+mn-cs"/>
+              </a:defRPr>
+            </a:lvl1pPr>
+            <a:lvl2pPr marL="685800" indent="-228600" algn="l" defTabSz="914400" rtl="0" eaLnBrk="1" latinLnBrk="0" hangingPunct="1">
+              <a:lnSpc>
+                <a:spcPct val="110000"/>
+              </a:lnSpc>
+              <a:spcBef>
+                <a:spcPts val="500"/>
+              </a:spcBef>
+              <a:buFont typeface="Arial" panose="020B0604020202020204" pitchFamily="34" charset="0"/>
+              <a:buChar char="•"/>
+              <a:defRPr sz="2000" kern="1200" spc="-20" baseline="0">
+                <a:solidFill>
+                  <a:schemeClr val="tx1"/>
+                </a:solidFill>
+                <a:latin typeface="+mn-lt"/>
+                <a:ea typeface="+mn-ea"/>
+                <a:cs typeface="+mn-cs"/>
+              </a:defRPr>
+            </a:lvl2pPr>
+            <a:lvl3pPr marL="1143000" indent="-228600" algn="l" defTabSz="914400" rtl="0" eaLnBrk="1" latinLnBrk="0" hangingPunct="1">
+              <a:lnSpc>
+                <a:spcPct val="110000"/>
+              </a:lnSpc>
+              <a:spcBef>
+                <a:spcPts val="500"/>
+              </a:spcBef>
+              <a:buFont typeface="Arial" panose="020B0604020202020204" pitchFamily="34" charset="0"/>
+              <a:buChar char="•"/>
+              <a:defRPr sz="1800" kern="1200" spc="-20" baseline="0">
+                <a:solidFill>
+                  <a:schemeClr val="tx1"/>
+                </a:solidFill>
+                <a:latin typeface="+mn-lt"/>
+                <a:ea typeface="+mn-ea"/>
+                <a:cs typeface="+mn-cs"/>
+              </a:defRPr>
+            </a:lvl3pPr>
+            <a:lvl4pPr marL="1600200" indent="-228600" algn="l" defTabSz="914400" rtl="0" eaLnBrk="1" latinLnBrk="0" hangingPunct="1">
+              <a:lnSpc>
+                <a:spcPct val="110000"/>
+              </a:lnSpc>
+              <a:spcBef>
+                <a:spcPts val="500"/>
+              </a:spcBef>
+              <a:buFont typeface="Arial" panose="020B0604020202020204" pitchFamily="34" charset="0"/>
+              <a:buChar char="•"/>
+              <a:defRPr sz="1600" kern="1200" spc="-20" baseline="0">
+                <a:solidFill>
+                  <a:schemeClr val="tx1"/>
+                </a:solidFill>
+                <a:latin typeface="+mn-lt"/>
+                <a:ea typeface="+mn-ea"/>
+                <a:cs typeface="+mn-cs"/>
+              </a:defRPr>
+            </a:lvl4pPr>
+            <a:lvl5pPr marL="2057400" indent="-228600" algn="l" defTabSz="914400" rtl="0" eaLnBrk="1" latinLnBrk="0" hangingPunct="1">
+              <a:lnSpc>
+                <a:spcPct val="110000"/>
+              </a:lnSpc>
+              <a:spcBef>
+                <a:spcPts val="500"/>
+              </a:spcBef>
+              <a:buFont typeface="Arial" panose="020B0604020202020204" pitchFamily="34" charset="0"/>
+              <a:buChar char="•"/>
+              <a:defRPr sz="1600" kern="1200" spc="-20" baseline="0">
+                <a:solidFill>
+                  <a:schemeClr val="tx1"/>
+                </a:solidFill>
+                <a:latin typeface="+mn-lt"/>
+                <a:ea typeface="+mn-ea"/>
+                <a:cs typeface="+mn-cs"/>
+              </a:defRPr>
+            </a:lvl5pPr>
+            <a:lvl6pPr marL="2514600" indent="-228600" algn="l" defTabSz="914400" rtl="0" eaLnBrk="1" latinLnBrk="0" hangingPunct="1">
+              <a:lnSpc>
+                <a:spcPct val="90000"/>
+              </a:lnSpc>
+              <a:spcBef>
+                <a:spcPts val="500"/>
+              </a:spcBef>
+              <a:buFont typeface="Arial" panose="020B0604020202020204" pitchFamily="34" charset="0"/>
+              <a:buChar char="•"/>
+              <a:defRPr sz="1800" kern="1200">
+                <a:solidFill>
+                  <a:schemeClr val="tx1"/>
+                </a:solidFill>
+                <a:latin typeface="+mn-lt"/>
+                <a:ea typeface="+mn-ea"/>
+                <a:cs typeface="+mn-cs"/>
+              </a:defRPr>
+            </a:lvl6pPr>
+            <a:lvl7pPr marL="2971800" indent="-228600" algn="l" defTabSz="914400" rtl="0" eaLnBrk="1" latinLnBrk="0" hangingPunct="1">
+              <a:lnSpc>
+                <a:spcPct val="90000"/>
+              </a:lnSpc>
+              <a:spcBef>
+                <a:spcPts val="500"/>
+              </a:spcBef>
+              <a:buFont typeface="Arial" panose="020B0604020202020204" pitchFamily="34" charset="0"/>
+              <a:buChar char="•"/>
+              <a:defRPr sz="1800" kern="1200">
+                <a:solidFill>
+                  <a:schemeClr val="tx1"/>
+                </a:solidFill>
+                <a:latin typeface="+mn-lt"/>
+                <a:ea typeface="+mn-ea"/>
+                <a:cs typeface="+mn-cs"/>
+              </a:defRPr>
+            </a:lvl7pPr>
+            <a:lvl8pPr marL="3429000" indent="-228600" algn="l" defTabSz="914400" rtl="0" eaLnBrk="1" latinLnBrk="0" hangingPunct="1">
+              <a:lnSpc>
+                <a:spcPct val="90000"/>
+              </a:lnSpc>
+              <a:spcBef>
+                <a:spcPts val="500"/>
+              </a:spcBef>
+              <a:buFont typeface="Arial" panose="020B0604020202020204" pitchFamily="34" charset="0"/>
+              <a:buChar char="•"/>
+              <a:defRPr sz="1800" kern="1200">
+                <a:solidFill>
+                  <a:schemeClr val="tx1"/>
+                </a:solidFill>
+                <a:latin typeface="+mn-lt"/>
+                <a:ea typeface="+mn-ea"/>
+                <a:cs typeface="+mn-cs"/>
+              </a:defRPr>
+            </a:lvl8pPr>
+            <a:lvl9pPr marL="3886200" indent="-228600" algn="l" defTabSz="914400" rtl="0" eaLnBrk="1" latinLnBrk="0" hangingPunct="1">
+              <a:lnSpc>
+                <a:spcPct val="90000"/>
+              </a:lnSpc>
+              <a:spcBef>
+                <a:spcPts val="500"/>
+              </a:spcBef>
+              <a:buFont typeface="Arial" panose="020B0604020202020204" pitchFamily="34" charset="0"/>
+              <a:buChar char="•"/>
+              <a:defRPr sz="1800" kern="1200">
+                <a:solidFill>
+                  <a:schemeClr val="tx1"/>
+                </a:solidFill>
+                <a:latin typeface="+mn-lt"/>
+                <a:ea typeface="+mn-ea"/>
+                <a:cs typeface="+mn-cs"/>
+              </a:defRPr>
+            </a:lvl9pPr>
+          </a:lstStyle>
+          <a:p>
+            <a:r>
+              <a:rPr lang="en-US" sz="4000" dirty="0"/>
+              <a:t>Archi HTML Report - 04</a:t>
+            </a:r>
+          </a:p>
+        </p:txBody>
+      </p:sp>
+      <p:pic>
+        <p:nvPicPr>
+          <p:cNvPr id="1026" name="Picture 2" descr="CRUD: Definition, Operations, Benefits How it Works and More">
+            <a:extLst>
+              <a:ext uri="{FF2B5EF4-FFF2-40B4-BE49-F238E27FC236}">
+                <a16:creationId xmlns:a16="http://schemas.microsoft.com/office/drawing/2014/main" id="{F70196CE-1903-AEC7-3723-A7B4E914DB2C}"/>
+              </a:ext>
+            </a:extLst>
+          </p:cNvPr>
+          <p:cNvPicPr>
+            <a:picLocks noChangeAspect="1" noChangeArrowheads="1"/>
+          </p:cNvPicPr>
+          <p:nvPr/>
+        </p:nvPicPr>
+        <p:blipFill>
+          <a:blip r:embed="rId5">
+            <a:extLst>
+              <a:ext uri="{28A0092B-C50C-407E-A947-70E740481C1C}">
+                <a14:useLocalDpi xmlns:a14="http://schemas.microsoft.com/office/drawing/2010/main" val="0"/>
+              </a:ext>
+            </a:extLst>
+          </a:blip>
+          <a:srcRect/>
+          <a:stretch>
+            <a:fillRect/>
+          </a:stretch>
+        </p:blipFill>
+        <p:spPr bwMode="auto">
+          <a:xfrm>
+            <a:off x="6681216" y="2340426"/>
+            <a:ext cx="5346192" cy="2673096"/>
+          </a:xfrm>
+          <a:prstGeom prst="roundRect">
+            <a:avLst>
+              <a:gd name="adj" fmla="val 8594"/>
+            </a:avLst>
+          </a:prstGeom>
+          <a:solidFill>
+            <a:srgbClr val="FFFFFF">
+              <a:shade val="85000"/>
+            </a:srgbClr>
+          </a:solidFill>
+          <a:ln>
+            <a:noFill/>
+          </a:ln>
+          <a:effectLst>
+            <a:reflection blurRad="12700" stA="38000" endPos="28000" dist="5000" dir="5400000" sy="-100000" algn="bl" rotWithShape="0"/>
+          </a:effectLst>
+          <a:extLst>
+            <a:ext uri="{909E8E84-426E-40DD-AFC4-6F175D3DCCD1}">
+              <a14:hiddenFill xmlns:a14="http://schemas.microsoft.com/office/drawing/2010/main">
+                <a:solidFill>
+                  <a:srgbClr val="FFFFFF"/>
+                </a:solidFill>
+              </a14:hiddenFill>
+            </a:ext>
+          </a:extLst>
+        </p:spPr>
+      </p:pic>
+    </p:spTree>
+    <p:extLst>
+      <p:ext uri="{BB962C8B-B14F-4D97-AF65-F5344CB8AC3E}">
+        <p14:creationId xmlns:p14="http://schemas.microsoft.com/office/powerpoint/2010/main" val="3899680482"/>
+      </p:ext>
+    </p:extLst>
+  </p:cSld>
+  <p:clrMapOvr>
+    <a:masterClrMapping/>
+  </p:clrMapOvr>
+</p:sld>
+</file>
+
+<file path=ppt/slides/slide7.xml><?xml version="1.0" encoding="utf-8"?>
+<p:sld xmlns:a="http://schemas.openxmlformats.org/drawingml/2006/main" xmlns:r="http://schemas.openxmlformats.org/officeDocument/2006/relationships" xmlns:p="http://schemas.openxmlformats.org/presentationml/2006/main">
+  <p:cSld>
+    <p:spTree>
+      <p:nvGrpSpPr>
+        <p:cNvPr id="1" name="">
+          <a:extLst>
+            <a:ext uri="{FF2B5EF4-FFF2-40B4-BE49-F238E27FC236}">
               <a16:creationId xmlns:a16="http://schemas.microsoft.com/office/drawing/2014/main" id="{F9F99694-F06A-3C01-5824-44ACBDD5EB25}"/>
             </a:ext>
           </a:extLst>
@@ -8769,7 +9237,7 @@
 </p:sld>
 </file>
 
-<file path=ppt/slides/slide7.xml><?xml version="1.0" encoding="utf-8"?>
+<file path=ppt/slides/slide8.xml><?xml version="1.0" encoding="utf-8"?>
 <p:sld xmlns:a="http://schemas.openxmlformats.org/drawingml/2006/main" xmlns:r="http://schemas.openxmlformats.org/officeDocument/2006/relationships" xmlns:p="http://schemas.openxmlformats.org/presentationml/2006/main">
   <p:cSld>
     <p:spTree>
@@ -9028,7 +9496,7 @@
                 <a:tabLst/>
                 <a:defRPr/>
               </a:pPr>
-              <a:t>7</a:t>
+              <a:t>8</a:t>
             </a:fld>
             <a:endParaRPr kumimoji="0" lang="en-US" sz="1050" b="0" i="0" u="none" strike="noStrike" kern="1200" cap="none" spc="0" normalizeH="0" baseline="0" noProof="0" dirty="0">
               <a:ln>

</xml_diff>

<commit_message>
add Archi HTML Report 05
</commit_message>
<xml_diff>
--- a/architool/Using-Archi.pptx
+++ b/architool/Using-Archi.pptx
@@ -8568,45 +8568,7 @@
           <a:p>
             <a:r>
               <a:rPr lang="en-US" sz="7200" dirty="0"/>
-              <a:t>Query on CRUD in </a:t>
-            </a:r>
-            <a:r>
-              <a:rPr lang="en-US" sz="7200" dirty="0" err="1"/>
-              <a:t>FlowRelation</a:t>
-            </a:r>
-            <a:endParaRPr lang="en-US" sz="7200" dirty="0"/>
-          </a:p>
-        </p:txBody>
-      </p:sp>
-      <p:sp>
-        <p:nvSpPr>
-          <p:cNvPr id="8" name="Subtitle 7">
-            <a:extLst>
-              <a:ext uri="{FF2B5EF4-FFF2-40B4-BE49-F238E27FC236}">
-                <a16:creationId xmlns:a16="http://schemas.microsoft.com/office/drawing/2014/main" id="{378E1A8F-FB7A-1558-0BB7-BC61F80191F4}"/>
-              </a:ext>
-            </a:extLst>
-          </p:cNvPr>
-          <p:cNvSpPr>
-            <a:spLocks noGrp="1"/>
-          </p:cNvSpPr>
-          <p:nvPr>
-            <p:ph type="subTitle" idx="1"/>
-          </p:nvPr>
-        </p:nvSpPr>
-        <p:spPr>
-          <a:xfrm>
-            <a:off x="649045" y="4640424"/>
-            <a:ext cx="6437555" cy="1303176"/>
-          </a:xfrm>
-        </p:spPr>
-        <p:txBody>
-          <a:bodyPr/>
-          <a:lstStyle/>
-          <a:p>
-            <a:r>
-              <a:rPr lang="en-US" dirty="0"/>
-              <a:t>Xiaoqi Zhao</a:t>
+              <a:t>Q&amp;A - Query on CRUD in FlowRelation</a:t>
             </a:r>
           </a:p>
         </p:txBody>
@@ -8703,7 +8665,7 @@
         </p:blipFill>
         <p:spPr>
           <a:xfrm>
-            <a:off x="5147295" y="6167625"/>
+            <a:off x="0" y="4428255"/>
             <a:ext cx="2810500" cy="585267"/>
           </a:xfrm>
           <a:prstGeom prst="rect">
@@ -8905,7 +8867,7 @@
           <a:p>
             <a:r>
               <a:rPr lang="en-US" sz="4000" dirty="0"/>
-              <a:t>Archi HTML Report - 04</a:t>
+              <a:t>Archi HTML Report - 05</a:t>
             </a:r>
           </a:p>
         </p:txBody>
@@ -9030,7 +8992,7 @@
           <a:p>
             <a:r>
               <a:rPr lang="en-US" sz="4000" dirty="0"/>
-              <a:t>Archi HTML Report - Question Got:</a:t>
+              <a:t>Question Got from Dave Gordon:</a:t>
             </a:r>
           </a:p>
         </p:txBody>

</xml_diff>

<commit_message>
add open exchange file video
</commit_message>
<xml_diff>
--- a/architool/Using-Archi.pptx
+++ b/architool/Using-Archi.pptx
@@ -5,10 +5,10 @@
     <p:sldMasterId id="2147483648" r:id="rId4"/>
   </p:sldMasterIdLst>
   <p:notesMasterIdLst>
-    <p:notesMasterId r:id="rId13"/>
+    <p:notesMasterId r:id="rId14"/>
   </p:notesMasterIdLst>
   <p:handoutMasterIdLst>
-    <p:handoutMasterId r:id="rId14"/>
+    <p:handoutMasterId r:id="rId15"/>
   </p:handoutMasterIdLst>
   <p:sldIdLst>
     <p:sldId id="256" r:id="rId5"/>
@@ -19,6 +19,7 @@
     <p:sldId id="263" r:id="rId10"/>
     <p:sldId id="260" r:id="rId11"/>
     <p:sldId id="261" r:id="rId12"/>
+    <p:sldId id="264" r:id="rId13"/>
   </p:sldIdLst>
   <p:sldSz cx="12192000" cy="6858000"/>
   <p:notesSz cx="6858000" cy="9144000"/>
@@ -222,7 +223,7 @@
           <a:p>
             <a:fld id="{9410D272-305C-421E-A9EF-95D63D599B42}" type="datetimeFigureOut">
               <a:rPr lang="en-US" smtClean="0"/>
-              <a:t>3/1/2025</a:t>
+              <a:t>9/14/2025</a:t>
             </a:fld>
             <a:endParaRPr lang="en-US" dirty="0"/>
           </a:p>
@@ -399,7 +400,7 @@
           <a:p>
             <a:fld id="{05E16E63-7886-43BC-8DD4-4F14C3DD7360}" type="datetimeFigureOut">
               <a:rPr lang="en-US" smtClean="0"/>
-              <a:t>3/1/2025</a:t>
+              <a:t>9/14/2025</a:t>
             </a:fld>
             <a:endParaRPr lang="en-US" dirty="0"/>
           </a:p>
@@ -8920,15 +8921,6 @@
           <a:effectLst>
             <a:reflection blurRad="12700" stA="38000" endPos="28000" dist="5000" dir="5400000" sy="-100000" algn="bl" rotWithShape="0"/>
           </a:effectLst>
-          <a:extLst>
-            <a:ext uri="{909E8E84-426E-40DD-AFC4-6F175D3DCCD1}">
-              <a14:hiddenFill xmlns:a14="http://schemas.microsoft.com/office/drawing/2010/main">
-                <a:solidFill>
-                  <a:srgbClr val="FFFFFF"/>
-                </a:solidFill>
-              </a14:hiddenFill>
-            </a:ext>
-          </a:extLst>
         </p:spPr>
       </p:pic>
     </p:spTree>
@@ -9481,6 +9473,713 @@
     <p:extLst>
       <p:ext uri="{BB962C8B-B14F-4D97-AF65-F5344CB8AC3E}">
         <p14:creationId xmlns:p14="http://schemas.microsoft.com/office/powerpoint/2010/main" val="1016937927"/>
+      </p:ext>
+    </p:extLst>
+  </p:cSld>
+  <p:clrMapOvr>
+    <a:masterClrMapping/>
+  </p:clrMapOvr>
+</p:sld>
+</file>
+
+<file path=ppt/slides/slide9.xml><?xml version="1.0" encoding="utf-8"?>
+<p:sld xmlns:a="http://schemas.openxmlformats.org/drawingml/2006/main" xmlns:r="http://schemas.openxmlformats.org/officeDocument/2006/relationships" xmlns:p="http://schemas.openxmlformats.org/presentationml/2006/main">
+  <p:cSld>
+    <p:spTree>
+      <p:nvGrpSpPr>
+        <p:cNvPr id="1" name="">
+          <a:extLst>
+            <a:ext uri="{FF2B5EF4-FFF2-40B4-BE49-F238E27FC236}">
+              <a16:creationId xmlns:a16="http://schemas.microsoft.com/office/drawing/2014/main" id="{4509558D-AF20-4414-2CF5-A67F49F7FB1B}"/>
+            </a:ext>
+          </a:extLst>
+        </p:cNvPr>
+        <p:cNvGrpSpPr/>
+        <p:nvPr/>
+      </p:nvGrpSpPr>
+      <p:grpSpPr>
+        <a:xfrm>
+          <a:off x="0" y="0"/>
+          <a:ext cx="0" cy="0"/>
+          <a:chOff x="0" y="0"/>
+          <a:chExt cx="0" cy="0"/>
+        </a:xfrm>
+      </p:grpSpPr>
+      <p:sp>
+        <p:nvSpPr>
+          <p:cNvPr id="7" name="Title 6">
+            <a:extLst>
+              <a:ext uri="{FF2B5EF4-FFF2-40B4-BE49-F238E27FC236}">
+                <a16:creationId xmlns:a16="http://schemas.microsoft.com/office/drawing/2014/main" id="{EF8CE278-CEAC-7058-FC55-24E4D48A39C1}"/>
+              </a:ext>
+            </a:extLst>
+          </p:cNvPr>
+          <p:cNvSpPr>
+            <a:spLocks noGrp="1"/>
+          </p:cNvSpPr>
+          <p:nvPr>
+            <p:ph type="ctrTitle"/>
+          </p:nvPr>
+        </p:nvSpPr>
+        <p:spPr>
+          <a:xfrm>
+            <a:off x="649044" y="1308846"/>
+            <a:ext cx="6815446" cy="4078942"/>
+          </a:xfrm>
+        </p:spPr>
+        <p:txBody>
+          <a:bodyPr>
+            <a:noAutofit/>
+          </a:bodyPr>
+          <a:lstStyle/>
+          <a:p>
+            <a:r>
+              <a:rPr lang="en-US" sz="7200" dirty="0"/>
+              <a:t>Interoperating via ArchiMate Open Exchange File</a:t>
+            </a:r>
+          </a:p>
+        </p:txBody>
+      </p:sp>
+      <p:sp>
+        <p:nvSpPr>
+          <p:cNvPr id="8" name="Subtitle 7">
+            <a:extLst>
+              <a:ext uri="{FF2B5EF4-FFF2-40B4-BE49-F238E27FC236}">
+                <a16:creationId xmlns:a16="http://schemas.microsoft.com/office/drawing/2014/main" id="{2C8D6717-BA4C-57DD-3E48-40A8E2B2E01B}"/>
+              </a:ext>
+            </a:extLst>
+          </p:cNvPr>
+          <p:cNvSpPr>
+            <a:spLocks noGrp="1"/>
+          </p:cNvSpPr>
+          <p:nvPr>
+            <p:ph type="subTitle" idx="1"/>
+          </p:nvPr>
+        </p:nvSpPr>
+        <p:spPr>
+          <a:xfrm>
+            <a:off x="649045" y="4640424"/>
+            <a:ext cx="6437555" cy="1303176"/>
+          </a:xfrm>
+        </p:spPr>
+        <p:txBody>
+          <a:bodyPr/>
+          <a:lstStyle/>
+          <a:p>
+            <a:r>
+              <a:rPr lang="en-US" dirty="0"/>
+              <a:t>Xiaoqi Zhao</a:t>
+            </a:r>
+          </a:p>
+        </p:txBody>
+      </p:sp>
+      <p:pic>
+        <p:nvPicPr>
+          <p:cNvPr id="5" name="Picture Placeholder 4" descr="A picture containing mountain, sky, outdoor, nature, sunrise ">
+            <a:extLst>
+              <a:ext uri="{FF2B5EF4-FFF2-40B4-BE49-F238E27FC236}">
+                <a16:creationId xmlns:a16="http://schemas.microsoft.com/office/drawing/2014/main" id="{70942310-D7EA-A83B-8AFA-EC55B5346890}"/>
+              </a:ext>
+            </a:extLst>
+          </p:cNvPr>
+          <p:cNvPicPr>
+            <a:picLocks noGrp="1" noChangeAspect="1"/>
+          </p:cNvPicPr>
+          <p:nvPr>
+            <p:ph type="pic" sz="quarter" idx="13"/>
+          </p:nvPr>
+        </p:nvPicPr>
+        <p:blipFill rotWithShape="1">
+          <a:blip r:embed="rId2" cstate="screen">
+            <a:extLst>
+              <a:ext uri="{28A0092B-C50C-407E-A947-70E740481C1C}">
+                <a14:useLocalDpi xmlns:a14="http://schemas.microsoft.com/office/drawing/2010/main" val="0"/>
+              </a:ext>
+            </a:extLst>
+          </a:blip>
+          <a:srcRect/>
+          <a:stretch/>
+        </p:blipFill>
+        <p:spPr>
+          <a:xfrm>
+            <a:off x="8113533" y="0"/>
+            <a:ext cx="4082983" cy="6858000"/>
+          </a:xfrm>
+        </p:spPr>
+      </p:pic>
+      <p:pic>
+        <p:nvPicPr>
+          <p:cNvPr id="3" name="Picture 2">
+            <a:extLst>
+              <a:ext uri="{FF2B5EF4-FFF2-40B4-BE49-F238E27FC236}">
+                <a16:creationId xmlns:a16="http://schemas.microsoft.com/office/drawing/2014/main" id="{67781E78-736C-C0BC-6092-F1E8267A5935}"/>
+              </a:ext>
+            </a:extLst>
+          </p:cNvPr>
+          <p:cNvPicPr>
+            <a:picLocks noChangeAspect="1"/>
+          </p:cNvPicPr>
+          <p:nvPr/>
+        </p:nvPicPr>
+        <p:blipFill>
+          <a:blip r:embed="rId3"/>
+          <a:stretch>
+            <a:fillRect/>
+          </a:stretch>
+        </p:blipFill>
+        <p:spPr>
+          <a:xfrm>
+            <a:off x="4600321" y="-22484"/>
+            <a:ext cx="3537169" cy="1457103"/>
+          </a:xfrm>
+          <a:prstGeom prst="rect">
+            <a:avLst/>
+          </a:prstGeom>
+          <a:ln>
+            <a:noFill/>
+          </a:ln>
+          <a:effectLst>
+            <a:softEdge rad="112500"/>
+          </a:effectLst>
+        </p:spPr>
+      </p:pic>
+      <p:sp>
+        <p:nvSpPr>
+          <p:cNvPr id="11" name="Subtitle 7">
+            <a:extLst>
+              <a:ext uri="{FF2B5EF4-FFF2-40B4-BE49-F238E27FC236}">
+                <a16:creationId xmlns:a16="http://schemas.microsoft.com/office/drawing/2014/main" id="{1F732C2D-5582-DFF8-7822-BFC8F9ED30AB}"/>
+              </a:ext>
+            </a:extLst>
+          </p:cNvPr>
+          <p:cNvSpPr txBox="1">
+            <a:spLocks/>
+          </p:cNvSpPr>
+          <p:nvPr/>
+        </p:nvSpPr>
+        <p:spPr>
+          <a:xfrm>
+            <a:off x="649045" y="188258"/>
+            <a:ext cx="6437555" cy="699247"/>
+          </a:xfrm>
+          <a:prstGeom prst="rect">
+            <a:avLst/>
+          </a:prstGeom>
+        </p:spPr>
+        <p:txBody>
+          <a:bodyPr vert="horz" lIns="91440" tIns="45720" rIns="91440" bIns="45720" rtlCol="0" anchor="b">
+            <a:normAutofit/>
+          </a:bodyPr>
+          <a:lstStyle>
+            <a:lvl1pPr marL="0" indent="0" algn="l" defTabSz="914400" rtl="0" eaLnBrk="1" latinLnBrk="0" hangingPunct="1">
+              <a:lnSpc>
+                <a:spcPct val="110000"/>
+              </a:lnSpc>
+              <a:spcBef>
+                <a:spcPts val="1000"/>
+              </a:spcBef>
+              <a:buFont typeface="Arial" panose="020B0604020202020204" pitchFamily="34" charset="0"/>
+              <a:buNone/>
+              <a:defRPr sz="2800" b="1" kern="1200" spc="-20" baseline="0">
+                <a:solidFill>
+                  <a:schemeClr val="bg1"/>
+                </a:solidFill>
+                <a:latin typeface="+mn-lt"/>
+                <a:ea typeface="+mn-ea"/>
+                <a:cs typeface="+mn-cs"/>
+              </a:defRPr>
+            </a:lvl1pPr>
+            <a:lvl2pPr marL="685800" indent="-228600" algn="l" defTabSz="914400" rtl="0" eaLnBrk="1" latinLnBrk="0" hangingPunct="1">
+              <a:lnSpc>
+                <a:spcPct val="110000"/>
+              </a:lnSpc>
+              <a:spcBef>
+                <a:spcPts val="500"/>
+              </a:spcBef>
+              <a:buFont typeface="Arial" panose="020B0604020202020204" pitchFamily="34" charset="0"/>
+              <a:buChar char="•"/>
+              <a:defRPr sz="2000" kern="1200" spc="-20" baseline="0">
+                <a:solidFill>
+                  <a:schemeClr val="tx1"/>
+                </a:solidFill>
+                <a:latin typeface="+mn-lt"/>
+                <a:ea typeface="+mn-ea"/>
+                <a:cs typeface="+mn-cs"/>
+              </a:defRPr>
+            </a:lvl2pPr>
+            <a:lvl3pPr marL="1143000" indent="-228600" algn="l" defTabSz="914400" rtl="0" eaLnBrk="1" latinLnBrk="0" hangingPunct="1">
+              <a:lnSpc>
+                <a:spcPct val="110000"/>
+              </a:lnSpc>
+              <a:spcBef>
+                <a:spcPts val="500"/>
+              </a:spcBef>
+              <a:buFont typeface="Arial" panose="020B0604020202020204" pitchFamily="34" charset="0"/>
+              <a:buChar char="•"/>
+              <a:defRPr sz="1800" kern="1200" spc="-20" baseline="0">
+                <a:solidFill>
+                  <a:schemeClr val="tx1"/>
+                </a:solidFill>
+                <a:latin typeface="+mn-lt"/>
+                <a:ea typeface="+mn-ea"/>
+                <a:cs typeface="+mn-cs"/>
+              </a:defRPr>
+            </a:lvl3pPr>
+            <a:lvl4pPr marL="1600200" indent="-228600" algn="l" defTabSz="914400" rtl="0" eaLnBrk="1" latinLnBrk="0" hangingPunct="1">
+              <a:lnSpc>
+                <a:spcPct val="110000"/>
+              </a:lnSpc>
+              <a:spcBef>
+                <a:spcPts val="500"/>
+              </a:spcBef>
+              <a:buFont typeface="Arial" panose="020B0604020202020204" pitchFamily="34" charset="0"/>
+              <a:buChar char="•"/>
+              <a:defRPr sz="1600" kern="1200" spc="-20" baseline="0">
+                <a:solidFill>
+                  <a:schemeClr val="tx1"/>
+                </a:solidFill>
+                <a:latin typeface="+mn-lt"/>
+                <a:ea typeface="+mn-ea"/>
+                <a:cs typeface="+mn-cs"/>
+              </a:defRPr>
+            </a:lvl4pPr>
+            <a:lvl5pPr marL="2057400" indent="-228600" algn="l" defTabSz="914400" rtl="0" eaLnBrk="1" latinLnBrk="0" hangingPunct="1">
+              <a:lnSpc>
+                <a:spcPct val="110000"/>
+              </a:lnSpc>
+              <a:spcBef>
+                <a:spcPts val="500"/>
+              </a:spcBef>
+              <a:buFont typeface="Arial" panose="020B0604020202020204" pitchFamily="34" charset="0"/>
+              <a:buChar char="•"/>
+              <a:defRPr sz="1600" kern="1200" spc="-20" baseline="0">
+                <a:solidFill>
+                  <a:schemeClr val="tx1"/>
+                </a:solidFill>
+                <a:latin typeface="+mn-lt"/>
+                <a:ea typeface="+mn-ea"/>
+                <a:cs typeface="+mn-cs"/>
+              </a:defRPr>
+            </a:lvl5pPr>
+            <a:lvl6pPr marL="2514600" indent="-228600" algn="l" defTabSz="914400" rtl="0" eaLnBrk="1" latinLnBrk="0" hangingPunct="1">
+              <a:lnSpc>
+                <a:spcPct val="90000"/>
+              </a:lnSpc>
+              <a:spcBef>
+                <a:spcPts val="500"/>
+              </a:spcBef>
+              <a:buFont typeface="Arial" panose="020B0604020202020204" pitchFamily="34" charset="0"/>
+              <a:buChar char="•"/>
+              <a:defRPr sz="1800" kern="1200">
+                <a:solidFill>
+                  <a:schemeClr val="tx1"/>
+                </a:solidFill>
+                <a:latin typeface="+mn-lt"/>
+                <a:ea typeface="+mn-ea"/>
+                <a:cs typeface="+mn-cs"/>
+              </a:defRPr>
+            </a:lvl6pPr>
+            <a:lvl7pPr marL="2971800" indent="-228600" algn="l" defTabSz="914400" rtl="0" eaLnBrk="1" latinLnBrk="0" hangingPunct="1">
+              <a:lnSpc>
+                <a:spcPct val="90000"/>
+              </a:lnSpc>
+              <a:spcBef>
+                <a:spcPts val="500"/>
+              </a:spcBef>
+              <a:buFont typeface="Arial" panose="020B0604020202020204" pitchFamily="34" charset="0"/>
+              <a:buChar char="•"/>
+              <a:defRPr sz="1800" kern="1200">
+                <a:solidFill>
+                  <a:schemeClr val="tx1"/>
+                </a:solidFill>
+                <a:latin typeface="+mn-lt"/>
+                <a:ea typeface="+mn-ea"/>
+                <a:cs typeface="+mn-cs"/>
+              </a:defRPr>
+            </a:lvl7pPr>
+            <a:lvl8pPr marL="3429000" indent="-228600" algn="l" defTabSz="914400" rtl="0" eaLnBrk="1" latinLnBrk="0" hangingPunct="1">
+              <a:lnSpc>
+                <a:spcPct val="90000"/>
+              </a:lnSpc>
+              <a:spcBef>
+                <a:spcPts val="500"/>
+              </a:spcBef>
+              <a:buFont typeface="Arial" panose="020B0604020202020204" pitchFamily="34" charset="0"/>
+              <a:buChar char="•"/>
+              <a:defRPr sz="1800" kern="1200">
+                <a:solidFill>
+                  <a:schemeClr val="tx1"/>
+                </a:solidFill>
+                <a:latin typeface="+mn-lt"/>
+                <a:ea typeface="+mn-ea"/>
+                <a:cs typeface="+mn-cs"/>
+              </a:defRPr>
+            </a:lvl8pPr>
+            <a:lvl9pPr marL="3886200" indent="-228600" algn="l" defTabSz="914400" rtl="0" eaLnBrk="1" latinLnBrk="0" hangingPunct="1">
+              <a:lnSpc>
+                <a:spcPct val="90000"/>
+              </a:lnSpc>
+              <a:spcBef>
+                <a:spcPts val="500"/>
+              </a:spcBef>
+              <a:buFont typeface="Arial" panose="020B0604020202020204" pitchFamily="34" charset="0"/>
+              <a:buChar char="•"/>
+              <a:defRPr sz="1800" kern="1200">
+                <a:solidFill>
+                  <a:schemeClr val="tx1"/>
+                </a:solidFill>
+                <a:latin typeface="+mn-lt"/>
+                <a:ea typeface="+mn-ea"/>
+                <a:cs typeface="+mn-cs"/>
+              </a:defRPr>
+            </a:lvl9pPr>
+          </a:lstStyle>
+          <a:p>
+            <a:r>
+              <a:rPr lang="en-US" dirty="0"/>
+              <a:t>Archi Tool Usage</a:t>
+            </a:r>
+          </a:p>
+        </p:txBody>
+      </p:sp>
+      <p:pic>
+        <p:nvPicPr>
+          <p:cNvPr id="6" name="Picture 5">
+            <a:extLst>
+              <a:ext uri="{FF2B5EF4-FFF2-40B4-BE49-F238E27FC236}">
+                <a16:creationId xmlns:a16="http://schemas.microsoft.com/office/drawing/2014/main" id="{09F63E69-2DA3-B6D3-1F58-D1982B394846}"/>
+              </a:ext>
+            </a:extLst>
+          </p:cNvPr>
+          <p:cNvPicPr>
+            <a:picLocks noChangeAspect="1"/>
+          </p:cNvPicPr>
+          <p:nvPr/>
+        </p:nvPicPr>
+        <p:blipFill>
+          <a:blip r:embed="rId4"/>
+          <a:stretch>
+            <a:fillRect/>
+          </a:stretch>
+        </p:blipFill>
+        <p:spPr>
+          <a:xfrm>
+            <a:off x="9328094" y="706067"/>
+            <a:ext cx="1118724" cy="1082506"/>
+          </a:xfrm>
+          <a:prstGeom prst="roundRect">
+            <a:avLst>
+              <a:gd name="adj" fmla="val 8594"/>
+            </a:avLst>
+          </a:prstGeom>
+          <a:solidFill>
+            <a:srgbClr val="FFFFFF">
+              <a:shade val="85000"/>
+            </a:srgbClr>
+          </a:solidFill>
+          <a:ln>
+            <a:noFill/>
+          </a:ln>
+          <a:effectLst>
+            <a:reflection blurRad="12700" stA="38000" endPos="28000" dist="5000" dir="5400000" sy="-100000" algn="bl" rotWithShape="0"/>
+          </a:effectLst>
+        </p:spPr>
+      </p:pic>
+      <p:pic>
+        <p:nvPicPr>
+          <p:cNvPr id="12" name="Picture 11">
+            <a:extLst>
+              <a:ext uri="{FF2B5EF4-FFF2-40B4-BE49-F238E27FC236}">
+                <a16:creationId xmlns:a16="http://schemas.microsoft.com/office/drawing/2014/main" id="{D5D5B460-8F1D-BB66-69DC-561CE40B2E93}"/>
+              </a:ext>
+            </a:extLst>
+          </p:cNvPr>
+          <p:cNvPicPr>
+            <a:picLocks noChangeAspect="1"/>
+          </p:cNvPicPr>
+          <p:nvPr/>
+        </p:nvPicPr>
+        <p:blipFill>
+          <a:blip r:embed="rId5"/>
+          <a:stretch>
+            <a:fillRect/>
+          </a:stretch>
+        </p:blipFill>
+        <p:spPr>
+          <a:xfrm>
+            <a:off x="7803122" y="3774576"/>
+            <a:ext cx="1118724" cy="1082506"/>
+          </a:xfrm>
+          <a:prstGeom prst="roundRect">
+            <a:avLst>
+              <a:gd name="adj" fmla="val 8594"/>
+            </a:avLst>
+          </a:prstGeom>
+          <a:solidFill>
+            <a:srgbClr val="FFFFFF">
+              <a:shade val="85000"/>
+            </a:srgbClr>
+          </a:solidFill>
+          <a:ln>
+            <a:noFill/>
+          </a:ln>
+          <a:effectLst>
+            <a:reflection blurRad="12700" stA="38000" endPos="28000" dist="5000" dir="5400000" sy="-100000" algn="bl" rotWithShape="0"/>
+          </a:effectLst>
+        </p:spPr>
+      </p:pic>
+      <p:pic>
+        <p:nvPicPr>
+          <p:cNvPr id="14" name="Picture 13">
+            <a:extLst>
+              <a:ext uri="{FF2B5EF4-FFF2-40B4-BE49-F238E27FC236}">
+                <a16:creationId xmlns:a16="http://schemas.microsoft.com/office/drawing/2014/main" id="{3022D315-E2C2-FA4A-7A66-3DDCB0983F46}"/>
+              </a:ext>
+            </a:extLst>
+          </p:cNvPr>
+          <p:cNvPicPr>
+            <a:picLocks noChangeAspect="1"/>
+          </p:cNvPicPr>
+          <p:nvPr/>
+        </p:nvPicPr>
+        <p:blipFill>
+          <a:blip r:embed="rId6"/>
+          <a:stretch>
+            <a:fillRect/>
+          </a:stretch>
+        </p:blipFill>
+        <p:spPr>
+          <a:xfrm>
+            <a:off x="10804891" y="3827174"/>
+            <a:ext cx="1118724" cy="1082506"/>
+          </a:xfrm>
+          <a:prstGeom prst="roundRect">
+            <a:avLst>
+              <a:gd name="adj" fmla="val 8594"/>
+            </a:avLst>
+          </a:prstGeom>
+          <a:solidFill>
+            <a:srgbClr val="FFFFFF">
+              <a:shade val="85000"/>
+            </a:srgbClr>
+          </a:solidFill>
+          <a:ln>
+            <a:noFill/>
+          </a:ln>
+          <a:effectLst>
+            <a:reflection blurRad="12700" stA="38000" endPos="28000" dist="5000" dir="5400000" sy="-100000" algn="bl" rotWithShape="0"/>
+          </a:effectLst>
+        </p:spPr>
+      </p:pic>
+      <p:pic>
+        <p:nvPicPr>
+          <p:cNvPr id="16" name="Picture 15">
+            <a:extLst>
+              <a:ext uri="{FF2B5EF4-FFF2-40B4-BE49-F238E27FC236}">
+                <a16:creationId xmlns:a16="http://schemas.microsoft.com/office/drawing/2014/main" id="{6FC7621A-8483-A7EA-2C57-8BD575086061}"/>
+              </a:ext>
+            </a:extLst>
+          </p:cNvPr>
+          <p:cNvPicPr>
+            <a:picLocks noChangeAspect="1"/>
+          </p:cNvPicPr>
+          <p:nvPr/>
+        </p:nvPicPr>
+        <p:blipFill>
+          <a:blip r:embed="rId7"/>
+          <a:stretch>
+            <a:fillRect/>
+          </a:stretch>
+        </p:blipFill>
+        <p:spPr>
+          <a:xfrm>
+            <a:off x="9323037" y="2329000"/>
+            <a:ext cx="1076475" cy="1019317"/>
+          </a:xfrm>
+          <a:prstGeom prst="roundRect">
+            <a:avLst>
+              <a:gd name="adj" fmla="val 8594"/>
+            </a:avLst>
+          </a:prstGeom>
+          <a:solidFill>
+            <a:srgbClr val="FFFFFF">
+              <a:shade val="85000"/>
+            </a:srgbClr>
+          </a:solidFill>
+          <a:ln>
+            <a:noFill/>
+          </a:ln>
+          <a:effectLst>
+            <a:reflection blurRad="12700" stA="38000" endPos="28000" dist="5000" dir="5400000" sy="-100000" algn="bl" rotWithShape="0"/>
+          </a:effectLst>
+        </p:spPr>
+      </p:pic>
+      <p:sp>
+        <p:nvSpPr>
+          <p:cNvPr id="17" name="Arrow: Left-Right 16">
+            <a:extLst>
+              <a:ext uri="{FF2B5EF4-FFF2-40B4-BE49-F238E27FC236}">
+                <a16:creationId xmlns:a16="http://schemas.microsoft.com/office/drawing/2014/main" id="{E568D64C-ABFB-40D6-CF9E-3EC15CE22A45}"/>
+              </a:ext>
+            </a:extLst>
+          </p:cNvPr>
+          <p:cNvSpPr/>
+          <p:nvPr/>
+        </p:nvSpPr>
+        <p:spPr>
+          <a:xfrm rot="5400000">
+            <a:off x="9572398" y="1880989"/>
+            <a:ext cx="582626" cy="319636"/>
+          </a:xfrm>
+          <a:prstGeom prst="leftRightArrow">
+            <a:avLst/>
+          </a:prstGeom>
+        </p:spPr>
+        <p:style>
+          <a:lnRef idx="1">
+            <a:schemeClr val="accent6"/>
+          </a:lnRef>
+          <a:fillRef idx="2">
+            <a:schemeClr val="accent6"/>
+          </a:fillRef>
+          <a:effectRef idx="1">
+            <a:schemeClr val="accent6"/>
+          </a:effectRef>
+          <a:fontRef idx="minor">
+            <a:schemeClr val="dk1"/>
+          </a:fontRef>
+        </p:style>
+        <p:txBody>
+          <a:bodyPr rtlCol="0" anchor="ctr"/>
+          <a:lstStyle/>
+          <a:p>
+            <a:pPr algn="ctr"/>
+            <a:endParaRPr lang="en-US"/>
+          </a:p>
+        </p:txBody>
+      </p:sp>
+      <p:sp>
+        <p:nvSpPr>
+          <p:cNvPr id="18" name="Arrow: Left-Right 17">
+            <a:extLst>
+              <a:ext uri="{FF2B5EF4-FFF2-40B4-BE49-F238E27FC236}">
+                <a16:creationId xmlns:a16="http://schemas.microsoft.com/office/drawing/2014/main" id="{6B3FBB9D-C36F-A7B0-A6BD-0D526ECA41D9}"/>
+              </a:ext>
+            </a:extLst>
+          </p:cNvPr>
+          <p:cNvSpPr/>
+          <p:nvPr/>
+        </p:nvSpPr>
+        <p:spPr>
+          <a:xfrm rot="2683574">
+            <a:off x="10513577" y="3299990"/>
+            <a:ext cx="582626" cy="319636"/>
+          </a:xfrm>
+          <a:prstGeom prst="leftRightArrow">
+            <a:avLst/>
+          </a:prstGeom>
+        </p:spPr>
+        <p:style>
+          <a:lnRef idx="1">
+            <a:schemeClr val="accent6"/>
+          </a:lnRef>
+          <a:fillRef idx="2">
+            <a:schemeClr val="accent6"/>
+          </a:fillRef>
+          <a:effectRef idx="1">
+            <a:schemeClr val="accent6"/>
+          </a:effectRef>
+          <a:fontRef idx="minor">
+            <a:schemeClr val="dk1"/>
+          </a:fontRef>
+        </p:style>
+        <p:txBody>
+          <a:bodyPr rtlCol="0" anchor="ctr"/>
+          <a:lstStyle/>
+          <a:p>
+            <a:pPr algn="ctr"/>
+            <a:endParaRPr lang="en-US"/>
+          </a:p>
+        </p:txBody>
+      </p:sp>
+      <p:sp>
+        <p:nvSpPr>
+          <p:cNvPr id="19" name="Arrow: Left-Right 18">
+            <a:extLst>
+              <a:ext uri="{FF2B5EF4-FFF2-40B4-BE49-F238E27FC236}">
+                <a16:creationId xmlns:a16="http://schemas.microsoft.com/office/drawing/2014/main" id="{1B4867B7-71F4-3AE5-3D05-6F6EFB42D59D}"/>
+              </a:ext>
+            </a:extLst>
+          </p:cNvPr>
+          <p:cNvSpPr/>
+          <p:nvPr/>
+        </p:nvSpPr>
+        <p:spPr>
+          <a:xfrm rot="18803854">
+            <a:off x="8740411" y="3315036"/>
+            <a:ext cx="582626" cy="319636"/>
+          </a:xfrm>
+          <a:prstGeom prst="leftRightArrow">
+            <a:avLst/>
+          </a:prstGeom>
+        </p:spPr>
+        <p:style>
+          <a:lnRef idx="1">
+            <a:schemeClr val="accent6"/>
+          </a:lnRef>
+          <a:fillRef idx="2">
+            <a:schemeClr val="accent6"/>
+          </a:fillRef>
+          <a:effectRef idx="1">
+            <a:schemeClr val="accent6"/>
+          </a:effectRef>
+          <a:fontRef idx="minor">
+            <a:schemeClr val="dk1"/>
+          </a:fontRef>
+        </p:style>
+        <p:txBody>
+          <a:bodyPr rtlCol="0" anchor="ctr"/>
+          <a:lstStyle/>
+          <a:p>
+            <a:pPr algn="ctr"/>
+            <a:endParaRPr lang="en-US"/>
+          </a:p>
+        </p:txBody>
+      </p:sp>
+      <p:pic>
+        <p:nvPicPr>
+          <p:cNvPr id="20" name="Picture 19">
+            <a:extLst>
+              <a:ext uri="{FF2B5EF4-FFF2-40B4-BE49-F238E27FC236}">
+                <a16:creationId xmlns:a16="http://schemas.microsoft.com/office/drawing/2014/main" id="{FE688D4C-A6E4-F5AB-9E55-E9BC44CFFB9D}"/>
+              </a:ext>
+            </a:extLst>
+          </p:cNvPr>
+          <p:cNvPicPr>
+            <a:picLocks noChangeAspect="1"/>
+          </p:cNvPicPr>
+          <p:nvPr/>
+        </p:nvPicPr>
+        <p:blipFill>
+          <a:blip r:embed="rId8"/>
+          <a:stretch>
+            <a:fillRect/>
+          </a:stretch>
+        </p:blipFill>
+        <p:spPr>
+          <a:xfrm>
+            <a:off x="3040166" y="5387788"/>
+            <a:ext cx="2810500" cy="585267"/>
+          </a:xfrm>
+          <a:prstGeom prst="rect">
+            <a:avLst/>
+          </a:prstGeom>
+        </p:spPr>
+      </p:pic>
+    </p:spTree>
+    <p:extLst>
+      <p:ext uri="{BB962C8B-B14F-4D97-AF65-F5344CB8AC3E}">
+        <p14:creationId xmlns:p14="http://schemas.microsoft.com/office/powerpoint/2010/main" val="3486583080"/>
       </p:ext>
     </p:extLst>
   </p:cSld>
@@ -10282,6 +10981,15 @@
 </file>
 
 <file path=customXml/item1.xml><?xml version="1.0" encoding="utf-8"?>
+<?mso-contentType ?>
+<FormTemplates xmlns="http://schemas.microsoft.com/sharepoint/v3/contenttype/forms">
+  <Display>DocumentLibraryForm</Display>
+  <Edit>DocumentLibraryForm</Edit>
+  <New>DocumentLibraryForm</New>
+</FormTemplates>
+</file>
+
+<file path=customXml/item2.xml><?xml version="1.0" encoding="utf-8"?>
 <p:properties xmlns:p="http://schemas.microsoft.com/office/2006/metadata/properties" xmlns:xsi="http://www.w3.org/2001/XMLSchema-instance" xmlns:pc="http://schemas.microsoft.com/office/infopath/2007/PartnerControls">
   <documentManagement>
     <Status xmlns="71af3243-3dd4-4a8d-8c0d-dd76da1f02a5">Not started</Status>
@@ -10298,15 +11006,6 @@
     <MediaServiceKeyPoints xmlns="71af3243-3dd4-4a8d-8c0d-dd76da1f02a5" xsi:nil="true"/>
   </documentManagement>
 </p:properties>
-</file>
-
-<file path=customXml/item2.xml><?xml version="1.0" encoding="utf-8"?>
-<?mso-contentType ?>
-<FormTemplates xmlns="http://schemas.microsoft.com/sharepoint/v3/contenttype/forms">
-  <Display>DocumentLibraryForm</Display>
-  <Edit>DocumentLibraryForm</Edit>
-  <New>DocumentLibraryForm</New>
-</FormTemplates>
 </file>
 
 <file path=customXml/item3.xml><?xml version="1.0" encoding="utf-8"?>
@@ -10586,6 +11285,14 @@
 </file>
 
 <file path=customXml/itemProps1.xml><?xml version="1.0" encoding="utf-8"?>
+<ds:datastoreItem xmlns:ds="http://schemas.openxmlformats.org/officeDocument/2006/customXml" ds:itemID="{A5CCB28C-7D26-4A36-9CFC-D739C28F3D18}">
+  <ds:schemaRefs>
+    <ds:schemaRef ds:uri="http://schemas.microsoft.com/sharepoint/v3/contenttype/forms"/>
+  </ds:schemaRefs>
+</ds:datastoreItem>
+</file>
+
+<file path=customXml/itemProps2.xml><?xml version="1.0" encoding="utf-8"?>
 <ds:datastoreItem xmlns:ds="http://schemas.openxmlformats.org/officeDocument/2006/customXml" ds:itemID="{08757C30-AE9A-4680-90EB-19D282EC2B7C}">
   <ds:schemaRefs>
     <ds:schemaRef ds:uri="http://schemas.microsoft.com/office/2006/metadata/properties"/>
@@ -10593,14 +11300,6 @@
     <ds:schemaRef ds:uri="71af3243-3dd4-4a8d-8c0d-dd76da1f02a5"/>
     <ds:schemaRef ds:uri="http://schemas.microsoft.com/sharepoint/v3"/>
     <ds:schemaRef ds:uri="230e9df3-be65-4c73-a93b-d1236ebd677e"/>
-  </ds:schemaRefs>
-</ds:datastoreItem>
-</file>
-
-<file path=customXml/itemProps2.xml><?xml version="1.0" encoding="utf-8"?>
-<ds:datastoreItem xmlns:ds="http://schemas.openxmlformats.org/officeDocument/2006/customXml" ds:itemID="{A5CCB28C-7D26-4A36-9CFC-D739C28F3D18}">
-  <ds:schemaRefs>
-    <ds:schemaRef ds:uri="http://schemas.microsoft.com/sharepoint/v3/contenttype/forms"/>
   </ds:schemaRefs>
 </ds:datastoreItem>
 </file>

</xml_diff>

<commit_message>
add Archi Excel plug-in notice
</commit_message>
<xml_diff>
--- a/architool/Using-Archi.pptx
+++ b/architool/Using-Archi.pptx
@@ -5,10 +5,10 @@
     <p:sldMasterId id="2147483648" r:id="rId4"/>
   </p:sldMasterIdLst>
   <p:notesMasterIdLst>
-    <p:notesMasterId r:id="rId14"/>
+    <p:notesMasterId r:id="rId15"/>
   </p:notesMasterIdLst>
   <p:handoutMasterIdLst>
-    <p:handoutMasterId r:id="rId15"/>
+    <p:handoutMasterId r:id="rId16"/>
   </p:handoutMasterIdLst>
   <p:sldIdLst>
     <p:sldId id="256" r:id="rId5"/>
@@ -20,6 +20,7 @@
     <p:sldId id="260" r:id="rId11"/>
     <p:sldId id="261" r:id="rId12"/>
     <p:sldId id="264" r:id="rId13"/>
+    <p:sldId id="265" r:id="rId14"/>
   </p:sldIdLst>
   <p:sldSz cx="12192000" cy="6858000"/>
   <p:notesSz cx="6858000" cy="9144000"/>
@@ -223,7 +224,7 @@
           <a:p>
             <a:fld id="{9410D272-305C-421E-A9EF-95D63D599B42}" type="datetimeFigureOut">
               <a:rPr lang="en-US" smtClean="0"/>
-              <a:t>9/14/2025</a:t>
+              <a:t>9/26/2025</a:t>
             </a:fld>
             <a:endParaRPr lang="en-US" dirty="0"/>
           </a:p>
@@ -400,7 +401,7 @@
           <a:p>
             <a:fld id="{05E16E63-7886-43BC-8DD4-4F14C3DD7360}" type="datetimeFigureOut">
               <a:rPr lang="en-US" smtClean="0"/>
-              <a:t>9/14/2025</a:t>
+              <a:t>9/26/2025</a:t>
             </a:fld>
             <a:endParaRPr lang="en-US" dirty="0"/>
           </a:p>
@@ -6577,6 +6578,600 @@
     <p:extLst>
       <p:ext uri="{BB962C8B-B14F-4D97-AF65-F5344CB8AC3E}">
         <p14:creationId xmlns:p14="http://schemas.microsoft.com/office/powerpoint/2010/main" val="2720718388"/>
+      </p:ext>
+    </p:extLst>
+  </p:cSld>
+  <p:clrMapOvr>
+    <a:masterClrMapping/>
+  </p:clrMapOvr>
+</p:sld>
+</file>
+
+<file path=ppt/slides/slide10.xml><?xml version="1.0" encoding="utf-8"?>
+<p:sld xmlns:a="http://schemas.openxmlformats.org/drawingml/2006/main" xmlns:r="http://schemas.openxmlformats.org/officeDocument/2006/relationships" xmlns:p="http://schemas.openxmlformats.org/presentationml/2006/main">
+  <p:cSld>
+    <p:spTree>
+      <p:nvGrpSpPr>
+        <p:cNvPr id="1" name="">
+          <a:extLst>
+            <a:ext uri="{FF2B5EF4-FFF2-40B4-BE49-F238E27FC236}">
+              <a16:creationId xmlns:a16="http://schemas.microsoft.com/office/drawing/2014/main" id="{10D99C67-4E36-764F-695B-8241FA8F81A0}"/>
+            </a:ext>
+          </a:extLst>
+        </p:cNvPr>
+        <p:cNvGrpSpPr/>
+        <p:nvPr/>
+      </p:nvGrpSpPr>
+      <p:grpSpPr>
+        <a:xfrm>
+          <a:off x="0" y="0"/>
+          <a:ext cx="0" cy="0"/>
+          <a:chOff x="0" y="0"/>
+          <a:chExt cx="0" cy="0"/>
+        </a:xfrm>
+      </p:grpSpPr>
+      <p:sp>
+        <p:nvSpPr>
+          <p:cNvPr id="7" name="Title 6">
+            <a:extLst>
+              <a:ext uri="{FF2B5EF4-FFF2-40B4-BE49-F238E27FC236}">
+                <a16:creationId xmlns:a16="http://schemas.microsoft.com/office/drawing/2014/main" id="{53353808-6107-320F-D3F2-195B35FF8050}"/>
+              </a:ext>
+            </a:extLst>
+          </p:cNvPr>
+          <p:cNvSpPr>
+            <a:spLocks noGrp="1"/>
+          </p:cNvSpPr>
+          <p:nvPr>
+            <p:ph type="ctrTitle"/>
+          </p:nvPr>
+        </p:nvSpPr>
+        <p:spPr>
+          <a:xfrm>
+            <a:off x="649044" y="1308846"/>
+            <a:ext cx="6815446" cy="4078942"/>
+          </a:xfrm>
+        </p:spPr>
+        <p:txBody>
+          <a:bodyPr>
+            <a:noAutofit/>
+          </a:bodyPr>
+          <a:lstStyle/>
+          <a:p>
+            <a:r>
+              <a:rPr lang="en-US" sz="7200" dirty="0"/>
+              <a:t>Archi’s Excel Export Plug-In</a:t>
+            </a:r>
+            <a:br>
+              <a:rPr lang="en-US" sz="7200" dirty="0"/>
+            </a:br>
+            <a:r>
+              <a:rPr lang="en-US" sz="7200" dirty="0"/>
+              <a:t>1.0.0 </a:t>
+            </a:r>
+            <a:r>
+              <a:rPr lang="en-US" sz="7200" dirty="0">
+                <a:sym typeface="Wingdings" panose="05000000000000000000" pitchFamily="2" charset="2"/>
+              </a:rPr>
+              <a:t> 1.1.1</a:t>
+            </a:r>
+            <a:endParaRPr lang="en-US" sz="7200" dirty="0"/>
+          </a:p>
+        </p:txBody>
+      </p:sp>
+      <p:sp>
+        <p:nvSpPr>
+          <p:cNvPr id="8" name="Subtitle 7">
+            <a:extLst>
+              <a:ext uri="{FF2B5EF4-FFF2-40B4-BE49-F238E27FC236}">
+                <a16:creationId xmlns:a16="http://schemas.microsoft.com/office/drawing/2014/main" id="{C1E21AEC-C81C-EC4A-5D7C-50432CEB8D22}"/>
+              </a:ext>
+            </a:extLst>
+          </p:cNvPr>
+          <p:cNvSpPr>
+            <a:spLocks noGrp="1"/>
+          </p:cNvSpPr>
+          <p:nvPr>
+            <p:ph type="subTitle" idx="1"/>
+          </p:nvPr>
+        </p:nvSpPr>
+        <p:spPr>
+          <a:xfrm>
+            <a:off x="649045" y="4640424"/>
+            <a:ext cx="6437555" cy="1303176"/>
+          </a:xfrm>
+        </p:spPr>
+        <p:txBody>
+          <a:bodyPr/>
+          <a:lstStyle/>
+          <a:p>
+            <a:r>
+              <a:rPr lang="en-US" dirty="0"/>
+              <a:t>Xiaoqi Zhao</a:t>
+            </a:r>
+          </a:p>
+        </p:txBody>
+      </p:sp>
+      <p:pic>
+        <p:nvPicPr>
+          <p:cNvPr id="5" name="Picture Placeholder 4" descr="A picture containing mountain, sky, outdoor, nature, sunrise ">
+            <a:extLst>
+              <a:ext uri="{FF2B5EF4-FFF2-40B4-BE49-F238E27FC236}">
+                <a16:creationId xmlns:a16="http://schemas.microsoft.com/office/drawing/2014/main" id="{A584BAFD-0EE5-767D-2AC1-C5CF0C47148B}"/>
+              </a:ext>
+            </a:extLst>
+          </p:cNvPr>
+          <p:cNvPicPr>
+            <a:picLocks noGrp="1" noChangeAspect="1"/>
+          </p:cNvPicPr>
+          <p:nvPr>
+            <p:ph type="pic" sz="quarter" idx="13"/>
+          </p:nvPr>
+        </p:nvPicPr>
+        <p:blipFill rotWithShape="1">
+          <a:blip r:embed="rId2" cstate="screen">
+            <a:extLst>
+              <a:ext uri="{28A0092B-C50C-407E-A947-70E740481C1C}">
+                <a14:useLocalDpi xmlns:a14="http://schemas.microsoft.com/office/drawing/2010/main" val="0"/>
+              </a:ext>
+            </a:extLst>
+          </a:blip>
+          <a:srcRect/>
+          <a:stretch/>
+        </p:blipFill>
+        <p:spPr>
+          <a:xfrm>
+            <a:off x="8113533" y="0"/>
+            <a:ext cx="4082983" cy="6858000"/>
+          </a:xfrm>
+        </p:spPr>
+      </p:pic>
+      <p:pic>
+        <p:nvPicPr>
+          <p:cNvPr id="3" name="Picture 2">
+            <a:extLst>
+              <a:ext uri="{FF2B5EF4-FFF2-40B4-BE49-F238E27FC236}">
+                <a16:creationId xmlns:a16="http://schemas.microsoft.com/office/drawing/2014/main" id="{7E1A0E5C-728D-4509-BB45-0B6E851939B6}"/>
+              </a:ext>
+            </a:extLst>
+          </p:cNvPr>
+          <p:cNvPicPr>
+            <a:picLocks noChangeAspect="1"/>
+          </p:cNvPicPr>
+          <p:nvPr/>
+        </p:nvPicPr>
+        <p:blipFill>
+          <a:blip r:embed="rId3"/>
+          <a:stretch>
+            <a:fillRect/>
+          </a:stretch>
+        </p:blipFill>
+        <p:spPr>
+          <a:xfrm>
+            <a:off x="4600321" y="-22484"/>
+            <a:ext cx="3537169" cy="1457103"/>
+          </a:xfrm>
+          <a:prstGeom prst="rect">
+            <a:avLst/>
+          </a:prstGeom>
+          <a:ln>
+            <a:noFill/>
+          </a:ln>
+          <a:effectLst>
+            <a:softEdge rad="112500"/>
+          </a:effectLst>
+        </p:spPr>
+      </p:pic>
+      <p:sp>
+        <p:nvSpPr>
+          <p:cNvPr id="11" name="Subtitle 7">
+            <a:extLst>
+              <a:ext uri="{FF2B5EF4-FFF2-40B4-BE49-F238E27FC236}">
+                <a16:creationId xmlns:a16="http://schemas.microsoft.com/office/drawing/2014/main" id="{33A64A17-0F51-A041-A60A-7BFBD345AE7A}"/>
+              </a:ext>
+            </a:extLst>
+          </p:cNvPr>
+          <p:cNvSpPr txBox="1">
+            <a:spLocks/>
+          </p:cNvSpPr>
+          <p:nvPr/>
+        </p:nvSpPr>
+        <p:spPr>
+          <a:xfrm>
+            <a:off x="649045" y="188258"/>
+            <a:ext cx="6437555" cy="699247"/>
+          </a:xfrm>
+          <a:prstGeom prst="rect">
+            <a:avLst/>
+          </a:prstGeom>
+        </p:spPr>
+        <p:txBody>
+          <a:bodyPr vert="horz" lIns="91440" tIns="45720" rIns="91440" bIns="45720" rtlCol="0" anchor="b">
+            <a:normAutofit/>
+          </a:bodyPr>
+          <a:lstStyle>
+            <a:lvl1pPr marL="0" indent="0" algn="l" defTabSz="914400" rtl="0" eaLnBrk="1" latinLnBrk="0" hangingPunct="1">
+              <a:lnSpc>
+                <a:spcPct val="110000"/>
+              </a:lnSpc>
+              <a:spcBef>
+                <a:spcPts val="1000"/>
+              </a:spcBef>
+              <a:buFont typeface="Arial" panose="020B0604020202020204" pitchFamily="34" charset="0"/>
+              <a:buNone/>
+              <a:defRPr sz="2800" b="1" kern="1200" spc="-20" baseline="0">
+                <a:solidFill>
+                  <a:schemeClr val="bg1"/>
+                </a:solidFill>
+                <a:latin typeface="+mn-lt"/>
+                <a:ea typeface="+mn-ea"/>
+                <a:cs typeface="+mn-cs"/>
+              </a:defRPr>
+            </a:lvl1pPr>
+            <a:lvl2pPr marL="685800" indent="-228600" algn="l" defTabSz="914400" rtl="0" eaLnBrk="1" latinLnBrk="0" hangingPunct="1">
+              <a:lnSpc>
+                <a:spcPct val="110000"/>
+              </a:lnSpc>
+              <a:spcBef>
+                <a:spcPts val="500"/>
+              </a:spcBef>
+              <a:buFont typeface="Arial" panose="020B0604020202020204" pitchFamily="34" charset="0"/>
+              <a:buChar char="•"/>
+              <a:defRPr sz="2000" kern="1200" spc="-20" baseline="0">
+                <a:solidFill>
+                  <a:schemeClr val="tx1"/>
+                </a:solidFill>
+                <a:latin typeface="+mn-lt"/>
+                <a:ea typeface="+mn-ea"/>
+                <a:cs typeface="+mn-cs"/>
+              </a:defRPr>
+            </a:lvl2pPr>
+            <a:lvl3pPr marL="1143000" indent="-228600" algn="l" defTabSz="914400" rtl="0" eaLnBrk="1" latinLnBrk="0" hangingPunct="1">
+              <a:lnSpc>
+                <a:spcPct val="110000"/>
+              </a:lnSpc>
+              <a:spcBef>
+                <a:spcPts val="500"/>
+              </a:spcBef>
+              <a:buFont typeface="Arial" panose="020B0604020202020204" pitchFamily="34" charset="0"/>
+              <a:buChar char="•"/>
+              <a:defRPr sz="1800" kern="1200" spc="-20" baseline="0">
+                <a:solidFill>
+                  <a:schemeClr val="tx1"/>
+                </a:solidFill>
+                <a:latin typeface="+mn-lt"/>
+                <a:ea typeface="+mn-ea"/>
+                <a:cs typeface="+mn-cs"/>
+              </a:defRPr>
+            </a:lvl3pPr>
+            <a:lvl4pPr marL="1600200" indent="-228600" algn="l" defTabSz="914400" rtl="0" eaLnBrk="1" latinLnBrk="0" hangingPunct="1">
+              <a:lnSpc>
+                <a:spcPct val="110000"/>
+              </a:lnSpc>
+              <a:spcBef>
+                <a:spcPts val="500"/>
+              </a:spcBef>
+              <a:buFont typeface="Arial" panose="020B0604020202020204" pitchFamily="34" charset="0"/>
+              <a:buChar char="•"/>
+              <a:defRPr sz="1600" kern="1200" spc="-20" baseline="0">
+                <a:solidFill>
+                  <a:schemeClr val="tx1"/>
+                </a:solidFill>
+                <a:latin typeface="+mn-lt"/>
+                <a:ea typeface="+mn-ea"/>
+                <a:cs typeface="+mn-cs"/>
+              </a:defRPr>
+            </a:lvl4pPr>
+            <a:lvl5pPr marL="2057400" indent="-228600" algn="l" defTabSz="914400" rtl="0" eaLnBrk="1" latinLnBrk="0" hangingPunct="1">
+              <a:lnSpc>
+                <a:spcPct val="110000"/>
+              </a:lnSpc>
+              <a:spcBef>
+                <a:spcPts val="500"/>
+              </a:spcBef>
+              <a:buFont typeface="Arial" panose="020B0604020202020204" pitchFamily="34" charset="0"/>
+              <a:buChar char="•"/>
+              <a:defRPr sz="1600" kern="1200" spc="-20" baseline="0">
+                <a:solidFill>
+                  <a:schemeClr val="tx1"/>
+                </a:solidFill>
+                <a:latin typeface="+mn-lt"/>
+                <a:ea typeface="+mn-ea"/>
+                <a:cs typeface="+mn-cs"/>
+              </a:defRPr>
+            </a:lvl5pPr>
+            <a:lvl6pPr marL="2514600" indent="-228600" algn="l" defTabSz="914400" rtl="0" eaLnBrk="1" latinLnBrk="0" hangingPunct="1">
+              <a:lnSpc>
+                <a:spcPct val="90000"/>
+              </a:lnSpc>
+              <a:spcBef>
+                <a:spcPts val="500"/>
+              </a:spcBef>
+              <a:buFont typeface="Arial" panose="020B0604020202020204" pitchFamily="34" charset="0"/>
+              <a:buChar char="•"/>
+              <a:defRPr sz="1800" kern="1200">
+                <a:solidFill>
+                  <a:schemeClr val="tx1"/>
+                </a:solidFill>
+                <a:latin typeface="+mn-lt"/>
+                <a:ea typeface="+mn-ea"/>
+                <a:cs typeface="+mn-cs"/>
+              </a:defRPr>
+            </a:lvl6pPr>
+            <a:lvl7pPr marL="2971800" indent="-228600" algn="l" defTabSz="914400" rtl="0" eaLnBrk="1" latinLnBrk="0" hangingPunct="1">
+              <a:lnSpc>
+                <a:spcPct val="90000"/>
+              </a:lnSpc>
+              <a:spcBef>
+                <a:spcPts val="500"/>
+              </a:spcBef>
+              <a:buFont typeface="Arial" panose="020B0604020202020204" pitchFamily="34" charset="0"/>
+              <a:buChar char="•"/>
+              <a:defRPr sz="1800" kern="1200">
+                <a:solidFill>
+                  <a:schemeClr val="tx1"/>
+                </a:solidFill>
+                <a:latin typeface="+mn-lt"/>
+                <a:ea typeface="+mn-ea"/>
+                <a:cs typeface="+mn-cs"/>
+              </a:defRPr>
+            </a:lvl7pPr>
+            <a:lvl8pPr marL="3429000" indent="-228600" algn="l" defTabSz="914400" rtl="0" eaLnBrk="1" latinLnBrk="0" hangingPunct="1">
+              <a:lnSpc>
+                <a:spcPct val="90000"/>
+              </a:lnSpc>
+              <a:spcBef>
+                <a:spcPts val="500"/>
+              </a:spcBef>
+              <a:buFont typeface="Arial" panose="020B0604020202020204" pitchFamily="34" charset="0"/>
+              <a:buChar char="•"/>
+              <a:defRPr sz="1800" kern="1200">
+                <a:solidFill>
+                  <a:schemeClr val="tx1"/>
+                </a:solidFill>
+                <a:latin typeface="+mn-lt"/>
+                <a:ea typeface="+mn-ea"/>
+                <a:cs typeface="+mn-cs"/>
+              </a:defRPr>
+            </a:lvl8pPr>
+            <a:lvl9pPr marL="3886200" indent="-228600" algn="l" defTabSz="914400" rtl="0" eaLnBrk="1" latinLnBrk="0" hangingPunct="1">
+              <a:lnSpc>
+                <a:spcPct val="90000"/>
+              </a:lnSpc>
+              <a:spcBef>
+                <a:spcPts val="500"/>
+              </a:spcBef>
+              <a:buFont typeface="Arial" panose="020B0604020202020204" pitchFamily="34" charset="0"/>
+              <a:buChar char="•"/>
+              <a:defRPr sz="1800" kern="1200">
+                <a:solidFill>
+                  <a:schemeClr val="tx1"/>
+                </a:solidFill>
+                <a:latin typeface="+mn-lt"/>
+                <a:ea typeface="+mn-ea"/>
+                <a:cs typeface="+mn-cs"/>
+              </a:defRPr>
+            </a:lvl9pPr>
+          </a:lstStyle>
+          <a:p>
+            <a:r>
+              <a:rPr lang="en-US" dirty="0"/>
+              <a:t>Archi Tool Usage</a:t>
+            </a:r>
+          </a:p>
+        </p:txBody>
+      </p:sp>
+      <p:pic>
+        <p:nvPicPr>
+          <p:cNvPr id="6" name="Picture 5">
+            <a:extLst>
+              <a:ext uri="{FF2B5EF4-FFF2-40B4-BE49-F238E27FC236}">
+                <a16:creationId xmlns:a16="http://schemas.microsoft.com/office/drawing/2014/main" id="{C338BE0B-533C-5182-6A16-A7D8AE9C4D2E}"/>
+              </a:ext>
+            </a:extLst>
+          </p:cNvPr>
+          <p:cNvPicPr>
+            <a:picLocks noChangeAspect="1"/>
+          </p:cNvPicPr>
+          <p:nvPr/>
+        </p:nvPicPr>
+        <p:blipFill>
+          <a:blip r:embed="rId4"/>
+          <a:stretch>
+            <a:fillRect/>
+          </a:stretch>
+        </p:blipFill>
+        <p:spPr>
+          <a:xfrm>
+            <a:off x="3558018" y="4557467"/>
+            <a:ext cx="1125924" cy="1089473"/>
+          </a:xfrm>
+          <a:prstGeom prst="roundRect">
+            <a:avLst>
+              <a:gd name="adj" fmla="val 8594"/>
+            </a:avLst>
+          </a:prstGeom>
+          <a:solidFill>
+            <a:srgbClr val="FFFFFF">
+              <a:shade val="85000"/>
+            </a:srgbClr>
+          </a:solidFill>
+          <a:ln>
+            <a:noFill/>
+          </a:ln>
+          <a:effectLst>
+            <a:reflection blurRad="12700" stA="38000" endPos="28000" dist="5000" dir="5400000" sy="-100000" algn="bl" rotWithShape="0"/>
+          </a:effectLst>
+        </p:spPr>
+      </p:pic>
+      <p:pic>
+        <p:nvPicPr>
+          <p:cNvPr id="20" name="Picture 19">
+            <a:extLst>
+              <a:ext uri="{FF2B5EF4-FFF2-40B4-BE49-F238E27FC236}">
+                <a16:creationId xmlns:a16="http://schemas.microsoft.com/office/drawing/2014/main" id="{38AC5742-BFFC-376E-2380-22CFB4FB404A}"/>
+              </a:ext>
+            </a:extLst>
+          </p:cNvPr>
+          <p:cNvPicPr>
+            <a:picLocks noChangeAspect="1"/>
+          </p:cNvPicPr>
+          <p:nvPr/>
+        </p:nvPicPr>
+        <p:blipFill>
+          <a:blip r:embed="rId5"/>
+          <a:stretch>
+            <a:fillRect/>
+          </a:stretch>
+        </p:blipFill>
+        <p:spPr>
+          <a:xfrm>
+            <a:off x="3719662" y="5943600"/>
+            <a:ext cx="2810500" cy="585267"/>
+          </a:xfrm>
+          <a:prstGeom prst="rect">
+            <a:avLst/>
+          </a:prstGeom>
+        </p:spPr>
+      </p:pic>
+      <p:pic>
+        <p:nvPicPr>
+          <p:cNvPr id="1026" name="Picture 2">
+            <a:extLst>
+              <a:ext uri="{FF2B5EF4-FFF2-40B4-BE49-F238E27FC236}">
+                <a16:creationId xmlns:a16="http://schemas.microsoft.com/office/drawing/2014/main" id="{1D0079CB-892C-E107-5E5D-632F343F78B3}"/>
+              </a:ext>
+            </a:extLst>
+          </p:cNvPr>
+          <p:cNvPicPr>
+            <a:picLocks noChangeAspect="1" noChangeArrowheads="1"/>
+          </p:cNvPicPr>
+          <p:nvPr/>
+        </p:nvPicPr>
+        <p:blipFill>
+          <a:blip r:embed="rId6">
+            <a:extLst>
+              <a:ext uri="{28A0092B-C50C-407E-A947-70E740481C1C}">
+                <a14:useLocalDpi xmlns:a14="http://schemas.microsoft.com/office/drawing/2010/main" val="0"/>
+              </a:ext>
+            </a:extLst>
+          </a:blip>
+          <a:srcRect/>
+          <a:stretch>
+            <a:fillRect/>
+          </a:stretch>
+        </p:blipFill>
+        <p:spPr bwMode="auto">
+          <a:xfrm>
+            <a:off x="7384076" y="3127572"/>
+            <a:ext cx="4525853" cy="2992092"/>
+          </a:xfrm>
+          <a:prstGeom prst="rect">
+            <a:avLst/>
+          </a:prstGeom>
+          <a:noFill/>
+          <a:extLst>
+            <a:ext uri="{909E8E84-426E-40DD-AFC4-6F175D3DCCD1}">
+              <a14:hiddenFill xmlns:a14="http://schemas.microsoft.com/office/drawing/2010/main">
+                <a:solidFill>
+                  <a:srgbClr val="FFFFFF"/>
+                </a:solidFill>
+              </a14:hiddenFill>
+            </a:ext>
+          </a:extLst>
+        </p:spPr>
+      </p:pic>
+      <p:pic>
+        <p:nvPicPr>
+          <p:cNvPr id="2" name="Picture 1">
+            <a:extLst>
+              <a:ext uri="{FF2B5EF4-FFF2-40B4-BE49-F238E27FC236}">
+                <a16:creationId xmlns:a16="http://schemas.microsoft.com/office/drawing/2014/main" id="{19801848-9E5D-1F12-97BC-DB956C66C0D3}"/>
+              </a:ext>
+            </a:extLst>
+          </p:cNvPr>
+          <p:cNvPicPr>
+            <a:picLocks noChangeAspect="1"/>
+          </p:cNvPicPr>
+          <p:nvPr/>
+        </p:nvPicPr>
+        <p:blipFill>
+          <a:blip r:embed="rId7"/>
+          <a:stretch>
+            <a:fillRect/>
+          </a:stretch>
+        </p:blipFill>
+        <p:spPr>
+          <a:xfrm>
+            <a:off x="5645560" y="4557468"/>
+            <a:ext cx="1089473" cy="1089473"/>
+          </a:xfrm>
+          <a:prstGeom prst="roundRect">
+            <a:avLst>
+              <a:gd name="adj" fmla="val 8594"/>
+            </a:avLst>
+          </a:prstGeom>
+          <a:solidFill>
+            <a:srgbClr val="FFFFFF">
+              <a:shade val="85000"/>
+            </a:srgbClr>
+          </a:solidFill>
+          <a:ln>
+            <a:noFill/>
+          </a:ln>
+          <a:effectLst>
+            <a:reflection blurRad="12700" stA="38000" endPos="28000" dist="5000" dir="5400000" sy="-100000" algn="bl" rotWithShape="0"/>
+          </a:effectLst>
+        </p:spPr>
+      </p:pic>
+      <p:sp>
+        <p:nvSpPr>
+          <p:cNvPr id="4" name="Arrow: Right 3">
+            <a:extLst>
+              <a:ext uri="{FF2B5EF4-FFF2-40B4-BE49-F238E27FC236}">
+                <a16:creationId xmlns:a16="http://schemas.microsoft.com/office/drawing/2014/main" id="{AE17E0F1-F287-F6C3-8A88-F6E9ACCFF77A}"/>
+              </a:ext>
+            </a:extLst>
+          </p:cNvPr>
+          <p:cNvSpPr/>
+          <p:nvPr/>
+        </p:nvSpPr>
+        <p:spPr>
+          <a:xfrm>
+            <a:off x="4875451" y="4758117"/>
+            <a:ext cx="606903" cy="791037"/>
+          </a:xfrm>
+          <a:prstGeom prst="rightArrow">
+            <a:avLst/>
+          </a:prstGeom>
+        </p:spPr>
+        <p:style>
+          <a:lnRef idx="1">
+            <a:schemeClr val="accent4"/>
+          </a:lnRef>
+          <a:fillRef idx="2">
+            <a:schemeClr val="accent4"/>
+          </a:fillRef>
+          <a:effectRef idx="1">
+            <a:schemeClr val="accent4"/>
+          </a:effectRef>
+          <a:fontRef idx="minor">
+            <a:schemeClr val="dk1"/>
+          </a:fontRef>
+        </p:style>
+        <p:txBody>
+          <a:bodyPr rtlCol="0" anchor="ctr"/>
+          <a:lstStyle/>
+          <a:p>
+            <a:pPr algn="ctr"/>
+            <a:endParaRPr lang="en-US"/>
+          </a:p>
+        </p:txBody>
+      </p:sp>
+    </p:spTree>
+    <p:extLst>
+      <p:ext uri="{BB962C8B-B14F-4D97-AF65-F5344CB8AC3E}">
+        <p14:creationId xmlns:p14="http://schemas.microsoft.com/office/powerpoint/2010/main" val="1144409768"/>
       </p:ext>
     </p:extLst>
   </p:cSld>
@@ -10981,34 +11576,6 @@
 </file>
 
 <file path=customXml/item1.xml><?xml version="1.0" encoding="utf-8"?>
-<?mso-contentType ?>
-<FormTemplates xmlns="http://schemas.microsoft.com/sharepoint/v3/contenttype/forms">
-  <Display>DocumentLibraryForm</Display>
-  <Edit>DocumentLibraryForm</Edit>
-  <New>DocumentLibraryForm</New>
-</FormTemplates>
-</file>
-
-<file path=customXml/item2.xml><?xml version="1.0" encoding="utf-8"?>
-<p:properties xmlns:p="http://schemas.microsoft.com/office/2006/metadata/properties" xmlns:xsi="http://www.w3.org/2001/XMLSchema-instance" xmlns:pc="http://schemas.microsoft.com/office/infopath/2007/PartnerControls">
-  <documentManagement>
-    <Status xmlns="71af3243-3dd4-4a8d-8c0d-dd76da1f02a5">Not started</Status>
-    <_ip_UnifiedCompliancePolicyUIAction xmlns="http://schemas.microsoft.com/sharepoint/v3" xsi:nil="true"/>
-    <Image xmlns="71af3243-3dd4-4a8d-8c0d-dd76da1f02a5">
-      <Url xsi:nil="true"/>
-      <Description xsi:nil="true"/>
-    </Image>
-    <_ip_UnifiedCompliancePolicyProperties xmlns="http://schemas.microsoft.com/sharepoint/v3" xsi:nil="true"/>
-    <ImageTagsTaxHTField xmlns="71af3243-3dd4-4a8d-8c0d-dd76da1f02a5">
-      <Terms xmlns="http://schemas.microsoft.com/office/infopath/2007/PartnerControls"/>
-    </ImageTagsTaxHTField>
-    <TaxCatchAll xmlns="230e9df3-be65-4c73-a93b-d1236ebd677e"/>
-    <MediaServiceKeyPoints xmlns="71af3243-3dd4-4a8d-8c0d-dd76da1f02a5" xsi:nil="true"/>
-  </documentManagement>
-</p:properties>
-</file>
-
-<file path=customXml/item3.xml><?xml version="1.0" encoding="utf-8"?>
 <ct:contentTypeSchema xmlns:ct="http://schemas.microsoft.com/office/2006/metadata/contentType" xmlns:ma="http://schemas.microsoft.com/office/2006/metadata/properties/metaAttributes" ct:_="" ma:_="" ma:contentTypeName="Document" ma:contentTypeID="0x01010079F111ED35F8CC479449609E8A0923A6" ma:contentTypeVersion="20" ma:contentTypeDescription="Create a new document." ma:contentTypeScope="" ma:versionID="1267097ee5f5874adfcc408041ae252e">
   <xsd:schema xmlns:xsd="http://www.w3.org/2001/XMLSchema" xmlns:xs="http://www.w3.org/2001/XMLSchema" xmlns:p="http://schemas.microsoft.com/office/2006/metadata/properties" xmlns:ns1="http://schemas.microsoft.com/sharepoint/v3" xmlns:ns2="71af3243-3dd4-4a8d-8c0d-dd76da1f02a5" xmlns:ns3="16c05727-aa75-4e4a-9b5f-8a80a1165891" xmlns:ns4="230e9df3-be65-4c73-a93b-d1236ebd677e" targetNamespace="http://schemas.microsoft.com/office/2006/metadata/properties" ma:root="true" ma:fieldsID="395891a93df65b14727750f2c06c306c" ns1:_="" ns2:_="" ns3:_="" ns4:_="">
     <xsd:import namespace="http://schemas.microsoft.com/sharepoint/v3"/>
@@ -11284,27 +11851,35 @@
 </ct:contentTypeSchema>
 </file>
 
-<file path=customXml/itemProps1.xml><?xml version="1.0" encoding="utf-8"?>
-<ds:datastoreItem xmlns:ds="http://schemas.openxmlformats.org/officeDocument/2006/customXml" ds:itemID="{A5CCB28C-7D26-4A36-9CFC-D739C28F3D18}">
-  <ds:schemaRefs>
-    <ds:schemaRef ds:uri="http://schemas.microsoft.com/sharepoint/v3/contenttype/forms"/>
-  </ds:schemaRefs>
-</ds:datastoreItem>
+<file path=customXml/item2.xml><?xml version="1.0" encoding="utf-8"?>
+<p:properties xmlns:p="http://schemas.microsoft.com/office/2006/metadata/properties" xmlns:xsi="http://www.w3.org/2001/XMLSchema-instance" xmlns:pc="http://schemas.microsoft.com/office/infopath/2007/PartnerControls">
+  <documentManagement>
+    <Status xmlns="71af3243-3dd4-4a8d-8c0d-dd76da1f02a5">Not started</Status>
+    <_ip_UnifiedCompliancePolicyUIAction xmlns="http://schemas.microsoft.com/sharepoint/v3" xsi:nil="true"/>
+    <Image xmlns="71af3243-3dd4-4a8d-8c0d-dd76da1f02a5">
+      <Url xsi:nil="true"/>
+      <Description xsi:nil="true"/>
+    </Image>
+    <_ip_UnifiedCompliancePolicyProperties xmlns="http://schemas.microsoft.com/sharepoint/v3" xsi:nil="true"/>
+    <ImageTagsTaxHTField xmlns="71af3243-3dd4-4a8d-8c0d-dd76da1f02a5">
+      <Terms xmlns="http://schemas.microsoft.com/office/infopath/2007/PartnerControls"/>
+    </ImageTagsTaxHTField>
+    <TaxCatchAll xmlns="230e9df3-be65-4c73-a93b-d1236ebd677e"/>
+    <MediaServiceKeyPoints xmlns="71af3243-3dd4-4a8d-8c0d-dd76da1f02a5" xsi:nil="true"/>
+  </documentManagement>
+</p:properties>
 </file>
 
-<file path=customXml/itemProps2.xml><?xml version="1.0" encoding="utf-8"?>
-<ds:datastoreItem xmlns:ds="http://schemas.openxmlformats.org/officeDocument/2006/customXml" ds:itemID="{08757C30-AE9A-4680-90EB-19D282EC2B7C}">
-  <ds:schemaRefs>
-    <ds:schemaRef ds:uri="http://schemas.microsoft.com/office/2006/metadata/properties"/>
-    <ds:schemaRef ds:uri="http://schemas.microsoft.com/office/infopath/2007/PartnerControls"/>
-    <ds:schemaRef ds:uri="71af3243-3dd4-4a8d-8c0d-dd76da1f02a5"/>
-    <ds:schemaRef ds:uri="http://schemas.microsoft.com/sharepoint/v3"/>
-    <ds:schemaRef ds:uri="230e9df3-be65-4c73-a93b-d1236ebd677e"/>
-  </ds:schemaRefs>
-</ds:datastoreItem>
+<file path=customXml/item3.xml><?xml version="1.0" encoding="utf-8"?>
+<?mso-contentType ?>
+<FormTemplates xmlns="http://schemas.microsoft.com/sharepoint/v3/contenttype/forms">
+  <Display>DocumentLibraryForm</Display>
+  <Edit>DocumentLibraryForm</Edit>
+  <New>DocumentLibraryForm</New>
+</FormTemplates>
 </file>
 
-<file path=customXml/itemProps3.xml><?xml version="1.0" encoding="utf-8"?>
+<file path=customXml/itemProps1.xml><?xml version="1.0" encoding="utf-8"?>
 <ds:datastoreItem xmlns:ds="http://schemas.openxmlformats.org/officeDocument/2006/customXml" ds:itemID="{0AF0BF08-C674-44E3-8BFC-85BC65E095F1}">
   <ds:schemaRefs>
     <ds:schemaRef ds:uri="http://schemas.microsoft.com/office/2006/metadata/contentType"/>
@@ -11325,6 +11900,26 @@
 </ds:datastoreItem>
 </file>
 
+<file path=customXml/itemProps2.xml><?xml version="1.0" encoding="utf-8"?>
+<ds:datastoreItem xmlns:ds="http://schemas.openxmlformats.org/officeDocument/2006/customXml" ds:itemID="{08757C30-AE9A-4680-90EB-19D282EC2B7C}">
+  <ds:schemaRefs>
+    <ds:schemaRef ds:uri="http://schemas.microsoft.com/office/2006/metadata/properties"/>
+    <ds:schemaRef ds:uri="http://schemas.microsoft.com/office/infopath/2007/PartnerControls"/>
+    <ds:schemaRef ds:uri="71af3243-3dd4-4a8d-8c0d-dd76da1f02a5"/>
+    <ds:schemaRef ds:uri="http://schemas.microsoft.com/sharepoint/v3"/>
+    <ds:schemaRef ds:uri="230e9df3-be65-4c73-a93b-d1236ebd677e"/>
+  </ds:schemaRefs>
+</ds:datastoreItem>
+</file>
+
+<file path=customXml/itemProps3.xml><?xml version="1.0" encoding="utf-8"?>
+<ds:datastoreItem xmlns:ds="http://schemas.openxmlformats.org/officeDocument/2006/customXml" ds:itemID="{A5CCB28C-7D26-4A36-9CFC-D739C28F3D18}">
+  <ds:schemaRefs>
+    <ds:schemaRef ds:uri="http://schemas.microsoft.com/sharepoint/v3/contenttype/forms"/>
+  </ds:schemaRefs>
+</ds:datastoreItem>
+</file>
+
 <file path=docMetadata/LabelInfo.xml><?xml version="1.0" encoding="utf-8"?>
 <clbl:labelList xmlns:clbl="http://schemas.microsoft.com/office/2020/mipLabelMetadata">
   <clbl:label id="{f42aa342-8706-4288-bd11-ebb85995028c}" enabled="1" method="Standard" siteId="{72f988bf-86f1-41af-91ab-2d7cd011db47}" contentBits="0" removed="0"/>

</xml_diff>

<commit_message>
update document and image cover
</commit_message>
<xml_diff>
--- a/architool/Using-Archi.pptx
+++ b/architool/Using-Archi.pptx
@@ -6639,23 +6639,41 @@
           <a:lstStyle/>
           <a:p>
             <a:r>
-              <a:rPr lang="en-US" sz="7200" dirty="0"/>
+              <a:rPr lang="en-US" sz="6000" dirty="0"/>
               <a:t>Archi’s Excel Export Plug-In</a:t>
             </a:r>
             <a:br>
-              <a:rPr lang="en-US" sz="7200" dirty="0"/>
+              <a:rPr lang="en-US" sz="6000" dirty="0"/>
             </a:br>
             <a:r>
-              <a:rPr lang="en-US" sz="7200" dirty="0"/>
+              <a:rPr lang="en-US" sz="6000" dirty="0"/>
               <a:t>1.0.0 </a:t>
             </a:r>
             <a:r>
-              <a:rPr lang="en-US" sz="7200" dirty="0">
+              <a:rPr lang="en-US" sz="6000" dirty="0">
                 <a:sym typeface="Wingdings" panose="05000000000000000000" pitchFamily="2" charset="2"/>
               </a:rPr>
               <a:t> 1.1.1</a:t>
             </a:r>
-            <a:endParaRPr lang="en-US" sz="7200" dirty="0"/>
+            <a:br>
+              <a:rPr lang="en-US" sz="6000" dirty="0">
+                <a:sym typeface="Wingdings" panose="05000000000000000000" pitchFamily="2" charset="2"/>
+              </a:rPr>
+            </a:br>
+            <a:r>
+              <a:rPr lang="en-US" sz="4800" dirty="0">
+                <a:solidFill>
+                  <a:srgbClr val="FFFF00"/>
+                </a:solidFill>
+                <a:sym typeface="Wingdings" panose="05000000000000000000" pitchFamily="2" charset="2"/>
+              </a:rPr>
+              <a:t>(Difference Need Aware)</a:t>
+            </a:r>
+            <a:endParaRPr lang="en-US" sz="6000" dirty="0">
+              <a:solidFill>
+                <a:srgbClr val="FFFF00"/>
+              </a:solidFill>
+            </a:endParaRPr>
           </a:p>
         </p:txBody>
       </p:sp>
@@ -7063,7 +7081,7 @@
         </p:blipFill>
         <p:spPr bwMode="auto">
           <a:xfrm>
-            <a:off x="7384076" y="3127572"/>
+            <a:off x="7097489" y="2761545"/>
             <a:ext cx="4525853" cy="2992092"/>
           </a:xfrm>
           <a:prstGeom prst="rect">

</xml_diff>